<commit_message>
add numerical experiment section in presentation in project2
</commit_message>
<xml_diff>
--- a/Project2/Presentation/P2Z20_AGR.pptx
+++ b/Project2/Presentation/P2Z20_AGR.pptx
@@ -5,10 +5,10 @@
     <p:sldMasterId id="2147483648" r:id="rId1"/>
   </p:sldMasterIdLst>
   <p:notesMasterIdLst>
-    <p:notesMasterId r:id="rId24"/>
+    <p:notesMasterId r:id="rId26"/>
   </p:notesMasterIdLst>
   <p:handoutMasterIdLst>
-    <p:handoutMasterId r:id="rId25"/>
+    <p:handoutMasterId r:id="rId27"/>
   </p:handoutMasterIdLst>
   <p:sldIdLst>
     <p:sldId id="256" r:id="rId2"/>
@@ -31,8 +31,10 @@
     <p:sldId id="304" r:id="rId19"/>
     <p:sldId id="305" r:id="rId20"/>
     <p:sldId id="306" r:id="rId21"/>
-    <p:sldId id="309" r:id="rId22"/>
-    <p:sldId id="287" r:id="rId23"/>
+    <p:sldId id="310" r:id="rId22"/>
+    <p:sldId id="312" r:id="rId23"/>
+    <p:sldId id="311" r:id="rId24"/>
+    <p:sldId id="287" r:id="rId25"/>
   </p:sldIdLst>
   <p:sldSz cx="12188825" cy="6858000"/>
   <p:notesSz cx="6858000" cy="9144000"/>
@@ -253,7 +255,7 @@
             <a:pPr rtl="0"/>
             <a:fld id="{259B836B-1D14-4898-A0A6-D61FF17C9DBC}" type="datetime1">
               <a:rPr lang="pl-PL" smtClean="0"/>
-              <a:t>27.12.2023</a:t>
+              <a:t>30.12.2023</a:t>
             </a:fld>
             <a:endParaRPr lang="pl-PL" dirty="0"/>
           </a:p>
@@ -430,7 +432,7 @@
             <a:fld id="{0B49425D-C08F-42D2-9661-205968B2C1FB}" type="datetime1">
               <a:rPr lang="pl-PL" smtClean="0"/>
               <a:pPr/>
-              <a:t>27.12.2023</a:t>
+              <a:t>30.12.2023</a:t>
             </a:fld>
             <a:endParaRPr lang="pl-PL" dirty="0"/>
           </a:p>
@@ -1802,7 +1804,7 @@
             <a:fld id="{0891712C-DFA3-4BBB-949A-441F8D94FB78}" type="datetime1">
               <a:rPr lang="pl-PL" smtClean="0"/>
               <a:pPr/>
-              <a:t>27.12.2023</a:t>
+              <a:t>30.12.2023</a:t>
             </a:fld>
             <a:endParaRPr lang="pl-PL" dirty="0"/>
           </a:p>
@@ -2034,7 +2036,7 @@
             <a:fld id="{945AF6E0-399A-47E1-A1DB-7B7324AFFA86}" type="datetime1">
               <a:rPr lang="pl-PL" smtClean="0"/>
               <a:pPr/>
-              <a:t>27.12.2023</a:t>
+              <a:t>30.12.2023</a:t>
             </a:fld>
             <a:endParaRPr lang="pl-PL" dirty="0"/>
           </a:p>
@@ -2862,7 +2864,7 @@
             <a:fld id="{C607926C-DC73-443E-A62B-EE34064092FB}" type="datetime1">
               <a:rPr lang="pl-PL" smtClean="0"/>
               <a:pPr/>
-              <a:t>27.12.2023</a:t>
+              <a:t>30.12.2023</a:t>
             </a:fld>
             <a:endParaRPr lang="pl-PL" dirty="0"/>
           </a:p>
@@ -3072,7 +3074,7 @@
             <a:fld id="{E5FE2A44-E43C-4DB0-9333-8D36003B44E7}" type="datetime1">
               <a:rPr lang="pl-PL" smtClean="0"/>
               <a:pPr/>
-              <a:t>27.12.2023</a:t>
+              <a:t>30.12.2023</a:t>
             </a:fld>
             <a:endParaRPr lang="pl-PL" dirty="0"/>
           </a:p>
@@ -4343,7 +4345,7 @@
             <a:fld id="{73A63387-177D-4170-9A3F-154CB0D93663}" type="datetime1">
               <a:rPr lang="pl-PL" smtClean="0"/>
               <a:pPr/>
-              <a:t>27.12.2023</a:t>
+              <a:t>30.12.2023</a:t>
             </a:fld>
             <a:endParaRPr lang="pl-PL" dirty="0"/>
           </a:p>
@@ -4677,7 +4679,7 @@
             <a:fld id="{1CFAE661-66FE-4314-8504-F784411951F4}" type="datetime1">
               <a:rPr lang="pl-PL" smtClean="0"/>
               <a:pPr/>
-              <a:t>27.12.2023</a:t>
+              <a:t>30.12.2023</a:t>
             </a:fld>
             <a:endParaRPr lang="pl-PL" dirty="0"/>
           </a:p>
@@ -5137,7 +5139,7 @@
             <a:fld id="{33DE8A6F-0E38-430F-8DDD-319E6F7E6EAA}" type="datetime1">
               <a:rPr lang="pl-PL" smtClean="0"/>
               <a:pPr/>
-              <a:t>27.12.2023</a:t>
+              <a:t>30.12.2023</a:t>
             </a:fld>
             <a:endParaRPr lang="pl-PL" dirty="0"/>
           </a:p>
@@ -5279,7 +5281,7 @@
             <a:fld id="{14227057-05C3-4648-ABCB-F25BC875C77C}" type="datetime1">
               <a:rPr lang="pl-PL" smtClean="0"/>
               <a:pPr/>
-              <a:t>27.12.2023</a:t>
+              <a:t>30.12.2023</a:t>
             </a:fld>
             <a:endParaRPr lang="pl-PL" dirty="0"/>
           </a:p>
@@ -5625,7 +5627,7 @@
             <a:fld id="{9DD6C040-6C40-4FE1-A91C-782E8F88FE59}" type="datetime1">
               <a:rPr lang="pl-PL" smtClean="0"/>
               <a:pPr/>
-              <a:t>27.12.2023</a:t>
+              <a:t>30.12.2023</a:t>
             </a:fld>
             <a:endParaRPr lang="pl-PL" dirty="0"/>
           </a:p>
@@ -6129,7 +6131,7 @@
             <a:fld id="{C1F1E1EE-6F53-47AB-A934-DBB9363F4AE6}" type="datetime1">
               <a:rPr lang="pl-PL" smtClean="0"/>
               <a:pPr/>
-              <a:t>27.12.2023</a:t>
+              <a:t>30.12.2023</a:t>
             </a:fld>
             <a:endParaRPr lang="pl-PL" dirty="0"/>
           </a:p>
@@ -6586,7 +6588,7 @@
             <a:fld id="{88F116C8-0054-4794-B06D-CBA61F961298}" type="datetime1">
               <a:rPr lang="pl-PL" smtClean="0"/>
               <a:pPr/>
-              <a:t>27.12.2023</a:t>
+              <a:t>30.12.2023</a:t>
             </a:fld>
             <a:endParaRPr lang="pl-PL" dirty="0"/>
           </a:p>
@@ -7493,7 +7495,7 @@
             <a:fld id="{7513D91F-FF86-4B7D-8E15-3B9D5855F3A0}" type="datetime1">
               <a:rPr lang="pl-PL" smtClean="0"/>
               <a:pPr/>
-              <a:t>27.12.2023</a:t>
+              <a:t>30.12.2023</a:t>
             </a:fld>
             <a:endParaRPr lang="pl-PL" dirty="0"/>
           </a:p>
@@ -7931,8 +7933,8 @@
           <a:chExt cx="0" cy="0"/>
         </a:xfrm>
       </p:grpSpPr>
-      <mc:AlternateContent xmlns:mc="http://schemas.openxmlformats.org/markup-compatibility/2006">
-        <mc:Choice xmlns:a14="http://schemas.microsoft.com/office/drawing/2010/main" Requires="a14">
+      <mc:AlternateContent xmlns:mc="http://schemas.openxmlformats.org/markup-compatibility/2006" xmlns:a14="http://schemas.microsoft.com/office/drawing/2010/main">
+        <mc:Choice Requires="a14">
           <p:sp>
             <p:nvSpPr>
               <p:cNvPr id="2" name="Tytuł 1"/>
@@ -8353,7 +8355,7 @@
             </p:txBody>
           </p:sp>
         </mc:Choice>
-        <mc:Fallback>
+        <mc:Fallback xmlns="">
           <p:sp>
             <p:nvSpPr>
               <p:cNvPr id="2" name="Tytuł 1"/>
@@ -8767,7 +8769,23 @@
                         <a:ea typeface="Cambria Math" panose="02040503050406030204" pitchFamily="18" charset="0"/>
                         <a:cs typeface="Calibri" panose="020F0502020204030204" pitchFamily="34" charset="0"/>
                       </a:rPr>
-                      <m:t>≤…≤</m:t>
+                      <m:t>≥</m:t>
+                    </m:r>
+                    <m:r>
+                      <a:rPr lang="pl-PL" sz="2400" b="0" i="1" smtClean="0">
+                        <a:latin typeface="Cambria Math" panose="02040503050406030204" pitchFamily="18" charset="0"/>
+                        <a:ea typeface="Cambria Math" panose="02040503050406030204" pitchFamily="18" charset="0"/>
+                        <a:cs typeface="Calibri" panose="020F0502020204030204" pitchFamily="34" charset="0"/>
+                      </a:rPr>
+                      <m:t>…</m:t>
+                    </m:r>
+                    <m:r>
+                      <a:rPr lang="pl-PL" sz="2400" b="0" i="1" smtClean="0">
+                        <a:latin typeface="Cambria Math" panose="02040503050406030204" pitchFamily="18" charset="0"/>
+                        <a:ea typeface="Cambria Math" panose="02040503050406030204" pitchFamily="18" charset="0"/>
+                        <a:cs typeface="Calibri" panose="020F0502020204030204" pitchFamily="34" charset="0"/>
+                      </a:rPr>
+                      <m:t>≥</m:t>
                     </m:r>
                     <m:d>
                       <m:dPr>
@@ -8824,12 +8842,12 @@
                       </m:e>
                     </m:d>
                     <m:r>
-                      <a:rPr lang="pl-PL" sz="2400" i="1">
+                      <a:rPr lang="pl-PL" sz="2400" b="0" i="1" smtClean="0">
                         <a:latin typeface="Cambria Math" panose="02040503050406030204" pitchFamily="18" charset="0"/>
                         <a:ea typeface="Cambria Math" panose="02040503050406030204" pitchFamily="18" charset="0"/>
                         <a:cs typeface="Calibri" panose="020F0502020204030204" pitchFamily="34" charset="0"/>
                       </a:rPr>
-                      <m:t>≤</m:t>
+                      <m:t>&gt;</m:t>
                     </m:r>
                     <m:d>
                       <m:dPr>
@@ -8877,6 +8895,14 @@
                         </m:sSub>
                       </m:e>
                     </m:d>
+                    <m:r>
+                      <a:rPr lang="pl-PL" sz="2400" b="0" i="1" smtClean="0">
+                        <a:latin typeface="Cambria Math" panose="02040503050406030204" pitchFamily="18" charset="0"/>
+                        <a:ea typeface="Cambria Math" panose="02040503050406030204" pitchFamily="18" charset="0"/>
+                        <a:cs typeface="Calibri" panose="020F0502020204030204" pitchFamily="34" charset="0"/>
+                      </a:rPr>
+                      <m:t>&gt;0</m:t>
+                    </m:r>
                   </m:oMath>
                 </a14:m>
                 <a:r>
@@ -9193,8 +9219,8 @@
           </a:p>
         </p:txBody>
       </p:sp>
-      <mc:AlternateContent xmlns:mc="http://schemas.openxmlformats.org/markup-compatibility/2006">
-        <mc:Choice xmlns:a14="http://schemas.microsoft.com/office/drawing/2010/main" Requires="a14">
+      <mc:AlternateContent xmlns:mc="http://schemas.openxmlformats.org/markup-compatibility/2006" xmlns:a14="http://schemas.microsoft.com/office/drawing/2010/main">
+        <mc:Choice Requires="a14">
           <p:sp>
             <p:nvSpPr>
               <p:cNvPr id="5" name="Prostokąt 4"/>
@@ -9420,7 +9446,7 @@
             </p:txBody>
           </p:sp>
         </mc:Choice>
-        <mc:Fallback>
+        <mc:Fallback xmlns="">
           <p:sp>
             <p:nvSpPr>
               <p:cNvPr id="5" name="Prostokąt 4"/>
@@ -9459,8 +9485,8 @@
           </p:sp>
         </mc:Fallback>
       </mc:AlternateContent>
-      <mc:AlternateContent xmlns:mc="http://schemas.openxmlformats.org/markup-compatibility/2006">
-        <mc:Choice xmlns:a14="http://schemas.microsoft.com/office/drawing/2010/main" Requires="a14">
+      <mc:AlternateContent xmlns:mc="http://schemas.openxmlformats.org/markup-compatibility/2006" xmlns:a14="http://schemas.microsoft.com/office/drawing/2010/main">
+        <mc:Choice Requires="a14">
           <p:sp>
             <p:nvSpPr>
               <p:cNvPr id="6" name="pole tekstowe 5"/>
@@ -9681,7 +9707,7 @@
             </p:txBody>
           </p:sp>
         </mc:Choice>
-        <mc:Fallback>
+        <mc:Fallback xmlns="">
           <p:sp>
             <p:nvSpPr>
               <p:cNvPr id="6" name="pole tekstowe 5"/>
@@ -9720,8 +9746,8 @@
           </p:sp>
         </mc:Fallback>
       </mc:AlternateContent>
-      <mc:AlternateContent xmlns:mc="http://schemas.openxmlformats.org/markup-compatibility/2006">
-        <mc:Choice xmlns:a14="http://schemas.microsoft.com/office/drawing/2010/main" Requires="a14">
+      <mc:AlternateContent xmlns:mc="http://schemas.openxmlformats.org/markup-compatibility/2006" xmlns:a14="http://schemas.microsoft.com/office/drawing/2010/main">
+        <mc:Choice Requires="a14">
           <p:sp>
             <p:nvSpPr>
               <p:cNvPr id="7" name="pole tekstowe 6"/>
@@ -10038,7 +10064,7 @@
             </p:txBody>
           </p:sp>
         </mc:Choice>
-        <mc:Fallback>
+        <mc:Fallback xmlns="">
           <p:sp>
             <p:nvSpPr>
               <p:cNvPr id="7" name="pole tekstowe 6"/>
@@ -10194,8 +10220,8 @@
           </a:p>
         </p:txBody>
       </p:sp>
-      <mc:AlternateContent xmlns:mc="http://schemas.openxmlformats.org/markup-compatibility/2006">
-        <mc:Choice xmlns:a14="http://schemas.microsoft.com/office/drawing/2010/main" Requires="a14">
+      <mc:AlternateContent xmlns:mc="http://schemas.openxmlformats.org/markup-compatibility/2006" xmlns:a14="http://schemas.microsoft.com/office/drawing/2010/main">
+        <mc:Choice Requires="a14">
           <p:sp>
             <p:nvSpPr>
               <p:cNvPr id="3" name="Symbol zastępczy zawartości 2"/>
@@ -10815,7 +10841,7 @@
             </p:txBody>
           </p:sp>
         </mc:Choice>
-        <mc:Fallback>
+        <mc:Fallback xmlns="">
           <p:sp>
             <p:nvSpPr>
               <p:cNvPr id="3" name="Symbol zastępczy zawartości 2"/>
@@ -10932,8 +10958,8 @@
           </a:p>
         </p:txBody>
       </p:sp>
-      <mc:AlternateContent xmlns:mc="http://schemas.openxmlformats.org/markup-compatibility/2006">
-        <mc:Choice xmlns:a14="http://schemas.microsoft.com/office/drawing/2010/main" Requires="a14">
+      <mc:AlternateContent xmlns:mc="http://schemas.openxmlformats.org/markup-compatibility/2006" xmlns:a14="http://schemas.microsoft.com/office/drawing/2010/main">
+        <mc:Choice Requires="a14">
           <p:sp>
             <p:nvSpPr>
               <p:cNvPr id="4" name="Symbol zastępczy zawartości 2"/>
@@ -11405,7 +11431,7 @@
             </p:txBody>
           </p:sp>
         </mc:Choice>
-        <mc:Fallback>
+        <mc:Fallback xmlns="">
           <p:sp>
             <p:nvSpPr>
               <p:cNvPr id="4" name="Symbol zastępczy zawartości 2"/>
@@ -11575,8 +11601,8 @@
           <a:chExt cx="0" cy="0"/>
         </a:xfrm>
       </p:grpSpPr>
-      <mc:AlternateContent xmlns:mc="http://schemas.openxmlformats.org/markup-compatibility/2006">
-        <mc:Choice xmlns:a14="http://schemas.microsoft.com/office/drawing/2010/main" Requires="a14">
+      <mc:AlternateContent xmlns:mc="http://schemas.openxmlformats.org/markup-compatibility/2006" xmlns:a14="http://schemas.microsoft.com/office/drawing/2010/main">
+        <mc:Choice Requires="a14">
           <p:sp>
             <p:nvSpPr>
               <p:cNvPr id="3" name="Symbol zastępczy zawartości 2"/>
@@ -11753,7 +11779,7 @@
             </p:txBody>
           </p:sp>
         </mc:Choice>
-        <mc:Fallback>
+        <mc:Fallback xmlns="">
           <p:sp>
             <p:nvSpPr>
               <p:cNvPr id="3" name="Symbol zastępczy zawartości 2"/>
@@ -11918,7 +11944,7 @@
             <p:spPr>
               <a:xfrm>
                 <a:off x="1629916" y="1844824"/>
-                <a:ext cx="8640960" cy="2520280"/>
+                <a:ext cx="9505056" cy="2088232"/>
               </a:xfrm>
             </p:spPr>
             <p:txBody>
@@ -12199,7 +12225,6 @@
                   <a:rPr lang="pl-PL" sz="2400" dirty="0" smtClean="0"/>
                   <a:t>.</a:t>
                 </a:r>
-                <a:endParaRPr lang="pl-PL" sz="2400" dirty="0" smtClean="0"/>
               </a:p>
             </p:txBody>
           </p:sp>
@@ -12218,12 +12243,12 @@
             <p:spPr>
               <a:xfrm>
                 <a:off x="1629916" y="1844824"/>
-                <a:ext cx="8640960" cy="2520280"/>
+                <a:ext cx="9505056" cy="2088232"/>
               </a:xfrm>
               <a:blipFill>
                 <a:blip r:embed="rId2"/>
                 <a:stretch>
-                  <a:fillRect l="-917" t="-3148"/>
+                  <a:fillRect l="-833" t="-3801"/>
                 </a:stretch>
               </a:blipFill>
             </p:spPr>
@@ -12321,8 +12346,8 @@
           </a:p>
         </p:txBody>
       </p:sp>
-      <mc:AlternateContent xmlns:mc="http://schemas.openxmlformats.org/markup-compatibility/2006">
-        <mc:Choice xmlns:a14="http://schemas.microsoft.com/office/drawing/2010/main" Requires="a14">
+      <mc:AlternateContent xmlns:mc="http://schemas.openxmlformats.org/markup-compatibility/2006" xmlns:a14="http://schemas.microsoft.com/office/drawing/2010/main">
+        <mc:Choice Requires="a14">
           <p:sp>
             <p:nvSpPr>
               <p:cNvPr id="3" name="Symbol zastępczy zawartości 2"/>
@@ -12390,7 +12415,7 @@
             </p:txBody>
           </p:sp>
         </mc:Choice>
-        <mc:Fallback>
+        <mc:Fallback xmlns="">
           <p:sp>
             <p:nvSpPr>
               <p:cNvPr id="3" name="Symbol zastępczy zawartości 2"/>
@@ -16667,8 +16692,8 @@
           </a:p>
         </p:txBody>
       </p:sp>
-      <mc:AlternateContent xmlns:mc="http://schemas.openxmlformats.org/markup-compatibility/2006">
-        <mc:Choice xmlns:a14="http://schemas.microsoft.com/office/drawing/2010/main" Requires="a14">
+      <mc:AlternateContent xmlns:mc="http://schemas.openxmlformats.org/markup-compatibility/2006" xmlns:a14="http://schemas.microsoft.com/office/drawing/2010/main">
+        <mc:Choice Requires="a14">
           <p:sp>
             <p:nvSpPr>
               <p:cNvPr id="3" name="Symbol zastępczy zawartości 2"/>
@@ -16746,18 +16771,13 @@
                 </a14:m>
                 <a:r>
                   <a:rPr lang="pl-PL" sz="2400" dirty="0" smtClean="0"/>
-                  <a:t> krokach</a:t>
-                </a:r>
-                <a:r>
-                  <a:rPr lang="pl-PL" sz="2400" dirty="0" smtClean="0"/>
-                  <a:t>).</a:t>
-                </a:r>
-                <a:endParaRPr lang="pl-PL" sz="2400" dirty="0" smtClean="0"/>
+                  <a:t> krokach).</a:t>
+                </a:r>
               </a:p>
             </p:txBody>
           </p:sp>
         </mc:Choice>
-        <mc:Fallback>
+        <mc:Fallback xmlns="">
           <p:sp>
             <p:nvSpPr>
               <p:cNvPr id="3" name="Symbol zastępczy zawartości 2"/>
@@ -16795,8 +16815,8 @@
           </p:sp>
         </mc:Fallback>
       </mc:AlternateContent>
-      <mc:AlternateContent xmlns:mc="http://schemas.openxmlformats.org/markup-compatibility/2006">
-        <mc:Choice xmlns:a14="http://schemas.microsoft.com/office/drawing/2010/main" Requires="a14">
+      <mc:AlternateContent xmlns:mc="http://schemas.openxmlformats.org/markup-compatibility/2006" xmlns:a14="http://schemas.microsoft.com/office/drawing/2010/main">
+        <mc:Choice Requires="a14">
           <p:sp>
             <p:nvSpPr>
               <p:cNvPr id="4" name="Prostokąt 3"/>
@@ -17297,11 +17317,7 @@
                 </a:pPr>
                 <a:r>
                   <a:rPr lang="pl-PL" sz="2400" dirty="0" smtClean="0"/>
-                  <a:t>	   </a:t>
-                </a:r>
-                <a:r>
-                  <a:rPr lang="pl-PL" sz="2400" dirty="0" smtClean="0"/>
-                  <a:t>     </a:t>
+                  <a:t>	        </a:t>
                 </a:r>
                 <a14:m>
                   <m:oMath xmlns:m="http://schemas.openxmlformats.org/officeDocument/2006/math">
@@ -17450,11 +17466,7 @@
                 </a:pPr>
                 <a:r>
                   <a:rPr lang="pl-PL" sz="2400" dirty="0" smtClean="0"/>
-                  <a:t>	   </a:t>
-                </a:r>
-                <a:r>
-                  <a:rPr lang="pl-PL" sz="2400" dirty="0" smtClean="0"/>
-                  <a:t>     </a:t>
+                  <a:t>	        </a:t>
                 </a:r>
                 <a14:m>
                   <m:oMath xmlns:m="http://schemas.openxmlformats.org/officeDocument/2006/math">
@@ -17607,11 +17619,7 @@
                 </a:r>
                 <a:r>
                   <a:rPr lang="pl-PL" sz="2400" dirty="0" smtClean="0"/>
-                  <a:t>   </a:t>
-                </a:r>
-                <a:r>
-                  <a:rPr lang="pl-PL" sz="2400" dirty="0" smtClean="0"/>
-                  <a:t>     </a:t>
+                  <a:t>        </a:t>
                 </a:r>
                 <a14:m>
                   <m:oMath xmlns:m="http://schemas.openxmlformats.org/officeDocument/2006/math">
@@ -17772,11 +17780,7 @@
                 </a:pPr>
                 <a:r>
                   <a:rPr lang="pl-PL" sz="2400" dirty="0" smtClean="0"/>
-                  <a:t>	   </a:t>
-                </a:r>
-                <a:r>
-                  <a:rPr lang="pl-PL" sz="2400" dirty="0" smtClean="0"/>
-                  <a:t>     </a:t>
+                  <a:t>	        </a:t>
                 </a:r>
                 <a14:m>
                   <m:oMath xmlns:m="http://schemas.openxmlformats.org/officeDocument/2006/math">
@@ -17809,7 +17813,7 @@
             </p:txBody>
           </p:sp>
         </mc:Choice>
-        <mc:Fallback>
+        <mc:Fallback xmlns="">
           <p:sp>
             <p:nvSpPr>
               <p:cNvPr id="4" name="Prostokąt 3"/>
@@ -17934,8 +17938,8 @@
           </a:p>
         </p:txBody>
       </p:sp>
-      <mc:AlternateContent xmlns:mc="http://schemas.openxmlformats.org/markup-compatibility/2006">
-        <mc:Choice xmlns:a14="http://schemas.microsoft.com/office/drawing/2010/main" Requires="a14">
+      <mc:AlternateContent xmlns:mc="http://schemas.openxmlformats.org/markup-compatibility/2006" xmlns:a14="http://schemas.microsoft.com/office/drawing/2010/main">
+        <mc:Choice Requires="a14">
           <p:sp>
             <p:nvSpPr>
               <p:cNvPr id="7" name="pole tekstowe 6"/>
@@ -18583,7 +18587,7 @@
             </p:txBody>
           </p:sp>
         </mc:Choice>
-        <mc:Fallback>
+        <mc:Fallback xmlns="">
           <p:sp>
             <p:nvSpPr>
               <p:cNvPr id="7" name="pole tekstowe 6"/>
@@ -18740,8 +18744,8 @@
           </a:p>
         </p:txBody>
       </p:sp>
-      <mc:AlternateContent xmlns:mc="http://schemas.openxmlformats.org/markup-compatibility/2006">
-        <mc:Choice xmlns:a14="http://schemas.microsoft.com/office/drawing/2010/main" Requires="a14">
+      <mc:AlternateContent xmlns:mc="http://schemas.openxmlformats.org/markup-compatibility/2006" xmlns:a14="http://schemas.microsoft.com/office/drawing/2010/main">
+        <mc:Choice Requires="a14">
           <p:sp>
             <p:nvSpPr>
               <p:cNvPr id="4" name="Prostokąt 3"/>
@@ -19257,11 +19261,7 @@
                 </a:pPr>
                 <a:r>
                   <a:rPr lang="pl-PL" sz="2400" dirty="0" smtClean="0"/>
-                  <a:t>		 </a:t>
-                </a:r>
-                <a:r>
-                  <a:rPr lang="pl-PL" sz="2400" dirty="0" smtClean="0"/>
-                  <a:t>        </a:t>
+                  <a:t>		         </a:t>
                 </a:r>
                 <a14:m>
                   <m:oMath xmlns:m="http://schemas.openxmlformats.org/officeDocument/2006/math">
@@ -19289,11 +19289,7 @@
                 </a:pPr>
                 <a:r>
                   <a:rPr lang="pl-PL" sz="2400" dirty="0" smtClean="0"/>
-                  <a:t> 	   </a:t>
-                </a:r>
-                <a:r>
-                  <a:rPr lang="pl-PL" sz="2400" dirty="0" smtClean="0"/>
-                  <a:t>    </a:t>
+                  <a:t> 	       </a:t>
                 </a:r>
                 <a14:m>
                   <m:oMath xmlns:m="http://schemas.openxmlformats.org/officeDocument/2006/math">
@@ -19429,7 +19425,7 @@
             </p:txBody>
           </p:sp>
         </mc:Choice>
-        <mc:Fallback>
+        <mc:Fallback xmlns="">
           <p:sp>
             <p:nvSpPr>
               <p:cNvPr id="4" name="Prostokąt 3"/>
@@ -19529,8 +19525,8 @@
         </p:nvSpPr>
         <p:spPr>
           <a:xfrm>
-            <a:off x="1485900" y="3356992"/>
-            <a:ext cx="8283272" cy="897273"/>
+            <a:off x="1598613" y="3284984"/>
+            <a:ext cx="8283272" cy="681248"/>
           </a:xfrm>
         </p:spPr>
         <p:txBody>
@@ -19547,10 +19543,47 @@
           </a:p>
         </p:txBody>
       </p:sp>
+      <p:sp>
+        <p:nvSpPr>
+          <p:cNvPr id="3" name="Symbol zastępczy tekstu 2"/>
+          <p:cNvSpPr>
+            <a:spLocks noGrp="1"/>
+          </p:cNvSpPr>
+          <p:nvPr>
+            <p:ph type="body" idx="1"/>
+          </p:nvPr>
+        </p:nvSpPr>
+        <p:spPr>
+          <a:xfrm>
+            <a:off x="1598613" y="4259997"/>
+            <a:ext cx="7304111" cy="825188"/>
+          </a:xfrm>
+        </p:spPr>
+        <p:txBody>
+          <a:bodyPr>
+            <a:normAutofit/>
+          </a:bodyPr>
+          <a:lstStyle/>
+          <a:p>
+            <a:r>
+              <a:rPr lang="pl-PL" sz="2400" dirty="0"/>
+              <a:t>Porównanie metod rozwiązywania układów równań </a:t>
+            </a:r>
+            <a:r>
+              <a:rPr lang="pl-PL" sz="2400" dirty="0" smtClean="0"/>
+              <a:t>liniowych w </a:t>
+            </a:r>
+            <a:r>
+              <a:rPr lang="pl-PL" sz="2400" dirty="0"/>
+              <a:t>odwrotnej metodzie potęgowej.</a:t>
+            </a:r>
+          </a:p>
+        </p:txBody>
+      </p:sp>
     </p:spTree>
     <p:extLst>
       <p:ext uri="{BB962C8B-B14F-4D97-AF65-F5344CB8AC3E}">
-        <p14:creationId xmlns:p14="http://schemas.microsoft.com/office/powerpoint/2010/main" val="2207807521"/>
+        <p14:creationId xmlns:p14="http://schemas.microsoft.com/office/powerpoint/2010/main" val="3349896036"/>
       </p:ext>
     </p:extLst>
   </p:cSld>
@@ -19569,17 +19602,732 @@
       </p:transition>
     </mc:Fallback>
   </mc:AlternateContent>
-  <p:timing>
-    <p:tnLst>
-      <p:par>
-        <p:cTn id="1" dur="indefinite" restart="never" nodeType="tmRoot"/>
-      </p:par>
-    </p:tnLst>
-  </p:timing>
 </p:sld>
 </file>
 
 <file path=ppt/slides/slide22.xml><?xml version="1.0" encoding="utf-8"?>
+<p:sld xmlns:a="http://schemas.openxmlformats.org/drawingml/2006/main" xmlns:r="http://schemas.openxmlformats.org/officeDocument/2006/relationships" xmlns:p="http://schemas.openxmlformats.org/presentationml/2006/main">
+  <p:cSld>
+    <p:spTree>
+      <p:nvGrpSpPr>
+        <p:cNvPr id="1" name=""/>
+        <p:cNvGrpSpPr/>
+        <p:nvPr/>
+      </p:nvGrpSpPr>
+      <p:grpSpPr>
+        <a:xfrm>
+          <a:off x="0" y="0"/>
+          <a:ext cx="0" cy="0"/>
+          <a:chOff x="0" y="0"/>
+          <a:chExt cx="0" cy="0"/>
+        </a:xfrm>
+      </p:grpSpPr>
+      <mc:AlternateContent xmlns:mc="http://schemas.openxmlformats.org/markup-compatibility/2006">
+        <mc:Choice xmlns:a14="http://schemas.microsoft.com/office/drawing/2010/main" Requires="a14">
+          <p:sp>
+            <p:nvSpPr>
+              <p:cNvPr id="2" name="Tytuł 1"/>
+              <p:cNvSpPr>
+                <a:spLocks noGrp="1"/>
+              </p:cNvSpPr>
+              <p:nvPr>
+                <p:ph type="title"/>
+              </p:nvPr>
+            </p:nvSpPr>
+            <p:spPr>
+              <a:xfrm>
+                <a:off x="1593436" y="759843"/>
+                <a:ext cx="9782801" cy="580925"/>
+              </a:xfrm>
+            </p:spPr>
+            <p:txBody>
+              <a:bodyPr>
+                <a:normAutofit/>
+              </a:bodyPr>
+              <a:lstStyle/>
+              <a:p>
+                <a:r>
+                  <a:rPr lang="pl-PL" sz="3200" dirty="0" smtClean="0"/>
+                  <a:t>Rozkład </a:t>
+                </a:r>
+                <a14:m>
+                  <m:oMath xmlns:m="http://schemas.openxmlformats.org/officeDocument/2006/math">
+                    <m:r>
+                      <a:rPr lang="pl-PL" sz="3200" i="1" dirty="0" smtClean="0">
+                        <a:latin typeface="Cambria Math" panose="02040503050406030204" pitchFamily="18" charset="0"/>
+                      </a:rPr>
+                      <m:t>𝐿𝑈</m:t>
+                    </m:r>
+                  </m:oMath>
+                </a14:m>
+                <a:r>
+                  <a:rPr lang="pl-PL" sz="3200" dirty="0" smtClean="0"/>
+                  <a:t>:</a:t>
+                </a:r>
+                <a:endParaRPr lang="pl-PL" sz="3200" dirty="0"/>
+              </a:p>
+            </p:txBody>
+          </p:sp>
+        </mc:Choice>
+        <mc:Fallback>
+          <p:sp>
+            <p:nvSpPr>
+              <p:cNvPr id="2" name="Tytuł 1"/>
+              <p:cNvSpPr>
+                <a:spLocks noGrp="1" noRot="1" noChangeAspect="1" noMove="1" noResize="1" noEditPoints="1" noAdjustHandles="1" noChangeArrowheads="1" noChangeShapeType="1" noTextEdit="1"/>
+              </p:cNvSpPr>
+              <p:nvPr>
+                <p:ph type="title"/>
+              </p:nvPr>
+            </p:nvSpPr>
+            <p:spPr>
+              <a:xfrm>
+                <a:off x="1593436" y="759843"/>
+                <a:ext cx="9782801" cy="580925"/>
+              </a:xfrm>
+              <a:blipFill>
+                <a:blip r:embed="rId2"/>
+                <a:stretch>
+                  <a:fillRect l="-1558" t="-13684" b="-34737"/>
+                </a:stretch>
+              </a:blipFill>
+            </p:spPr>
+            <p:txBody>
+              <a:bodyPr/>
+              <a:lstStyle/>
+              <a:p>
+                <a:r>
+                  <a:rPr lang="pl-PL">
+                    <a:noFill/>
+                  </a:rPr>
+                  <a:t> </a:t>
+                </a:r>
+              </a:p>
+            </p:txBody>
+          </p:sp>
+        </mc:Fallback>
+      </mc:AlternateContent>
+      <mc:AlternateContent xmlns:mc="http://schemas.openxmlformats.org/markup-compatibility/2006">
+        <mc:Choice xmlns:a14="http://schemas.microsoft.com/office/drawing/2010/main" Requires="a14">
+          <p:sp>
+            <p:nvSpPr>
+              <p:cNvPr id="3" name="Symbol zastępczy zawartości 2"/>
+              <p:cNvSpPr>
+                <a:spLocks noGrp="1"/>
+              </p:cNvSpPr>
+              <p:nvPr>
+                <p:ph idx="1"/>
+              </p:nvPr>
+            </p:nvSpPr>
+            <p:spPr>
+              <a:xfrm>
+                <a:off x="1593436" y="1600200"/>
+                <a:ext cx="9782801" cy="3124944"/>
+              </a:xfrm>
+            </p:spPr>
+            <p:txBody>
+              <a:bodyPr>
+                <a:normAutofit/>
+              </a:bodyPr>
+              <a:lstStyle/>
+              <a:p>
+                <a:r>
+                  <a:rPr lang="pl-PL" sz="2400" dirty="0" smtClean="0"/>
+                  <a:t>Odwrotna metoda potęgowa zakłada, że macierz </a:t>
+                </a:r>
+                <a14:m>
+                  <m:oMath xmlns:m="http://schemas.openxmlformats.org/officeDocument/2006/math">
+                    <m:r>
+                      <a:rPr lang="pl-PL" sz="2400" b="0" i="1" smtClean="0">
+                        <a:latin typeface="Cambria Math" panose="02040503050406030204" pitchFamily="18" charset="0"/>
+                      </a:rPr>
+                      <m:t>𝐴</m:t>
+                    </m:r>
+                  </m:oMath>
+                </a14:m>
+                <a:r>
+                  <a:rPr lang="pl-PL" sz="2400" dirty="0" smtClean="0"/>
+                  <a:t> jest nieosobliwa, </a:t>
+                </a:r>
+                <a:r>
+                  <a:rPr lang="pl-PL" sz="2400" dirty="0"/>
+                  <a:t>czyli </a:t>
+                </a:r>
+                <a14:m>
+                  <m:oMath xmlns:m="http://schemas.openxmlformats.org/officeDocument/2006/math">
+                    <m:func>
+                      <m:funcPr>
+                        <m:ctrlPr>
+                          <a:rPr lang="pl-PL" sz="2400" i="1">
+                            <a:latin typeface="Cambria Math" panose="02040503050406030204" pitchFamily="18" charset="0"/>
+                          </a:rPr>
+                        </m:ctrlPr>
+                      </m:funcPr>
+                      <m:fName>
+                        <m:r>
+                          <m:rPr>
+                            <m:sty m:val="p"/>
+                          </m:rPr>
+                          <a:rPr lang="pl-PL" sz="2400">
+                            <a:latin typeface="Cambria Math" panose="02040503050406030204" pitchFamily="18" charset="0"/>
+                          </a:rPr>
+                          <m:t>det</m:t>
+                        </m:r>
+                      </m:fName>
+                      <m:e>
+                        <m:d>
+                          <m:dPr>
+                            <m:ctrlPr>
+                              <a:rPr lang="pl-PL" sz="2400" i="1">
+                                <a:latin typeface="Cambria Math" panose="02040503050406030204" pitchFamily="18" charset="0"/>
+                              </a:rPr>
+                            </m:ctrlPr>
+                          </m:dPr>
+                          <m:e>
+                            <m:r>
+                              <a:rPr lang="pl-PL" sz="2400" i="1">
+                                <a:latin typeface="Cambria Math" panose="02040503050406030204" pitchFamily="18" charset="0"/>
+                              </a:rPr>
+                              <m:t>𝐴</m:t>
+                            </m:r>
+                          </m:e>
+                        </m:d>
+                      </m:e>
+                    </m:func>
+                    <m:r>
+                      <a:rPr lang="pl-PL" sz="2400" i="1">
+                        <a:latin typeface="Cambria Math" panose="02040503050406030204" pitchFamily="18" charset="0"/>
+                        <a:ea typeface="Cambria Math" panose="02040503050406030204" pitchFamily="18" charset="0"/>
+                      </a:rPr>
+                      <m:t>≠</m:t>
+                    </m:r>
+                    <m:r>
+                      <a:rPr lang="pl-PL" sz="2400" i="1">
+                        <a:latin typeface="Cambria Math" panose="02040503050406030204" pitchFamily="18" charset="0"/>
+                        <a:ea typeface="Cambria Math" panose="02040503050406030204" pitchFamily="18" charset="0"/>
+                      </a:rPr>
+                      <m:t>0</m:t>
+                    </m:r>
+                  </m:oMath>
+                </a14:m>
+                <a:r>
+                  <a:rPr lang="pl-PL" sz="2400" dirty="0"/>
+                  <a:t>.</a:t>
+                </a:r>
+              </a:p>
+              <a:p>
+                <a:r>
+                  <a:rPr lang="pl-PL" sz="2400" dirty="0" smtClean="0"/>
+                  <a:t>Dzięki temu założeniu, do rozwiązywania układów równań możemy wykorzystać rozkład </a:t>
+                </a:r>
+                <a14:m>
+                  <m:oMath xmlns:m="http://schemas.openxmlformats.org/officeDocument/2006/math">
+                    <m:r>
+                      <a:rPr lang="pl-PL" sz="2400" i="1" dirty="0">
+                        <a:latin typeface="Cambria Math" panose="02040503050406030204" pitchFamily="18" charset="0"/>
+                      </a:rPr>
+                      <m:t>𝐿𝑈</m:t>
+                    </m:r>
+                  </m:oMath>
+                </a14:m>
+                <a:r>
+                  <a:rPr lang="pl-PL" sz="2400" dirty="0" smtClean="0"/>
+                  <a:t> oparty na </a:t>
+                </a:r>
+                <a14:m>
+                  <m:oMath xmlns:m="http://schemas.openxmlformats.org/officeDocument/2006/math">
+                    <m:r>
+                      <a:rPr lang="pl-PL" sz="2400" i="1" dirty="0" smtClean="0">
+                        <a:latin typeface="Cambria Math" panose="02040503050406030204" pitchFamily="18" charset="0"/>
+                      </a:rPr>
+                      <m:t>𝐺𝐸𝑃𝑃</m:t>
+                    </m:r>
+                  </m:oMath>
+                </a14:m>
+                <a:r>
+                  <a:rPr lang="pl-PL" sz="2400" dirty="0" smtClean="0"/>
+                  <a:t>.</a:t>
+                </a:r>
+              </a:p>
+              <a:p>
+                <a:r>
+                  <a:rPr lang="pl-PL" sz="2400" dirty="0" smtClean="0"/>
+                  <a:t>Koszt rozkładu </a:t>
+                </a:r>
+                <a14:m>
+                  <m:oMath xmlns:m="http://schemas.openxmlformats.org/officeDocument/2006/math">
+                    <m:r>
+                      <a:rPr lang="pl-PL" sz="2400" i="1" dirty="0">
+                        <a:latin typeface="Cambria Math" panose="02040503050406030204" pitchFamily="18" charset="0"/>
+                      </a:rPr>
+                      <m:t>𝐿𝑈</m:t>
+                    </m:r>
+                  </m:oMath>
+                </a14:m>
+                <a:r>
+                  <a:rPr lang="pl-PL" sz="2400" dirty="0" smtClean="0"/>
+                  <a:t> to </a:t>
+                </a:r>
+                <a14:m>
+                  <m:oMath xmlns:m="http://schemas.openxmlformats.org/officeDocument/2006/math">
+                    <m:r>
+                      <a:rPr lang="pl-PL" sz="2400" b="0" i="1" smtClean="0">
+                        <a:latin typeface="Cambria Math" panose="02040503050406030204" pitchFamily="18" charset="0"/>
+                      </a:rPr>
+                      <m:t>𝑂</m:t>
+                    </m:r>
+                    <m:r>
+                      <a:rPr lang="pl-PL" sz="2400" b="0" i="1" smtClean="0">
+                        <a:latin typeface="Cambria Math" panose="02040503050406030204" pitchFamily="18" charset="0"/>
+                      </a:rPr>
+                      <m:t>(</m:t>
+                    </m:r>
+                    <m:sSup>
+                      <m:sSupPr>
+                        <m:ctrlPr>
+                          <a:rPr lang="pl-PL" sz="2400" b="0" i="1" smtClean="0">
+                            <a:latin typeface="Cambria Math" panose="02040503050406030204" pitchFamily="18" charset="0"/>
+                          </a:rPr>
+                        </m:ctrlPr>
+                      </m:sSupPr>
+                      <m:e>
+                        <m:r>
+                          <a:rPr lang="pl-PL" sz="2400" b="0" i="1" smtClean="0">
+                            <a:latin typeface="Cambria Math" panose="02040503050406030204" pitchFamily="18" charset="0"/>
+                          </a:rPr>
+                          <m:t>𝑛</m:t>
+                        </m:r>
+                      </m:e>
+                      <m:sup>
+                        <m:r>
+                          <a:rPr lang="pl-PL" sz="2400" b="0" i="1" smtClean="0">
+                            <a:latin typeface="Cambria Math" panose="02040503050406030204" pitchFamily="18" charset="0"/>
+                          </a:rPr>
+                          <m:t>3</m:t>
+                        </m:r>
+                      </m:sup>
+                    </m:sSup>
+                    <m:r>
+                      <a:rPr lang="pl-PL" sz="2400" b="0" i="1" smtClean="0">
+                        <a:latin typeface="Cambria Math" panose="02040503050406030204" pitchFamily="18" charset="0"/>
+                      </a:rPr>
+                      <m:t>)</m:t>
+                    </m:r>
+                  </m:oMath>
+                </a14:m>
+                <a:r>
+                  <a:rPr lang="pl-PL" sz="2400" dirty="0" smtClean="0"/>
+                  <a:t> operacji arytmetycznych.</a:t>
+                </a:r>
+              </a:p>
+              <a:p>
+                <a:r>
+                  <a:rPr lang="pl-PL" sz="2400" dirty="0" smtClean="0"/>
+                  <a:t>Dzięki temu, rozwiązanie pojedynczego układu równań wymaga </a:t>
+                </a:r>
+                <a14:m>
+                  <m:oMath xmlns:m="http://schemas.openxmlformats.org/officeDocument/2006/math">
+                    <m:r>
+                      <a:rPr lang="pl-PL" sz="2400" i="1">
+                        <a:latin typeface="Cambria Math" panose="02040503050406030204" pitchFamily="18" charset="0"/>
+                      </a:rPr>
+                      <m:t>𝑂</m:t>
+                    </m:r>
+                    <m:r>
+                      <a:rPr lang="pl-PL" sz="2400" i="1">
+                        <a:latin typeface="Cambria Math" panose="02040503050406030204" pitchFamily="18" charset="0"/>
+                      </a:rPr>
+                      <m:t>(</m:t>
+                    </m:r>
+                    <m:sSup>
+                      <m:sSupPr>
+                        <m:ctrlPr>
+                          <a:rPr lang="pl-PL" sz="2400" i="1">
+                            <a:latin typeface="Cambria Math" panose="02040503050406030204" pitchFamily="18" charset="0"/>
+                          </a:rPr>
+                        </m:ctrlPr>
+                      </m:sSupPr>
+                      <m:e>
+                        <m:r>
+                          <a:rPr lang="pl-PL" sz="2400" i="1">
+                            <a:latin typeface="Cambria Math" panose="02040503050406030204" pitchFamily="18" charset="0"/>
+                          </a:rPr>
+                          <m:t>𝑛</m:t>
+                        </m:r>
+                      </m:e>
+                      <m:sup>
+                        <m:r>
+                          <a:rPr lang="pl-PL" sz="2400" b="0" i="1" smtClean="0">
+                            <a:latin typeface="Cambria Math" panose="02040503050406030204" pitchFamily="18" charset="0"/>
+                          </a:rPr>
+                          <m:t>2</m:t>
+                        </m:r>
+                      </m:sup>
+                    </m:sSup>
+                    <m:r>
+                      <a:rPr lang="pl-PL" sz="2400" i="1">
+                        <a:latin typeface="Cambria Math" panose="02040503050406030204" pitchFamily="18" charset="0"/>
+                      </a:rPr>
+                      <m:t>)</m:t>
+                    </m:r>
+                  </m:oMath>
+                </a14:m>
+                <a:r>
+                  <a:rPr lang="pl-PL" sz="2400" dirty="0" smtClean="0"/>
+                  <a:t> operacji arytmetycznych. </a:t>
+                </a:r>
+                <a:endParaRPr lang="pl-PL" sz="2400" dirty="0"/>
+              </a:p>
+            </p:txBody>
+          </p:sp>
+        </mc:Choice>
+        <mc:Fallback>
+          <p:sp>
+            <p:nvSpPr>
+              <p:cNvPr id="3" name="Symbol zastępczy zawartości 2"/>
+              <p:cNvSpPr>
+                <a:spLocks noGrp="1" noRot="1" noChangeAspect="1" noMove="1" noResize="1" noEditPoints="1" noAdjustHandles="1" noChangeArrowheads="1" noChangeShapeType="1" noTextEdit="1"/>
+              </p:cNvSpPr>
+              <p:nvPr>
+                <p:ph idx="1"/>
+              </p:nvPr>
+            </p:nvSpPr>
+            <p:spPr>
+              <a:xfrm>
+                <a:off x="1593436" y="1600200"/>
+                <a:ext cx="9782801" cy="3124944"/>
+              </a:xfrm>
+              <a:blipFill>
+                <a:blip r:embed="rId3"/>
+                <a:stretch>
+                  <a:fillRect l="-810" t="-2539" r="-436"/>
+                </a:stretch>
+              </a:blipFill>
+            </p:spPr>
+            <p:txBody>
+              <a:bodyPr/>
+              <a:lstStyle/>
+              <a:p>
+                <a:r>
+                  <a:rPr lang="pl-PL">
+                    <a:noFill/>
+                  </a:rPr>
+                  <a:t> </a:t>
+                </a:r>
+              </a:p>
+            </p:txBody>
+          </p:sp>
+        </mc:Fallback>
+      </mc:AlternateContent>
+    </p:spTree>
+    <p:extLst>
+      <p:ext uri="{BB962C8B-B14F-4D97-AF65-F5344CB8AC3E}">
+        <p14:creationId xmlns:p14="http://schemas.microsoft.com/office/powerpoint/2010/main" val="3949459686"/>
+      </p:ext>
+    </p:extLst>
+  </p:cSld>
+  <p:clrMapOvr>
+    <a:masterClrMapping/>
+  </p:clrMapOvr>
+  <mc:AlternateContent xmlns:mc="http://schemas.openxmlformats.org/markup-compatibility/2006" xmlns:p14="http://schemas.microsoft.com/office/powerpoint/2010/main">
+    <mc:Choice Requires="p14">
+      <p:transition spd="med" p14:dur="700">
+        <p:fade/>
+      </p:transition>
+    </mc:Choice>
+    <mc:Fallback xmlns="">
+      <p:transition spd="med">
+        <p:fade/>
+      </p:transition>
+    </mc:Fallback>
+  </mc:AlternateContent>
+</p:sld>
+</file>
+
+<file path=ppt/slides/slide23.xml><?xml version="1.0" encoding="utf-8"?>
+<p:sld xmlns:a="http://schemas.openxmlformats.org/drawingml/2006/main" xmlns:r="http://schemas.openxmlformats.org/officeDocument/2006/relationships" xmlns:p="http://schemas.openxmlformats.org/presentationml/2006/main">
+  <p:cSld>
+    <p:spTree>
+      <p:nvGrpSpPr>
+        <p:cNvPr id="1" name=""/>
+        <p:cNvGrpSpPr/>
+        <p:nvPr/>
+      </p:nvGrpSpPr>
+      <p:grpSpPr>
+        <a:xfrm>
+          <a:off x="0" y="0"/>
+          <a:ext cx="0" cy="0"/>
+          <a:chOff x="0" y="0"/>
+          <a:chExt cx="0" cy="0"/>
+        </a:xfrm>
+      </p:grpSpPr>
+      <mc:AlternateContent xmlns:mc="http://schemas.openxmlformats.org/markup-compatibility/2006">
+        <mc:Choice xmlns:a14="http://schemas.microsoft.com/office/drawing/2010/main" Requires="a14">
+          <p:sp>
+            <p:nvSpPr>
+              <p:cNvPr id="2" name="Tytuł 1"/>
+              <p:cNvSpPr>
+                <a:spLocks noGrp="1"/>
+              </p:cNvSpPr>
+              <p:nvPr>
+                <p:ph type="title"/>
+              </p:nvPr>
+            </p:nvSpPr>
+            <p:spPr>
+              <a:xfrm>
+                <a:off x="1629916" y="548680"/>
+                <a:ext cx="9253504" cy="879797"/>
+              </a:xfrm>
+            </p:spPr>
+            <p:txBody>
+              <a:bodyPr>
+                <a:normAutofit/>
+              </a:bodyPr>
+              <a:lstStyle/>
+              <a:p>
+                <a:r>
+                  <a:rPr lang="pl-PL" sz="2400" dirty="0" smtClean="0"/>
+                  <a:t>Porównanie czasu obliczeniowego dla macierzy o rozmiarze </a:t>
+                </a:r>
+                <a14:m>
+                  <m:oMath xmlns:m="http://schemas.openxmlformats.org/officeDocument/2006/math">
+                    <m:r>
+                      <a:rPr lang="pl-PL" sz="2400" i="1" dirty="0" smtClean="0">
+                        <a:latin typeface="Cambria Math" panose="02040503050406030204" pitchFamily="18" charset="0"/>
+                      </a:rPr>
+                      <m:t>200000</m:t>
+                    </m:r>
+                    <m:r>
+                      <a:rPr lang="pl-PL" sz="2400" i="1" dirty="0" smtClean="0">
+                        <a:latin typeface="Cambria Math" panose="02040503050406030204" pitchFamily="18" charset="0"/>
+                        <a:ea typeface="Cambria Math" panose="02040503050406030204" pitchFamily="18" charset="0"/>
+                      </a:rPr>
+                      <m:t>×</m:t>
+                    </m:r>
+                    <m:r>
+                      <a:rPr lang="pl-PL" sz="2400" i="1" dirty="0">
+                        <a:latin typeface="Cambria Math" panose="02040503050406030204" pitchFamily="18" charset="0"/>
+                      </a:rPr>
+                      <m:t>200000</m:t>
+                    </m:r>
+                  </m:oMath>
+                </a14:m>
+                <a:r>
+                  <a:rPr lang="pl-PL" sz="2400" dirty="0" smtClean="0"/>
+                  <a:t>:</a:t>
+                </a:r>
+                <a:endParaRPr lang="pl-PL" sz="2400" dirty="0"/>
+              </a:p>
+            </p:txBody>
+          </p:sp>
+        </mc:Choice>
+        <mc:Fallback>
+          <p:sp>
+            <p:nvSpPr>
+              <p:cNvPr id="2" name="Tytuł 1"/>
+              <p:cNvSpPr>
+                <a:spLocks noGrp="1" noRot="1" noChangeAspect="1" noMove="1" noResize="1" noEditPoints="1" noAdjustHandles="1" noChangeArrowheads="1" noChangeShapeType="1" noTextEdit="1"/>
+              </p:cNvSpPr>
+              <p:nvPr>
+                <p:ph type="title"/>
+              </p:nvPr>
+            </p:nvSpPr>
+            <p:spPr>
+              <a:xfrm>
+                <a:off x="1629916" y="548680"/>
+                <a:ext cx="9253504" cy="879797"/>
+              </a:xfrm>
+              <a:blipFill>
+                <a:blip r:embed="rId2"/>
+                <a:stretch>
+                  <a:fillRect l="-988" b="-16667"/>
+                </a:stretch>
+              </a:blipFill>
+            </p:spPr>
+            <p:txBody>
+              <a:bodyPr/>
+              <a:lstStyle/>
+              <a:p>
+                <a:r>
+                  <a:rPr lang="pl-PL">
+                    <a:noFill/>
+                  </a:rPr>
+                  <a:t> </a:t>
+                </a:r>
+              </a:p>
+            </p:txBody>
+          </p:sp>
+        </mc:Fallback>
+      </mc:AlternateContent>
+      <p:pic>
+        <p:nvPicPr>
+          <p:cNvPr id="4" name="Obraz 3"/>
+          <p:cNvPicPr>
+            <a:picLocks noChangeAspect="1"/>
+          </p:cNvPicPr>
+          <p:nvPr/>
+        </p:nvPicPr>
+        <p:blipFill>
+          <a:blip r:embed="rId3">
+            <a:extLst>
+              <a:ext uri="{28A0092B-C50C-407E-A947-70E740481C1C}">
+                <a14:useLocalDpi xmlns:a14="http://schemas.microsoft.com/office/drawing/2010/main" val="0"/>
+              </a:ext>
+            </a:extLst>
+          </a:blip>
+          <a:stretch>
+            <a:fillRect/>
+          </a:stretch>
+        </p:blipFill>
+        <p:spPr>
+          <a:xfrm>
+            <a:off x="2071536" y="1556792"/>
+            <a:ext cx="8972523" cy="4691577"/>
+          </a:xfrm>
+          <a:prstGeom prst="rect">
+            <a:avLst/>
+          </a:prstGeom>
+        </p:spPr>
+      </p:pic>
+      <mc:AlternateContent xmlns:mc="http://schemas.openxmlformats.org/markup-compatibility/2006">
+        <mc:Choice xmlns:a14="http://schemas.microsoft.com/office/drawing/2010/main" Requires="a14">
+          <p:sp>
+            <p:nvSpPr>
+              <p:cNvPr id="5" name="pole tekstowe 4"/>
+              <p:cNvSpPr txBox="1"/>
+              <p:nvPr/>
+            </p:nvSpPr>
+            <p:spPr>
+              <a:xfrm>
+                <a:off x="2638028" y="6237312"/>
+                <a:ext cx="7992888" cy="461665"/>
+              </a:xfrm>
+              <a:prstGeom prst="rect">
+                <a:avLst/>
+              </a:prstGeom>
+              <a:noFill/>
+            </p:spPr>
+            <p:txBody>
+              <a:bodyPr wrap="square" rtlCol="0">
+                <a:spAutoFit/>
+              </a:bodyPr>
+              <a:lstStyle/>
+              <a:p>
+                <a:r>
+                  <a:rPr lang="pl-PL" sz="1200" dirty="0" smtClean="0"/>
+                  <a:t>Wykres przedstawia czas wykonania metody potęgowej dla macierzy o rozmiarze </a:t>
+                </a:r>
+                <a14:m>
+                  <m:oMath xmlns:m="http://schemas.openxmlformats.org/officeDocument/2006/math">
+                    <m:r>
+                      <a:rPr lang="pl-PL" sz="1200" i="1" dirty="0">
+                        <a:latin typeface="Cambria Math" panose="02040503050406030204" pitchFamily="18" charset="0"/>
+                      </a:rPr>
+                      <m:t>200000</m:t>
+                    </m:r>
+                    <m:r>
+                      <a:rPr lang="pl-PL" sz="1200" i="1" dirty="0">
+                        <a:latin typeface="Cambria Math" panose="02040503050406030204" pitchFamily="18" charset="0"/>
+                        <a:ea typeface="Cambria Math" panose="02040503050406030204" pitchFamily="18" charset="0"/>
+                      </a:rPr>
+                      <m:t>×</m:t>
+                    </m:r>
+                    <m:r>
+                      <a:rPr lang="pl-PL" sz="1200" i="1" dirty="0">
+                        <a:latin typeface="Cambria Math" panose="02040503050406030204" pitchFamily="18" charset="0"/>
+                      </a:rPr>
+                      <m:t>200000</m:t>
+                    </m:r>
+                  </m:oMath>
+                </a14:m>
+                <a:r>
+                  <a:rPr lang="pl-PL" sz="1200" dirty="0" smtClean="0"/>
+                  <a:t> w funkcji zadanej liczby iteracji </a:t>
+                </a:r>
+                <a14:m>
+                  <m:oMath xmlns:m="http://schemas.openxmlformats.org/officeDocument/2006/math">
+                    <m:r>
+                      <a:rPr lang="pl-PL" sz="1200" b="0" i="1" smtClean="0">
+                        <a:latin typeface="Cambria Math" panose="02040503050406030204" pitchFamily="18" charset="0"/>
+                      </a:rPr>
+                      <m:t>𝑛</m:t>
+                    </m:r>
+                  </m:oMath>
+                </a14:m>
+                <a:r>
+                  <a:rPr lang="pl-PL" sz="1200" dirty="0" smtClean="0"/>
+                  <a:t>.</a:t>
+                </a:r>
+                <a:endParaRPr lang="pl-PL" sz="1200" dirty="0"/>
+              </a:p>
+            </p:txBody>
+          </p:sp>
+        </mc:Choice>
+        <mc:Fallback>
+          <p:sp>
+            <p:nvSpPr>
+              <p:cNvPr id="5" name="pole tekstowe 4"/>
+              <p:cNvSpPr txBox="1">
+                <a:spLocks noRot="1" noChangeAspect="1" noMove="1" noResize="1" noEditPoints="1" noAdjustHandles="1" noChangeArrowheads="1" noChangeShapeType="1" noTextEdit="1"/>
+              </p:cNvSpPr>
+              <p:nvPr/>
+            </p:nvSpPr>
+            <p:spPr>
+              <a:xfrm>
+                <a:off x="2638028" y="6237312"/>
+                <a:ext cx="7992888" cy="461665"/>
+              </a:xfrm>
+              <a:prstGeom prst="rect">
+                <a:avLst/>
+              </a:prstGeom>
+              <a:blipFill>
+                <a:blip r:embed="rId4"/>
+                <a:stretch>
+                  <a:fillRect l="-76" t="-1316" b="-7895"/>
+                </a:stretch>
+              </a:blipFill>
+            </p:spPr>
+            <p:txBody>
+              <a:bodyPr/>
+              <a:lstStyle/>
+              <a:p>
+                <a:r>
+                  <a:rPr lang="pl-PL">
+                    <a:noFill/>
+                  </a:rPr>
+                  <a:t> </a:t>
+                </a:r>
+              </a:p>
+            </p:txBody>
+          </p:sp>
+        </mc:Fallback>
+      </mc:AlternateContent>
+    </p:spTree>
+    <p:extLst>
+      <p:ext uri="{BB962C8B-B14F-4D97-AF65-F5344CB8AC3E}">
+        <p14:creationId xmlns:p14="http://schemas.microsoft.com/office/powerpoint/2010/main" val="1481221234"/>
+      </p:ext>
+    </p:extLst>
+  </p:cSld>
+  <p:clrMapOvr>
+    <a:masterClrMapping/>
+  </p:clrMapOvr>
+  <mc:AlternateContent xmlns:mc="http://schemas.openxmlformats.org/markup-compatibility/2006" xmlns:p14="http://schemas.microsoft.com/office/powerpoint/2010/main">
+    <mc:Choice Requires="p14">
+      <p:transition spd="med" p14:dur="700">
+        <p:fade/>
+      </p:transition>
+    </mc:Choice>
+    <mc:Fallback xmlns="">
+      <p:transition spd="med">
+        <p:fade/>
+      </p:transition>
+    </mc:Fallback>
+  </mc:AlternateContent>
+</p:sld>
+</file>
+
+<file path=ppt/slides/slide24.xml><?xml version="1.0" encoding="utf-8"?>
 <p:sld xmlns:a="http://schemas.openxmlformats.org/drawingml/2006/main" xmlns:r="http://schemas.openxmlformats.org/officeDocument/2006/relationships" xmlns:p="http://schemas.openxmlformats.org/presentationml/2006/main">
   <p:cSld>
     <p:spTree>
@@ -21149,8 +21897,8 @@
           <a:chExt cx="0" cy="0"/>
         </a:xfrm>
       </p:grpSpPr>
-      <mc:AlternateContent xmlns:mc="http://schemas.openxmlformats.org/markup-compatibility/2006">
-        <mc:Choice xmlns:a14="http://schemas.microsoft.com/office/drawing/2010/main" Requires="a14">
+      <mc:AlternateContent xmlns:mc="http://schemas.openxmlformats.org/markup-compatibility/2006" xmlns:a14="http://schemas.microsoft.com/office/drawing/2010/main">
+        <mc:Choice Requires="a14">
           <p:sp>
             <p:nvSpPr>
               <p:cNvPr id="3" name="Symbol zastępczy zawartości 2"/>
@@ -21822,7 +22570,7 @@
             </p:txBody>
           </p:sp>
         </mc:Choice>
-        <mc:Fallback>
+        <mc:Fallback xmlns="">
           <p:sp>
             <p:nvSpPr>
               <p:cNvPr id="3" name="Symbol zastępczy zawartości 2"/>
@@ -21973,8 +22721,8 @@
           </a:p>
         </p:txBody>
       </p:sp>
-      <mc:AlternateContent xmlns:mc="http://schemas.openxmlformats.org/markup-compatibility/2006">
-        <mc:Choice xmlns:a14="http://schemas.microsoft.com/office/drawing/2010/main" Requires="a14">
+      <mc:AlternateContent xmlns:mc="http://schemas.openxmlformats.org/markup-compatibility/2006" xmlns:a14="http://schemas.microsoft.com/office/drawing/2010/main">
+        <mc:Choice Requires="a14">
           <p:sp>
             <p:nvSpPr>
               <p:cNvPr id="5" name="Prostokąt 4"/>
@@ -22251,7 +22999,7 @@
             </p:txBody>
           </p:sp>
         </mc:Choice>
-        <mc:Fallback>
+        <mc:Fallback xmlns="">
           <p:sp>
             <p:nvSpPr>
               <p:cNvPr id="5" name="Prostokąt 4"/>
@@ -22290,8 +23038,8 @@
           </p:sp>
         </mc:Fallback>
       </mc:AlternateContent>
-      <mc:AlternateContent xmlns:mc="http://schemas.openxmlformats.org/markup-compatibility/2006">
-        <mc:Choice xmlns:a14="http://schemas.microsoft.com/office/drawing/2010/main" Requires="a14">
+      <mc:AlternateContent xmlns:mc="http://schemas.openxmlformats.org/markup-compatibility/2006" xmlns:a14="http://schemas.microsoft.com/office/drawing/2010/main">
+        <mc:Choice Requires="a14">
           <p:sp>
             <p:nvSpPr>
               <p:cNvPr id="6" name="pole tekstowe 5"/>
@@ -22504,7 +23252,7 @@
             </p:txBody>
           </p:sp>
         </mc:Choice>
-        <mc:Fallback>
+        <mc:Fallback xmlns="">
           <p:sp>
             <p:nvSpPr>
               <p:cNvPr id="6" name="pole tekstowe 5"/>
@@ -22543,8 +23291,8 @@
           </p:sp>
         </mc:Fallback>
       </mc:AlternateContent>
-      <mc:AlternateContent xmlns:mc="http://schemas.openxmlformats.org/markup-compatibility/2006">
-        <mc:Choice xmlns:a14="http://schemas.microsoft.com/office/drawing/2010/main" Requires="a14">
+      <mc:AlternateContent xmlns:mc="http://schemas.openxmlformats.org/markup-compatibility/2006" xmlns:a14="http://schemas.microsoft.com/office/drawing/2010/main">
+        <mc:Choice Requires="a14">
           <p:sp>
             <p:nvSpPr>
               <p:cNvPr id="7" name="pole tekstowe 6"/>
@@ -22864,7 +23612,7 @@
             </p:txBody>
           </p:sp>
         </mc:Choice>
-        <mc:Fallback>
+        <mc:Fallback xmlns="">
           <p:sp>
             <p:nvSpPr>
               <p:cNvPr id="7" name="pole tekstowe 6"/>
@@ -22982,8 +23730,8 @@
           </a:p>
         </p:txBody>
       </p:sp>
-      <mc:AlternateContent xmlns:mc="http://schemas.openxmlformats.org/markup-compatibility/2006">
-        <mc:Choice xmlns:a14="http://schemas.microsoft.com/office/drawing/2010/main" Requires="a14">
+      <mc:AlternateContent xmlns:mc="http://schemas.openxmlformats.org/markup-compatibility/2006" xmlns:a14="http://schemas.microsoft.com/office/drawing/2010/main">
+        <mc:Choice Requires="a14">
           <p:sp>
             <p:nvSpPr>
               <p:cNvPr id="3" name="Symbol zastępczy zawartości 2"/>
@@ -23603,7 +24351,7 @@
             </p:txBody>
           </p:sp>
         </mc:Choice>
-        <mc:Fallback>
+        <mc:Fallback xmlns="">
           <p:sp>
             <p:nvSpPr>
               <p:cNvPr id="3" name="Symbol zastępczy zawartości 2"/>
@@ -23720,8 +24468,8 @@
           </a:p>
         </p:txBody>
       </p:sp>
-      <mc:AlternateContent xmlns:mc="http://schemas.openxmlformats.org/markup-compatibility/2006">
-        <mc:Choice xmlns:a14="http://schemas.microsoft.com/office/drawing/2010/main" Requires="a14">
+      <mc:AlternateContent xmlns:mc="http://schemas.openxmlformats.org/markup-compatibility/2006" xmlns:a14="http://schemas.microsoft.com/office/drawing/2010/main">
+        <mc:Choice Requires="a14">
           <p:sp>
             <p:nvSpPr>
               <p:cNvPr id="4" name="Symbol zastępczy zawartości 2"/>
@@ -24046,7 +24794,7 @@
             </p:txBody>
           </p:sp>
         </mc:Choice>
-        <mc:Fallback>
+        <mc:Fallback xmlns="">
           <p:sp>
             <p:nvSpPr>
               <p:cNvPr id="4" name="Symbol zastępczy zawartości 2"/>

</xml_diff>

<commit_message>
add error plot in presentation in project2
</commit_message>
<xml_diff>
--- a/Project2/Presentation/P2Z20_AGR.pptx
+++ b/Project2/Presentation/P2Z20_AGR.pptx
@@ -34,7 +34,7 @@
     <p:sldId id="310" r:id="rId22"/>
     <p:sldId id="312" r:id="rId23"/>
     <p:sldId id="311" r:id="rId24"/>
-    <p:sldId id="287" r:id="rId25"/>
+    <p:sldId id="313" r:id="rId25"/>
   </p:sldIdLst>
   <p:sldSz cx="12188825" cy="6858000"/>
   <p:notesSz cx="6858000" cy="9144000"/>
@@ -8549,8 +8549,8 @@
           <a:chExt cx="0" cy="0"/>
         </a:xfrm>
       </p:grpSpPr>
-      <mc:AlternateContent xmlns:mc="http://schemas.openxmlformats.org/markup-compatibility/2006">
-        <mc:Choice xmlns:a14="http://schemas.microsoft.com/office/drawing/2010/main" Requires="a14">
+      <mc:AlternateContent xmlns:mc="http://schemas.openxmlformats.org/markup-compatibility/2006" xmlns:a14="http://schemas.microsoft.com/office/drawing/2010/main">
+        <mc:Choice Requires="a14">
           <p:sp>
             <p:nvSpPr>
               <p:cNvPr id="3" name="Symbol zastępczy zawartości 2"/>
@@ -8769,23 +8769,7 @@
                         <a:ea typeface="Cambria Math" panose="02040503050406030204" pitchFamily="18" charset="0"/>
                         <a:cs typeface="Calibri" panose="020F0502020204030204" pitchFamily="34" charset="0"/>
                       </a:rPr>
-                      <m:t>≥</m:t>
-                    </m:r>
-                    <m:r>
-                      <a:rPr lang="pl-PL" sz="2400" b="0" i="1" smtClean="0">
-                        <a:latin typeface="Cambria Math" panose="02040503050406030204" pitchFamily="18" charset="0"/>
-                        <a:ea typeface="Cambria Math" panose="02040503050406030204" pitchFamily="18" charset="0"/>
-                        <a:cs typeface="Calibri" panose="020F0502020204030204" pitchFamily="34" charset="0"/>
-                      </a:rPr>
-                      <m:t>…</m:t>
-                    </m:r>
-                    <m:r>
-                      <a:rPr lang="pl-PL" sz="2400" b="0" i="1" smtClean="0">
-                        <a:latin typeface="Cambria Math" panose="02040503050406030204" pitchFamily="18" charset="0"/>
-                        <a:ea typeface="Cambria Math" panose="02040503050406030204" pitchFamily="18" charset="0"/>
-                        <a:cs typeface="Calibri" panose="020F0502020204030204" pitchFamily="34" charset="0"/>
-                      </a:rPr>
-                      <m:t>≥</m:t>
+                      <m:t>≥…≥</m:t>
                     </m:r>
                     <m:d>
                       <m:dPr>
@@ -9068,7 +9052,7 @@
             </p:txBody>
           </p:sp>
         </mc:Choice>
-        <mc:Fallback>
+        <mc:Fallback xmlns="">
           <p:sp>
             <p:nvSpPr>
               <p:cNvPr id="3" name="Symbol zastępczy zawartości 2"/>
@@ -11929,8 +11913,8 @@
           </a:p>
         </p:txBody>
       </p:sp>
-      <mc:AlternateContent xmlns:mc="http://schemas.openxmlformats.org/markup-compatibility/2006">
-        <mc:Choice xmlns:a14="http://schemas.microsoft.com/office/drawing/2010/main" Requires="a14">
+      <mc:AlternateContent xmlns:mc="http://schemas.openxmlformats.org/markup-compatibility/2006" xmlns:a14="http://schemas.microsoft.com/office/drawing/2010/main">
+        <mc:Choice Requires="a14">
           <p:sp>
             <p:nvSpPr>
               <p:cNvPr id="4" name="Symbol zastępczy zawartości 2"/>
@@ -12229,7 +12213,7 @@
             </p:txBody>
           </p:sp>
         </mc:Choice>
-        <mc:Fallback>
+        <mc:Fallback xmlns="">
           <p:sp>
             <p:nvSpPr>
               <p:cNvPr id="4" name="Symbol zastępczy zawartości 2"/>
@@ -19622,8 +19606,8 @@
           <a:chExt cx="0" cy="0"/>
         </a:xfrm>
       </p:grpSpPr>
-      <mc:AlternateContent xmlns:mc="http://schemas.openxmlformats.org/markup-compatibility/2006">
-        <mc:Choice xmlns:a14="http://schemas.microsoft.com/office/drawing/2010/main" Requires="a14">
+      <mc:AlternateContent xmlns:mc="http://schemas.openxmlformats.org/markup-compatibility/2006" xmlns:a14="http://schemas.microsoft.com/office/drawing/2010/main">
+        <mc:Choice Requires="a14">
           <p:sp>
             <p:nvSpPr>
               <p:cNvPr id="2" name="Tytuł 1"/>
@@ -19669,7 +19653,7 @@
             </p:txBody>
           </p:sp>
         </mc:Choice>
-        <mc:Fallback>
+        <mc:Fallback xmlns="">
           <p:sp>
             <p:nvSpPr>
               <p:cNvPr id="2" name="Tytuł 1"/>
@@ -19707,8 +19691,8 @@
           </p:sp>
         </mc:Fallback>
       </mc:AlternateContent>
-      <mc:AlternateContent xmlns:mc="http://schemas.openxmlformats.org/markup-compatibility/2006">
-        <mc:Choice xmlns:a14="http://schemas.microsoft.com/office/drawing/2010/main" Requires="a14">
+      <mc:AlternateContent xmlns:mc="http://schemas.openxmlformats.org/markup-compatibility/2006" xmlns:a14="http://schemas.microsoft.com/office/drawing/2010/main">
+        <mc:Choice Requires="a14">
           <p:sp>
             <p:nvSpPr>
               <p:cNvPr id="3" name="Symbol zastępczy zawartości 2"/>
@@ -19799,14 +19783,7 @@
                         <a:latin typeface="Cambria Math" panose="02040503050406030204" pitchFamily="18" charset="0"/>
                         <a:ea typeface="Cambria Math" panose="02040503050406030204" pitchFamily="18" charset="0"/>
                       </a:rPr>
-                      <m:t>≠</m:t>
-                    </m:r>
-                    <m:r>
-                      <a:rPr lang="pl-PL" sz="2400" i="1">
-                        <a:latin typeface="Cambria Math" panose="02040503050406030204" pitchFamily="18" charset="0"/>
-                        <a:ea typeface="Cambria Math" panose="02040503050406030204" pitchFamily="18" charset="0"/>
-                      </a:rPr>
-                      <m:t>0</m:t>
+                      <m:t>≠0</m:t>
                     </m:r>
                   </m:oMath>
                 </a14:m>
@@ -19981,7 +19958,7 @@
             </p:txBody>
           </p:sp>
         </mc:Choice>
-        <mc:Fallback>
+        <mc:Fallback xmlns="">
           <p:sp>
             <p:nvSpPr>
               <p:cNvPr id="3" name="Symbol zastępczy zawartości 2"/>
@@ -20061,8 +20038,8 @@
           <a:chExt cx="0" cy="0"/>
         </a:xfrm>
       </p:grpSpPr>
-      <mc:AlternateContent xmlns:mc="http://schemas.openxmlformats.org/markup-compatibility/2006">
-        <mc:Choice xmlns:a14="http://schemas.microsoft.com/office/drawing/2010/main" Requires="a14">
+      <mc:AlternateContent xmlns:mc="http://schemas.openxmlformats.org/markup-compatibility/2006" xmlns:a14="http://schemas.microsoft.com/office/drawing/2010/main">
+        <mc:Choice Requires="a14">
           <p:sp>
             <p:nvSpPr>
               <p:cNvPr id="2" name="Tytuł 1"/>
@@ -20121,7 +20098,7 @@
             </p:txBody>
           </p:sp>
         </mc:Choice>
-        <mc:Fallback>
+        <mc:Fallback xmlns="">
           <p:sp>
             <p:nvSpPr>
               <p:cNvPr id="2" name="Tytuł 1"/>
@@ -20189,8 +20166,8 @@
           </a:prstGeom>
         </p:spPr>
       </p:pic>
-      <mc:AlternateContent xmlns:mc="http://schemas.openxmlformats.org/markup-compatibility/2006">
-        <mc:Choice xmlns:a14="http://schemas.microsoft.com/office/drawing/2010/main" Requires="a14">
+      <mc:AlternateContent xmlns:mc="http://schemas.openxmlformats.org/markup-compatibility/2006" xmlns:a14="http://schemas.microsoft.com/office/drawing/2010/main">
+        <mc:Choice Requires="a14">
           <p:sp>
             <p:nvSpPr>
               <p:cNvPr id="5" name="pole tekstowe 4"/>
@@ -20263,7 +20240,7 @@
             </p:txBody>
           </p:sp>
         </mc:Choice>
-        <mc:Fallback>
+        <mc:Fallback xmlns="">
           <p:sp>
             <p:nvSpPr>
               <p:cNvPr id="5" name="pole tekstowe 4"/>
@@ -20344,1358 +20321,315 @@
           <a:chExt cx="0" cy="0"/>
         </a:xfrm>
       </p:grpSpPr>
-      <p:graphicFrame>
-        <p:nvGraphicFramePr>
-          <p:cNvPr id="3" name="Tabela 2"/>
-          <p:cNvGraphicFramePr>
-            <a:graphicFrameLocks noGrp="1"/>
-          </p:cNvGraphicFramePr>
-          <p:nvPr>
-            <p:extLst>
-              <p:ext uri="{D42A27DB-BD31-4B8C-83A1-F6EECF244321}">
-                <p14:modId xmlns:p14="http://schemas.microsoft.com/office/powerpoint/2010/main" val="445370100"/>
-              </p:ext>
-            </p:extLst>
-          </p:nvPr>
-        </p:nvGraphicFramePr>
-        <p:xfrm>
-          <a:off x="1664834" y="1556792"/>
-          <a:ext cx="8640960" cy="4248475"/>
-        </p:xfrm>
-        <a:graphic>
-          <a:graphicData uri="http://schemas.openxmlformats.org/drawingml/2006/table">
-            <a:tbl>
-              <a:tblPr firstRow="1" bandRow="1">
-                <a:tableStyleId>{073A0DAA-6AF3-43AB-8588-CEC1D06C72B9}</a:tableStyleId>
-              </a:tblPr>
-              <a:tblGrid>
-                <a:gridCol w="1440160">
-                  <a:extLst>
-                    <a:ext uri="{9D8B030D-6E8A-4147-A177-3AD203B41FA5}">
-                      <a16:colId xmlns:a16="http://schemas.microsoft.com/office/drawing/2014/main" val="1689677455"/>
-                    </a:ext>
-                  </a:extLst>
-                </a:gridCol>
-                <a:gridCol w="1440160">
-                  <a:extLst>
-                    <a:ext uri="{9D8B030D-6E8A-4147-A177-3AD203B41FA5}">
-                      <a16:colId xmlns:a16="http://schemas.microsoft.com/office/drawing/2014/main" val="3706230871"/>
-                    </a:ext>
-                  </a:extLst>
-                </a:gridCol>
-                <a:gridCol w="1440160">
-                  <a:extLst>
-                    <a:ext uri="{9D8B030D-6E8A-4147-A177-3AD203B41FA5}">
-                      <a16:colId xmlns:a16="http://schemas.microsoft.com/office/drawing/2014/main" val="2083712"/>
-                    </a:ext>
-                  </a:extLst>
-                </a:gridCol>
-                <a:gridCol w="1440160">
-                  <a:extLst>
-                    <a:ext uri="{9D8B030D-6E8A-4147-A177-3AD203B41FA5}">
-                      <a16:colId xmlns:a16="http://schemas.microsoft.com/office/drawing/2014/main" val="720074687"/>
-                    </a:ext>
-                  </a:extLst>
-                </a:gridCol>
-                <a:gridCol w="1440160">
-                  <a:extLst>
-                    <a:ext uri="{9D8B030D-6E8A-4147-A177-3AD203B41FA5}">
-                      <a16:colId xmlns:a16="http://schemas.microsoft.com/office/drawing/2014/main" val="385551074"/>
-                    </a:ext>
-                  </a:extLst>
-                </a:gridCol>
-                <a:gridCol w="1440160">
-                  <a:extLst>
-                    <a:ext uri="{9D8B030D-6E8A-4147-A177-3AD203B41FA5}">
-                      <a16:colId xmlns:a16="http://schemas.microsoft.com/office/drawing/2014/main" val="3206397737"/>
-                    </a:ext>
-                  </a:extLst>
-                </a:gridCol>
-              </a:tblGrid>
-              <a:tr h="386225">
-                <a:tc>
-                  <a:txBody>
-                    <a:bodyPr/>
-                    <a:lstStyle/>
-                    <a:p>
-                      <a:pPr algn="ctr" fontAlgn="b"/>
-                      <a:endParaRPr lang="pl-PL" sz="1100" b="1" i="0" u="none" strike="noStrike" kern="1200" dirty="0">
-                        <a:solidFill>
-                          <a:srgbClr val="FFFFFF"/>
-                        </a:solidFill>
-                        <a:effectLst/>
-                        <a:latin typeface="Calibri" panose="020F0502020204030204" pitchFamily="34" charset="0"/>
-                        <a:ea typeface="+mn-ea"/>
-                        <a:cs typeface="+mn-cs"/>
-                      </a:endParaRPr>
-                    </a:p>
-                  </a:txBody>
-                  <a:tcPr marL="7620" marR="7620" marT="7620" marB="0" anchor="ctr"/>
-                </a:tc>
-                <a:tc>
-                  <a:txBody>
-                    <a:bodyPr/>
-                    <a:lstStyle/>
-                    <a:p>
-                      <a:pPr algn="ctr" fontAlgn="b"/>
-                      <a:endParaRPr lang="pl-PL" sz="1100" b="1" i="0" u="none" strike="noStrike" dirty="0">
-                        <a:solidFill>
-                          <a:srgbClr val="FFFFFF"/>
-                        </a:solidFill>
-                        <a:effectLst/>
-                        <a:latin typeface="Calibri" panose="020F0502020204030204" pitchFamily="34" charset="0"/>
-                      </a:endParaRPr>
-                    </a:p>
-                  </a:txBody>
-                  <a:tcPr marL="7620" marR="7620" marT="7620" marB="0" anchor="ctr"/>
-                </a:tc>
-                <a:tc>
-                  <a:txBody>
-                    <a:bodyPr/>
-                    <a:lstStyle/>
-                    <a:p>
-                      <a:pPr algn="ctr" fontAlgn="b"/>
-                      <a:endParaRPr lang="pl-PL" sz="1100" b="1" i="0" u="none" strike="noStrike" dirty="0">
-                        <a:solidFill>
-                          <a:srgbClr val="FFFFFF"/>
-                        </a:solidFill>
-                        <a:effectLst/>
-                        <a:latin typeface="Calibri" panose="020F0502020204030204" pitchFamily="34" charset="0"/>
-                      </a:endParaRPr>
-                    </a:p>
-                  </a:txBody>
-                  <a:tcPr marL="7620" marR="7620" marT="7620" marB="0" anchor="ctr"/>
-                </a:tc>
-                <a:tc>
-                  <a:txBody>
-                    <a:bodyPr/>
-                    <a:lstStyle/>
-                    <a:p>
-                      <a:pPr algn="ctr" fontAlgn="b"/>
-                      <a:endParaRPr lang="pl-PL" sz="1100" b="1" i="0" u="none" strike="noStrike" dirty="0">
-                        <a:solidFill>
-                          <a:srgbClr val="FFFFFF"/>
-                        </a:solidFill>
-                        <a:effectLst/>
-                        <a:latin typeface="Calibri" panose="020F0502020204030204" pitchFamily="34" charset="0"/>
-                      </a:endParaRPr>
-                    </a:p>
-                  </a:txBody>
-                  <a:tcPr marL="7620" marR="7620" marT="7620" marB="0" anchor="ctr"/>
-                </a:tc>
-                <a:tc>
-                  <a:txBody>
-                    <a:bodyPr/>
-                    <a:lstStyle/>
-                    <a:p>
-                      <a:pPr algn="ctr" fontAlgn="b"/>
-                      <a:endParaRPr lang="pl-PL" sz="1100" b="1" i="0" u="none" strike="noStrike" dirty="0">
-                        <a:solidFill>
-                          <a:srgbClr val="FFFFFF"/>
-                        </a:solidFill>
-                        <a:effectLst/>
-                        <a:latin typeface="Calibri" panose="020F0502020204030204" pitchFamily="34" charset="0"/>
-                      </a:endParaRPr>
-                    </a:p>
-                  </a:txBody>
-                  <a:tcPr marL="7620" marR="7620" marT="7620" marB="0" anchor="ctr"/>
-                </a:tc>
-                <a:tc>
-                  <a:txBody>
-                    <a:bodyPr/>
-                    <a:lstStyle/>
-                    <a:p>
-                      <a:pPr algn="ctr" fontAlgn="b"/>
-                      <a:endParaRPr lang="pl-PL" sz="1100" b="1" i="0" u="none" strike="noStrike" dirty="0">
-                        <a:solidFill>
-                          <a:srgbClr val="FFFFFF"/>
-                        </a:solidFill>
-                        <a:effectLst/>
-                        <a:latin typeface="Calibri" panose="020F0502020204030204" pitchFamily="34" charset="0"/>
-                      </a:endParaRPr>
-                    </a:p>
-                  </a:txBody>
-                  <a:tcPr marL="7620" marR="7620" marT="7620" marB="0" anchor="ctr"/>
-                </a:tc>
-                <a:extLst>
-                  <a:ext uri="{0D108BD9-81ED-4DB2-BD59-A6C34878D82A}">
-                    <a16:rowId xmlns:a16="http://schemas.microsoft.com/office/drawing/2014/main" val="957349181"/>
-                  </a:ext>
-                </a:extLst>
-              </a:tr>
-              <a:tr h="386225">
-                <a:tc>
-                  <a:txBody>
-                    <a:bodyPr/>
-                    <a:lstStyle/>
-                    <a:p>
-                      <a:pPr algn="ctr" fontAlgn="b"/>
-                      <a:endParaRPr lang="pl-PL" sz="1100" b="1" i="0" u="none" strike="noStrike" kern="1200" dirty="0">
-                        <a:solidFill>
-                          <a:srgbClr val="FFFFFF"/>
-                        </a:solidFill>
-                        <a:effectLst/>
-                        <a:latin typeface="Calibri" panose="020F0502020204030204" pitchFamily="34" charset="0"/>
-                        <a:ea typeface="+mn-ea"/>
-                        <a:cs typeface="+mn-cs"/>
-                      </a:endParaRPr>
-                    </a:p>
-                  </a:txBody>
-                  <a:tcPr marL="7620" marR="7620" marT="7620" marB="0" anchor="ctr">
-                    <a:solidFill>
-                      <a:srgbClr val="465562"/>
-                    </a:solidFill>
-                  </a:tcPr>
-                </a:tc>
-                <a:tc>
-                  <a:txBody>
-                    <a:bodyPr/>
-                    <a:lstStyle/>
-                    <a:p>
-                      <a:pPr algn="ctr" fontAlgn="b"/>
-                      <a:r>
-                        <a:rPr lang="pl-PL" sz="1100" b="1" i="0" u="none" strike="noStrike" dirty="0">
-                          <a:solidFill>
-                            <a:srgbClr val="FFFFFF"/>
-                          </a:solidFill>
-                          <a:effectLst/>
-                          <a:latin typeface="Calibri" panose="020F0502020204030204" pitchFamily="34" charset="0"/>
-                        </a:rPr>
-                        <a:t> </a:t>
-                      </a:r>
-                    </a:p>
-                  </a:txBody>
-                  <a:tcPr marL="7620" marR="7620" marT="7620" marB="0" anchor="ctr"/>
-                </a:tc>
-                <a:tc>
-                  <a:txBody>
-                    <a:bodyPr/>
-                    <a:lstStyle/>
-                    <a:p>
-                      <a:pPr algn="ctr" fontAlgn="b"/>
-                      <a:r>
-                        <a:rPr lang="pl-PL" sz="1100" b="1" i="0" u="none" strike="noStrike">
-                          <a:solidFill>
-                            <a:srgbClr val="FFFFFF"/>
-                          </a:solidFill>
-                          <a:effectLst/>
-                          <a:latin typeface="Calibri" panose="020F0502020204030204" pitchFamily="34" charset="0"/>
-                        </a:rPr>
-                        <a:t> </a:t>
-                      </a:r>
-                    </a:p>
-                  </a:txBody>
-                  <a:tcPr marL="7620" marR="7620" marT="7620" marB="0" anchor="ctr"/>
-                </a:tc>
-                <a:tc>
-                  <a:txBody>
-                    <a:bodyPr/>
-                    <a:lstStyle/>
-                    <a:p>
-                      <a:pPr algn="ctr" fontAlgn="b"/>
-                      <a:r>
-                        <a:rPr lang="pl-PL" sz="1100" b="1" i="0" u="none" strike="noStrike">
-                          <a:solidFill>
-                            <a:srgbClr val="FFFFFF"/>
-                          </a:solidFill>
-                          <a:effectLst/>
-                          <a:latin typeface="Calibri" panose="020F0502020204030204" pitchFamily="34" charset="0"/>
-                        </a:rPr>
-                        <a:t> </a:t>
-                      </a:r>
-                    </a:p>
-                  </a:txBody>
-                  <a:tcPr marL="7620" marR="7620" marT="7620" marB="0" anchor="ctr"/>
-                </a:tc>
-                <a:tc>
-                  <a:txBody>
-                    <a:bodyPr/>
-                    <a:lstStyle/>
-                    <a:p>
-                      <a:pPr algn="ctr" fontAlgn="b"/>
-                      <a:r>
-                        <a:rPr lang="pl-PL" sz="1100" b="1" i="0" u="none" strike="noStrike">
-                          <a:solidFill>
-                            <a:srgbClr val="FFFFFF"/>
-                          </a:solidFill>
-                          <a:effectLst/>
-                          <a:latin typeface="Calibri" panose="020F0502020204030204" pitchFamily="34" charset="0"/>
-                        </a:rPr>
-                        <a:t> </a:t>
-                      </a:r>
-                    </a:p>
-                  </a:txBody>
-                  <a:tcPr marL="7620" marR="7620" marT="7620" marB="0" anchor="ctr"/>
-                </a:tc>
-                <a:tc>
-                  <a:txBody>
-                    <a:bodyPr/>
-                    <a:lstStyle/>
-                    <a:p>
-                      <a:pPr algn="ctr" fontAlgn="b"/>
-                      <a:r>
-                        <a:rPr lang="pl-PL" sz="1100" b="1" i="0" u="none" strike="noStrike">
-                          <a:solidFill>
-                            <a:srgbClr val="FFFFFF"/>
-                          </a:solidFill>
-                          <a:effectLst/>
-                          <a:latin typeface="Calibri" panose="020F0502020204030204" pitchFamily="34" charset="0"/>
-                        </a:rPr>
-                        <a:t> </a:t>
-                      </a:r>
-                    </a:p>
-                  </a:txBody>
-                  <a:tcPr marL="7620" marR="7620" marT="7620" marB="0" anchor="ctr"/>
-                </a:tc>
-                <a:extLst>
-                  <a:ext uri="{0D108BD9-81ED-4DB2-BD59-A6C34878D82A}">
-                    <a16:rowId xmlns:a16="http://schemas.microsoft.com/office/drawing/2014/main" val="725177664"/>
-                  </a:ext>
-                </a:extLst>
-              </a:tr>
-              <a:tr h="386225">
-                <a:tc>
-                  <a:txBody>
-                    <a:bodyPr/>
-                    <a:lstStyle/>
-                    <a:p>
-                      <a:pPr algn="ctr" fontAlgn="b"/>
-                      <a:endParaRPr lang="pl-PL" sz="1100" b="1" i="0" u="none" strike="noStrike" kern="1200" dirty="0">
-                        <a:solidFill>
-                          <a:srgbClr val="FFFFFF"/>
-                        </a:solidFill>
-                        <a:effectLst/>
-                        <a:latin typeface="Calibri" panose="020F0502020204030204" pitchFamily="34" charset="0"/>
-                        <a:ea typeface="+mn-ea"/>
-                        <a:cs typeface="+mn-cs"/>
-                      </a:endParaRPr>
-                    </a:p>
-                  </a:txBody>
-                  <a:tcPr marL="7620" marR="7620" marT="7620" marB="0" anchor="ctr">
-                    <a:solidFill>
-                      <a:srgbClr val="465562"/>
-                    </a:solidFill>
-                  </a:tcPr>
-                </a:tc>
-                <a:tc>
-                  <a:txBody>
-                    <a:bodyPr/>
-                    <a:lstStyle/>
-                    <a:p>
-                      <a:pPr algn="ctr" fontAlgn="b"/>
-                      <a:endParaRPr lang="pl-PL" sz="1100" b="0" i="0" u="none" strike="noStrike" dirty="0">
-                        <a:solidFill>
-                          <a:srgbClr val="000000"/>
-                        </a:solidFill>
-                        <a:effectLst/>
-                        <a:latin typeface="Calibri" panose="020F0502020204030204" pitchFamily="34" charset="0"/>
-                      </a:endParaRPr>
-                    </a:p>
-                  </a:txBody>
-                  <a:tcPr marL="7620" marR="7620" marT="7620" marB="0" anchor="ctr"/>
-                </a:tc>
-                <a:tc>
-                  <a:txBody>
-                    <a:bodyPr/>
-                    <a:lstStyle/>
-                    <a:p>
-                      <a:pPr algn="ctr" fontAlgn="b"/>
-                      <a:endParaRPr lang="pl-PL" sz="1100" b="0" i="0" u="none" strike="noStrike">
-                        <a:solidFill>
-                          <a:srgbClr val="000000"/>
-                        </a:solidFill>
-                        <a:effectLst/>
-                        <a:latin typeface="Calibri" panose="020F0502020204030204" pitchFamily="34" charset="0"/>
-                      </a:endParaRPr>
-                    </a:p>
-                  </a:txBody>
-                  <a:tcPr marL="7620" marR="7620" marT="7620" marB="0" anchor="ctr"/>
-                </a:tc>
-                <a:tc>
-                  <a:txBody>
-                    <a:bodyPr/>
-                    <a:lstStyle/>
-                    <a:p>
-                      <a:pPr algn="ctr" fontAlgn="b"/>
-                      <a:endParaRPr lang="pl-PL" sz="1100" b="0" i="0" u="none" strike="noStrike">
-                        <a:solidFill>
-                          <a:srgbClr val="000000"/>
-                        </a:solidFill>
-                        <a:effectLst/>
-                        <a:latin typeface="Calibri" panose="020F0502020204030204" pitchFamily="34" charset="0"/>
-                      </a:endParaRPr>
-                    </a:p>
-                  </a:txBody>
-                  <a:tcPr marL="7620" marR="7620" marT="7620" marB="0" anchor="ctr"/>
-                </a:tc>
-                <a:tc>
-                  <a:txBody>
-                    <a:bodyPr/>
-                    <a:lstStyle/>
-                    <a:p>
-                      <a:pPr algn="ctr" fontAlgn="b"/>
-                      <a:endParaRPr lang="pl-PL" sz="1100" b="0" i="0" u="none" strike="noStrike">
-                        <a:solidFill>
-                          <a:srgbClr val="000000"/>
-                        </a:solidFill>
-                        <a:effectLst/>
-                        <a:latin typeface="Calibri" panose="020F0502020204030204" pitchFamily="34" charset="0"/>
-                      </a:endParaRPr>
-                    </a:p>
-                  </a:txBody>
-                  <a:tcPr marL="7620" marR="7620" marT="7620" marB="0" anchor="ctr"/>
-                </a:tc>
-                <a:tc>
-                  <a:txBody>
-                    <a:bodyPr/>
-                    <a:lstStyle/>
-                    <a:p>
-                      <a:pPr algn="ctr" fontAlgn="b"/>
-                      <a:endParaRPr lang="pl-PL" sz="1100" b="0" i="0" u="none" strike="noStrike">
-                        <a:solidFill>
-                          <a:srgbClr val="000000"/>
-                        </a:solidFill>
-                        <a:effectLst/>
-                        <a:latin typeface="Calibri" panose="020F0502020204030204" pitchFamily="34" charset="0"/>
-                      </a:endParaRPr>
-                    </a:p>
-                  </a:txBody>
-                  <a:tcPr marL="7620" marR="7620" marT="7620" marB="0" anchor="ctr"/>
-                </a:tc>
-                <a:extLst>
-                  <a:ext uri="{0D108BD9-81ED-4DB2-BD59-A6C34878D82A}">
-                    <a16:rowId xmlns:a16="http://schemas.microsoft.com/office/drawing/2014/main" val="1555781981"/>
-                  </a:ext>
-                </a:extLst>
-              </a:tr>
-              <a:tr h="386225">
-                <a:tc>
-                  <a:txBody>
-                    <a:bodyPr/>
-                    <a:lstStyle/>
-                    <a:p>
-                      <a:pPr algn="ctr" fontAlgn="b"/>
-                      <a:endParaRPr lang="pl-PL" sz="1100" b="1" i="0" u="none" strike="noStrike" kern="1200" dirty="0">
-                        <a:solidFill>
-                          <a:srgbClr val="FFFFFF"/>
-                        </a:solidFill>
-                        <a:effectLst/>
-                        <a:latin typeface="Calibri" panose="020F0502020204030204" pitchFamily="34" charset="0"/>
-                        <a:ea typeface="+mn-ea"/>
-                        <a:cs typeface="+mn-cs"/>
-                      </a:endParaRPr>
-                    </a:p>
-                  </a:txBody>
-                  <a:tcPr marL="7620" marR="7620" marT="7620" marB="0" anchor="ctr">
-                    <a:solidFill>
-                      <a:srgbClr val="465562"/>
-                    </a:solidFill>
-                  </a:tcPr>
-                </a:tc>
-                <a:tc>
-                  <a:txBody>
-                    <a:bodyPr/>
-                    <a:lstStyle/>
-                    <a:p>
-                      <a:pPr algn="ctr" fontAlgn="b"/>
-                      <a:endParaRPr lang="pl-PL" sz="1100" b="0" i="0" u="none" strike="noStrike" dirty="0">
-                        <a:solidFill>
-                          <a:srgbClr val="000000"/>
-                        </a:solidFill>
-                        <a:effectLst/>
-                        <a:latin typeface="Calibri" panose="020F0502020204030204" pitchFamily="34" charset="0"/>
-                      </a:endParaRPr>
-                    </a:p>
-                  </a:txBody>
-                  <a:tcPr marL="7620" marR="7620" marT="7620" marB="0" anchor="ctr"/>
-                </a:tc>
-                <a:tc>
-                  <a:txBody>
-                    <a:bodyPr/>
-                    <a:lstStyle/>
-                    <a:p>
-                      <a:pPr algn="ctr" fontAlgn="b"/>
-                      <a:endParaRPr lang="pl-PL" sz="1100" b="0" i="0" u="none" strike="noStrike" dirty="0">
-                        <a:solidFill>
-                          <a:srgbClr val="000000"/>
-                        </a:solidFill>
-                        <a:effectLst/>
-                        <a:latin typeface="Calibri" panose="020F0502020204030204" pitchFamily="34" charset="0"/>
-                      </a:endParaRPr>
-                    </a:p>
-                  </a:txBody>
-                  <a:tcPr marL="7620" marR="7620" marT="7620" marB="0" anchor="ctr"/>
-                </a:tc>
-                <a:tc>
-                  <a:txBody>
-                    <a:bodyPr/>
-                    <a:lstStyle/>
-                    <a:p>
-                      <a:pPr algn="ctr" fontAlgn="b"/>
-                      <a:endParaRPr lang="pl-PL" sz="1100" b="0" i="0" u="none" strike="noStrike">
-                        <a:solidFill>
-                          <a:srgbClr val="000000"/>
-                        </a:solidFill>
-                        <a:effectLst/>
-                        <a:latin typeface="Calibri" panose="020F0502020204030204" pitchFamily="34" charset="0"/>
-                      </a:endParaRPr>
-                    </a:p>
-                  </a:txBody>
-                  <a:tcPr marL="7620" marR="7620" marT="7620" marB="0" anchor="ctr"/>
-                </a:tc>
-                <a:tc>
-                  <a:txBody>
-                    <a:bodyPr/>
-                    <a:lstStyle/>
-                    <a:p>
-                      <a:pPr algn="ctr" fontAlgn="b"/>
-                      <a:endParaRPr lang="pl-PL" sz="1100" b="0" i="0" u="none" strike="noStrike">
-                        <a:solidFill>
-                          <a:srgbClr val="000000"/>
-                        </a:solidFill>
-                        <a:effectLst/>
-                        <a:latin typeface="Calibri" panose="020F0502020204030204" pitchFamily="34" charset="0"/>
-                      </a:endParaRPr>
-                    </a:p>
-                  </a:txBody>
-                  <a:tcPr marL="7620" marR="7620" marT="7620" marB="0" anchor="ctr"/>
-                </a:tc>
-                <a:tc>
-                  <a:txBody>
-                    <a:bodyPr/>
-                    <a:lstStyle/>
-                    <a:p>
-                      <a:pPr algn="ctr" fontAlgn="b"/>
-                      <a:endParaRPr lang="pl-PL" sz="1100" b="0" i="0" u="none" strike="noStrike">
-                        <a:solidFill>
-                          <a:srgbClr val="000000"/>
-                        </a:solidFill>
-                        <a:effectLst/>
-                        <a:latin typeface="Calibri" panose="020F0502020204030204" pitchFamily="34" charset="0"/>
-                      </a:endParaRPr>
-                    </a:p>
-                  </a:txBody>
-                  <a:tcPr marL="7620" marR="7620" marT="7620" marB="0" anchor="ctr"/>
-                </a:tc>
-                <a:extLst>
-                  <a:ext uri="{0D108BD9-81ED-4DB2-BD59-A6C34878D82A}">
-                    <a16:rowId xmlns:a16="http://schemas.microsoft.com/office/drawing/2014/main" val="1554264070"/>
-                  </a:ext>
-                </a:extLst>
-              </a:tr>
-              <a:tr h="386225">
-                <a:tc>
-                  <a:txBody>
-                    <a:bodyPr/>
-                    <a:lstStyle/>
-                    <a:p>
-                      <a:pPr algn="ctr" fontAlgn="b"/>
-                      <a:endParaRPr lang="pl-PL" sz="1100" b="1" i="0" u="none" strike="noStrike" kern="1200" dirty="0">
-                        <a:solidFill>
-                          <a:srgbClr val="FFFFFF"/>
-                        </a:solidFill>
-                        <a:effectLst/>
-                        <a:latin typeface="Calibri" panose="020F0502020204030204" pitchFamily="34" charset="0"/>
-                        <a:ea typeface="+mn-ea"/>
-                        <a:cs typeface="+mn-cs"/>
-                      </a:endParaRPr>
-                    </a:p>
-                  </a:txBody>
-                  <a:tcPr marL="7620" marR="7620" marT="7620" marB="0" anchor="ctr">
-                    <a:solidFill>
-                      <a:srgbClr val="465562"/>
-                    </a:solidFill>
-                  </a:tcPr>
-                </a:tc>
-                <a:tc>
-                  <a:txBody>
-                    <a:bodyPr/>
-                    <a:lstStyle/>
-                    <a:p>
-                      <a:pPr algn="ctr" fontAlgn="b"/>
-                      <a:endParaRPr lang="pl-PL" sz="1100" b="0" i="0" u="none" strike="noStrike">
-                        <a:solidFill>
-                          <a:srgbClr val="000000"/>
-                        </a:solidFill>
-                        <a:effectLst/>
-                        <a:latin typeface="Calibri" panose="020F0502020204030204" pitchFamily="34" charset="0"/>
-                      </a:endParaRPr>
-                    </a:p>
-                  </a:txBody>
-                  <a:tcPr marL="7620" marR="7620" marT="7620" marB="0" anchor="ctr"/>
-                </a:tc>
-                <a:tc>
-                  <a:txBody>
-                    <a:bodyPr/>
-                    <a:lstStyle/>
-                    <a:p>
-                      <a:pPr algn="ctr" fontAlgn="b"/>
-                      <a:endParaRPr lang="pl-PL" sz="1100" b="0" i="0" u="none" strike="noStrike" dirty="0">
-                        <a:solidFill>
-                          <a:srgbClr val="000000"/>
-                        </a:solidFill>
-                        <a:effectLst/>
-                        <a:latin typeface="Calibri" panose="020F0502020204030204" pitchFamily="34" charset="0"/>
-                      </a:endParaRPr>
-                    </a:p>
-                  </a:txBody>
-                  <a:tcPr marL="7620" marR="7620" marT="7620" marB="0" anchor="ctr"/>
-                </a:tc>
-                <a:tc>
-                  <a:txBody>
-                    <a:bodyPr/>
-                    <a:lstStyle/>
-                    <a:p>
-                      <a:pPr algn="ctr" fontAlgn="b"/>
-                      <a:endParaRPr lang="pl-PL" sz="1100" b="0" i="0" u="none" strike="noStrike">
-                        <a:solidFill>
-                          <a:srgbClr val="000000"/>
-                        </a:solidFill>
-                        <a:effectLst/>
-                        <a:latin typeface="Calibri" panose="020F0502020204030204" pitchFamily="34" charset="0"/>
-                      </a:endParaRPr>
-                    </a:p>
-                  </a:txBody>
-                  <a:tcPr marL="7620" marR="7620" marT="7620" marB="0" anchor="ctr"/>
-                </a:tc>
-                <a:tc>
-                  <a:txBody>
-                    <a:bodyPr/>
-                    <a:lstStyle/>
-                    <a:p>
-                      <a:pPr algn="ctr" fontAlgn="b"/>
-                      <a:endParaRPr lang="pl-PL" sz="1100" b="0" i="0" u="none" strike="noStrike">
-                        <a:solidFill>
-                          <a:srgbClr val="000000"/>
-                        </a:solidFill>
-                        <a:effectLst/>
-                        <a:latin typeface="Calibri" panose="020F0502020204030204" pitchFamily="34" charset="0"/>
-                      </a:endParaRPr>
-                    </a:p>
-                  </a:txBody>
-                  <a:tcPr marL="7620" marR="7620" marT="7620" marB="0" anchor="ctr"/>
-                </a:tc>
-                <a:tc>
-                  <a:txBody>
-                    <a:bodyPr/>
-                    <a:lstStyle/>
-                    <a:p>
-                      <a:pPr algn="ctr" fontAlgn="b"/>
-                      <a:endParaRPr lang="pl-PL" sz="1100" b="0" i="0" u="none" strike="noStrike">
-                        <a:solidFill>
-                          <a:srgbClr val="000000"/>
-                        </a:solidFill>
-                        <a:effectLst/>
-                        <a:latin typeface="Calibri" panose="020F0502020204030204" pitchFamily="34" charset="0"/>
-                      </a:endParaRPr>
-                    </a:p>
-                  </a:txBody>
-                  <a:tcPr marL="7620" marR="7620" marT="7620" marB="0" anchor="ctr"/>
-                </a:tc>
-                <a:extLst>
-                  <a:ext uri="{0D108BD9-81ED-4DB2-BD59-A6C34878D82A}">
-                    <a16:rowId xmlns:a16="http://schemas.microsoft.com/office/drawing/2014/main" val="2752736591"/>
-                  </a:ext>
-                </a:extLst>
-              </a:tr>
-              <a:tr h="386225">
-                <a:tc>
-                  <a:txBody>
-                    <a:bodyPr/>
-                    <a:lstStyle/>
-                    <a:p>
-                      <a:pPr algn="ctr" fontAlgn="b"/>
-                      <a:endParaRPr lang="pl-PL" sz="1100" b="1" i="0" u="none" strike="noStrike" kern="1200" dirty="0">
-                        <a:solidFill>
-                          <a:srgbClr val="FFFFFF"/>
-                        </a:solidFill>
-                        <a:effectLst/>
-                        <a:latin typeface="Calibri" panose="020F0502020204030204" pitchFamily="34" charset="0"/>
-                        <a:ea typeface="+mn-ea"/>
-                        <a:cs typeface="+mn-cs"/>
-                      </a:endParaRPr>
-                    </a:p>
-                  </a:txBody>
-                  <a:tcPr marL="7620" marR="7620" marT="7620" marB="0" anchor="ctr">
-                    <a:solidFill>
-                      <a:srgbClr val="465562"/>
-                    </a:solidFill>
-                  </a:tcPr>
-                </a:tc>
-                <a:tc>
-                  <a:txBody>
-                    <a:bodyPr/>
-                    <a:lstStyle/>
-                    <a:p>
-                      <a:pPr algn="ctr" fontAlgn="b"/>
-                      <a:endParaRPr lang="pl-PL" sz="1100" b="0" i="0" u="none" strike="noStrike">
-                        <a:solidFill>
-                          <a:srgbClr val="000000"/>
-                        </a:solidFill>
-                        <a:effectLst/>
-                        <a:latin typeface="Calibri" panose="020F0502020204030204" pitchFamily="34" charset="0"/>
-                      </a:endParaRPr>
-                    </a:p>
-                  </a:txBody>
-                  <a:tcPr marL="7620" marR="7620" marT="7620" marB="0" anchor="ctr"/>
-                </a:tc>
-                <a:tc>
-                  <a:txBody>
-                    <a:bodyPr/>
-                    <a:lstStyle/>
-                    <a:p>
-                      <a:pPr algn="ctr" fontAlgn="b"/>
-                      <a:endParaRPr lang="pl-PL" sz="1100" b="0" i="0" u="none" strike="noStrike" dirty="0">
-                        <a:solidFill>
-                          <a:srgbClr val="000000"/>
-                        </a:solidFill>
-                        <a:effectLst/>
-                        <a:latin typeface="Calibri" panose="020F0502020204030204" pitchFamily="34" charset="0"/>
-                      </a:endParaRPr>
-                    </a:p>
-                  </a:txBody>
-                  <a:tcPr marL="7620" marR="7620" marT="7620" marB="0" anchor="ctr"/>
-                </a:tc>
-                <a:tc>
-                  <a:txBody>
-                    <a:bodyPr/>
-                    <a:lstStyle/>
-                    <a:p>
-                      <a:pPr algn="ctr" fontAlgn="b"/>
-                      <a:endParaRPr lang="pl-PL" sz="1100" b="0" i="0" u="none" strike="noStrike" dirty="0">
-                        <a:solidFill>
-                          <a:srgbClr val="000000"/>
-                        </a:solidFill>
-                        <a:effectLst/>
-                        <a:latin typeface="Calibri" panose="020F0502020204030204" pitchFamily="34" charset="0"/>
-                      </a:endParaRPr>
-                    </a:p>
-                  </a:txBody>
-                  <a:tcPr marL="7620" marR="7620" marT="7620" marB="0" anchor="ctr"/>
-                </a:tc>
-                <a:tc>
-                  <a:txBody>
-                    <a:bodyPr/>
-                    <a:lstStyle/>
-                    <a:p>
-                      <a:pPr algn="ctr" fontAlgn="b"/>
-                      <a:endParaRPr lang="pl-PL" sz="1100" b="0" i="0" u="none" strike="noStrike">
-                        <a:solidFill>
-                          <a:srgbClr val="000000"/>
-                        </a:solidFill>
-                        <a:effectLst/>
-                        <a:latin typeface="Calibri" panose="020F0502020204030204" pitchFamily="34" charset="0"/>
-                      </a:endParaRPr>
-                    </a:p>
-                  </a:txBody>
-                  <a:tcPr marL="7620" marR="7620" marT="7620" marB="0" anchor="ctr"/>
-                </a:tc>
-                <a:tc>
-                  <a:txBody>
-                    <a:bodyPr/>
-                    <a:lstStyle/>
-                    <a:p>
-                      <a:pPr algn="ctr" fontAlgn="b"/>
-                      <a:endParaRPr lang="pl-PL" sz="1100" b="0" i="0" u="none" strike="noStrike">
-                        <a:solidFill>
-                          <a:srgbClr val="000000"/>
-                        </a:solidFill>
-                        <a:effectLst/>
-                        <a:latin typeface="Calibri" panose="020F0502020204030204" pitchFamily="34" charset="0"/>
-                      </a:endParaRPr>
-                    </a:p>
-                  </a:txBody>
-                  <a:tcPr marL="7620" marR="7620" marT="7620" marB="0" anchor="ctr"/>
-                </a:tc>
-                <a:extLst>
-                  <a:ext uri="{0D108BD9-81ED-4DB2-BD59-A6C34878D82A}">
-                    <a16:rowId xmlns:a16="http://schemas.microsoft.com/office/drawing/2014/main" val="3527259146"/>
-                  </a:ext>
-                </a:extLst>
-              </a:tr>
-              <a:tr h="386225">
-                <a:tc>
-                  <a:txBody>
-                    <a:bodyPr/>
-                    <a:lstStyle/>
-                    <a:p>
-                      <a:pPr algn="ctr" fontAlgn="b"/>
-                      <a:endParaRPr lang="pl-PL" sz="1100" b="1" i="0" u="none" strike="noStrike" kern="1200" dirty="0">
-                        <a:solidFill>
-                          <a:srgbClr val="FFFFFF"/>
-                        </a:solidFill>
-                        <a:effectLst/>
-                        <a:latin typeface="Calibri" panose="020F0502020204030204" pitchFamily="34" charset="0"/>
-                        <a:ea typeface="+mn-ea"/>
-                        <a:cs typeface="+mn-cs"/>
-                      </a:endParaRPr>
-                    </a:p>
-                  </a:txBody>
-                  <a:tcPr marL="7620" marR="7620" marT="7620" marB="0" anchor="ctr">
-                    <a:solidFill>
-                      <a:srgbClr val="465562"/>
-                    </a:solidFill>
-                  </a:tcPr>
-                </a:tc>
-                <a:tc>
-                  <a:txBody>
-                    <a:bodyPr/>
-                    <a:lstStyle/>
-                    <a:p>
-                      <a:pPr algn="ctr" fontAlgn="b"/>
-                      <a:endParaRPr lang="pl-PL" sz="1100" b="0" i="0" u="none" strike="noStrike">
-                        <a:solidFill>
-                          <a:srgbClr val="000000"/>
-                        </a:solidFill>
-                        <a:effectLst/>
-                        <a:latin typeface="Calibri" panose="020F0502020204030204" pitchFamily="34" charset="0"/>
-                      </a:endParaRPr>
-                    </a:p>
-                  </a:txBody>
-                  <a:tcPr marL="7620" marR="7620" marT="7620" marB="0" anchor="ctr"/>
-                </a:tc>
-                <a:tc>
-                  <a:txBody>
-                    <a:bodyPr/>
-                    <a:lstStyle/>
-                    <a:p>
-                      <a:pPr algn="ctr" fontAlgn="b"/>
-                      <a:endParaRPr lang="pl-PL" sz="1100" b="0" i="0" u="none" strike="noStrike">
-                        <a:solidFill>
-                          <a:srgbClr val="000000"/>
-                        </a:solidFill>
-                        <a:effectLst/>
-                        <a:latin typeface="Calibri" panose="020F0502020204030204" pitchFamily="34" charset="0"/>
-                      </a:endParaRPr>
-                    </a:p>
-                  </a:txBody>
-                  <a:tcPr marL="7620" marR="7620" marT="7620" marB="0" anchor="ctr"/>
-                </a:tc>
-                <a:tc>
-                  <a:txBody>
-                    <a:bodyPr/>
-                    <a:lstStyle/>
-                    <a:p>
-                      <a:pPr algn="ctr" fontAlgn="b"/>
-                      <a:endParaRPr lang="pl-PL" sz="1100" b="0" i="0" u="none" strike="noStrike" dirty="0">
-                        <a:solidFill>
-                          <a:srgbClr val="000000"/>
-                        </a:solidFill>
-                        <a:effectLst/>
-                        <a:latin typeface="Calibri" panose="020F0502020204030204" pitchFamily="34" charset="0"/>
-                      </a:endParaRPr>
-                    </a:p>
-                  </a:txBody>
-                  <a:tcPr marL="7620" marR="7620" marT="7620" marB="0" anchor="ctr"/>
-                </a:tc>
-                <a:tc>
-                  <a:txBody>
-                    <a:bodyPr/>
-                    <a:lstStyle/>
-                    <a:p>
-                      <a:pPr algn="ctr" fontAlgn="b"/>
-                      <a:endParaRPr lang="pl-PL" sz="1100" b="0" i="0" u="none" strike="noStrike">
-                        <a:solidFill>
-                          <a:srgbClr val="000000"/>
-                        </a:solidFill>
-                        <a:effectLst/>
-                        <a:latin typeface="Calibri" panose="020F0502020204030204" pitchFamily="34" charset="0"/>
-                      </a:endParaRPr>
-                    </a:p>
-                  </a:txBody>
-                  <a:tcPr marL="7620" marR="7620" marT="7620" marB="0" anchor="ctr"/>
-                </a:tc>
-                <a:tc>
-                  <a:txBody>
-                    <a:bodyPr/>
-                    <a:lstStyle/>
-                    <a:p>
-                      <a:pPr algn="ctr" fontAlgn="b"/>
-                      <a:endParaRPr lang="pl-PL" sz="1100" b="0" i="0" u="none" strike="noStrike">
-                        <a:solidFill>
-                          <a:srgbClr val="000000"/>
-                        </a:solidFill>
-                        <a:effectLst/>
-                        <a:latin typeface="Calibri" panose="020F0502020204030204" pitchFamily="34" charset="0"/>
-                      </a:endParaRPr>
-                    </a:p>
-                  </a:txBody>
-                  <a:tcPr marL="7620" marR="7620" marT="7620" marB="0" anchor="ctr"/>
-                </a:tc>
-                <a:extLst>
-                  <a:ext uri="{0D108BD9-81ED-4DB2-BD59-A6C34878D82A}">
-                    <a16:rowId xmlns:a16="http://schemas.microsoft.com/office/drawing/2014/main" val="3017313893"/>
-                  </a:ext>
-                </a:extLst>
-              </a:tr>
-              <a:tr h="386225">
-                <a:tc>
-                  <a:txBody>
-                    <a:bodyPr/>
-                    <a:lstStyle/>
-                    <a:p>
-                      <a:pPr algn="ctr" fontAlgn="b"/>
-                      <a:endParaRPr lang="pl-PL" sz="1100" b="1" i="0" u="none" strike="noStrike" kern="1200" dirty="0">
-                        <a:solidFill>
-                          <a:srgbClr val="FFFFFF"/>
-                        </a:solidFill>
-                        <a:effectLst/>
-                        <a:latin typeface="Calibri" panose="020F0502020204030204" pitchFamily="34" charset="0"/>
-                        <a:ea typeface="+mn-ea"/>
-                        <a:cs typeface="+mn-cs"/>
-                      </a:endParaRPr>
-                    </a:p>
-                  </a:txBody>
-                  <a:tcPr marL="7620" marR="7620" marT="7620" marB="0" anchor="ctr">
-                    <a:solidFill>
-                      <a:srgbClr val="465562"/>
-                    </a:solidFill>
-                  </a:tcPr>
-                </a:tc>
-                <a:tc>
-                  <a:txBody>
-                    <a:bodyPr/>
-                    <a:lstStyle/>
-                    <a:p>
-                      <a:pPr algn="ctr" fontAlgn="b"/>
-                      <a:endParaRPr lang="pl-PL" sz="1100" b="0" i="0" u="none" strike="noStrike">
-                        <a:solidFill>
-                          <a:srgbClr val="000000"/>
-                        </a:solidFill>
-                        <a:effectLst/>
-                        <a:latin typeface="Calibri" panose="020F0502020204030204" pitchFamily="34" charset="0"/>
-                      </a:endParaRPr>
-                    </a:p>
-                  </a:txBody>
-                  <a:tcPr marL="7620" marR="7620" marT="7620" marB="0" anchor="ctr"/>
-                </a:tc>
-                <a:tc>
-                  <a:txBody>
-                    <a:bodyPr/>
-                    <a:lstStyle/>
-                    <a:p>
-                      <a:pPr algn="ctr" fontAlgn="b"/>
-                      <a:endParaRPr lang="pl-PL" sz="1100" b="0" i="0" u="none" strike="noStrike">
-                        <a:solidFill>
-                          <a:srgbClr val="000000"/>
-                        </a:solidFill>
-                        <a:effectLst/>
-                        <a:latin typeface="Calibri" panose="020F0502020204030204" pitchFamily="34" charset="0"/>
-                      </a:endParaRPr>
-                    </a:p>
-                  </a:txBody>
-                  <a:tcPr marL="7620" marR="7620" marT="7620" marB="0" anchor="ctr"/>
-                </a:tc>
-                <a:tc>
-                  <a:txBody>
-                    <a:bodyPr/>
-                    <a:lstStyle/>
-                    <a:p>
-                      <a:pPr algn="ctr" fontAlgn="b"/>
-                      <a:endParaRPr lang="pl-PL" sz="1100" b="0" i="0" u="none" strike="noStrike" dirty="0">
-                        <a:solidFill>
-                          <a:srgbClr val="000000"/>
-                        </a:solidFill>
-                        <a:effectLst/>
-                        <a:latin typeface="Calibri" panose="020F0502020204030204" pitchFamily="34" charset="0"/>
-                      </a:endParaRPr>
-                    </a:p>
-                  </a:txBody>
-                  <a:tcPr marL="7620" marR="7620" marT="7620" marB="0" anchor="ctr"/>
-                </a:tc>
-                <a:tc>
-                  <a:txBody>
-                    <a:bodyPr/>
-                    <a:lstStyle/>
-                    <a:p>
-                      <a:pPr algn="ctr" fontAlgn="b"/>
-                      <a:endParaRPr lang="pl-PL" sz="1100" b="0" i="0" u="none" strike="noStrike" dirty="0">
-                        <a:solidFill>
-                          <a:srgbClr val="000000"/>
-                        </a:solidFill>
-                        <a:effectLst/>
-                        <a:latin typeface="Calibri" panose="020F0502020204030204" pitchFamily="34" charset="0"/>
-                      </a:endParaRPr>
-                    </a:p>
-                  </a:txBody>
-                  <a:tcPr marL="7620" marR="7620" marT="7620" marB="0" anchor="ctr"/>
-                </a:tc>
-                <a:tc>
-                  <a:txBody>
-                    <a:bodyPr/>
-                    <a:lstStyle/>
-                    <a:p>
-                      <a:pPr algn="ctr" fontAlgn="b"/>
-                      <a:endParaRPr lang="pl-PL" sz="1100" b="0" i="0" u="none" strike="noStrike">
-                        <a:solidFill>
-                          <a:srgbClr val="000000"/>
-                        </a:solidFill>
-                        <a:effectLst/>
-                        <a:latin typeface="Calibri" panose="020F0502020204030204" pitchFamily="34" charset="0"/>
-                      </a:endParaRPr>
-                    </a:p>
-                  </a:txBody>
-                  <a:tcPr marL="7620" marR="7620" marT="7620" marB="0" anchor="ctr"/>
-                </a:tc>
-                <a:extLst>
-                  <a:ext uri="{0D108BD9-81ED-4DB2-BD59-A6C34878D82A}">
-                    <a16:rowId xmlns:a16="http://schemas.microsoft.com/office/drawing/2014/main" val="331709468"/>
-                  </a:ext>
-                </a:extLst>
-              </a:tr>
-              <a:tr h="386225">
-                <a:tc>
-                  <a:txBody>
-                    <a:bodyPr/>
-                    <a:lstStyle/>
-                    <a:p>
-                      <a:pPr algn="ctr" fontAlgn="b"/>
-                      <a:endParaRPr lang="pl-PL" sz="1100" b="1" i="0" u="none" strike="noStrike" kern="1200" dirty="0">
-                        <a:solidFill>
-                          <a:srgbClr val="FFFFFF"/>
-                        </a:solidFill>
-                        <a:effectLst/>
-                        <a:latin typeface="Calibri" panose="020F0502020204030204" pitchFamily="34" charset="0"/>
-                        <a:ea typeface="+mn-ea"/>
-                        <a:cs typeface="+mn-cs"/>
-                      </a:endParaRPr>
-                    </a:p>
-                  </a:txBody>
-                  <a:tcPr marL="7620" marR="7620" marT="7620" marB="0" anchor="ctr">
-                    <a:solidFill>
-                      <a:srgbClr val="465562"/>
-                    </a:solidFill>
-                  </a:tcPr>
-                </a:tc>
-                <a:tc>
-                  <a:txBody>
-                    <a:bodyPr/>
-                    <a:lstStyle/>
-                    <a:p>
-                      <a:pPr algn="ctr" fontAlgn="b"/>
-                      <a:endParaRPr lang="pl-PL" sz="1100" b="0" i="0" u="none" strike="noStrike">
-                        <a:solidFill>
-                          <a:srgbClr val="000000"/>
-                        </a:solidFill>
-                        <a:effectLst/>
-                        <a:latin typeface="Calibri" panose="020F0502020204030204" pitchFamily="34" charset="0"/>
-                      </a:endParaRPr>
-                    </a:p>
-                  </a:txBody>
-                  <a:tcPr marL="7620" marR="7620" marT="7620" marB="0" anchor="ctr"/>
-                </a:tc>
-                <a:tc>
-                  <a:txBody>
-                    <a:bodyPr/>
-                    <a:lstStyle/>
-                    <a:p>
-                      <a:pPr algn="ctr" fontAlgn="b"/>
-                      <a:endParaRPr lang="pl-PL" sz="1100" b="0" i="0" u="none" strike="noStrike" dirty="0">
-                        <a:solidFill>
-                          <a:srgbClr val="000000"/>
-                        </a:solidFill>
-                        <a:effectLst/>
-                        <a:latin typeface="Calibri" panose="020F0502020204030204" pitchFamily="34" charset="0"/>
-                      </a:endParaRPr>
-                    </a:p>
-                  </a:txBody>
-                  <a:tcPr marL="7620" marR="7620" marT="7620" marB="0" anchor="ctr"/>
-                </a:tc>
-                <a:tc>
-                  <a:txBody>
-                    <a:bodyPr/>
-                    <a:lstStyle/>
-                    <a:p>
-                      <a:pPr algn="ctr" fontAlgn="b"/>
-                      <a:endParaRPr lang="pl-PL" sz="1100" b="0" i="0" u="none" strike="noStrike">
-                        <a:solidFill>
-                          <a:srgbClr val="000000"/>
-                        </a:solidFill>
-                        <a:effectLst/>
-                        <a:latin typeface="Calibri" panose="020F0502020204030204" pitchFamily="34" charset="0"/>
-                      </a:endParaRPr>
-                    </a:p>
-                  </a:txBody>
-                  <a:tcPr marL="7620" marR="7620" marT="7620" marB="0" anchor="ctr"/>
-                </a:tc>
-                <a:tc>
-                  <a:txBody>
-                    <a:bodyPr/>
-                    <a:lstStyle/>
-                    <a:p>
-                      <a:pPr algn="ctr" fontAlgn="b"/>
-                      <a:endParaRPr lang="pl-PL" sz="1100" b="0" i="0" u="none" strike="noStrike" dirty="0">
-                        <a:solidFill>
-                          <a:srgbClr val="000000"/>
-                        </a:solidFill>
-                        <a:effectLst/>
-                        <a:latin typeface="Calibri" panose="020F0502020204030204" pitchFamily="34" charset="0"/>
-                      </a:endParaRPr>
-                    </a:p>
-                  </a:txBody>
-                  <a:tcPr marL="7620" marR="7620" marT="7620" marB="0" anchor="ctr"/>
-                </a:tc>
-                <a:tc>
-                  <a:txBody>
-                    <a:bodyPr/>
-                    <a:lstStyle/>
-                    <a:p>
-                      <a:pPr algn="ctr" fontAlgn="b"/>
-                      <a:endParaRPr lang="pl-PL" sz="1100" b="0" i="0" u="none" strike="noStrike" dirty="0">
-                        <a:solidFill>
-                          <a:srgbClr val="000000"/>
-                        </a:solidFill>
-                        <a:effectLst/>
-                        <a:latin typeface="Calibri" panose="020F0502020204030204" pitchFamily="34" charset="0"/>
-                      </a:endParaRPr>
-                    </a:p>
-                  </a:txBody>
-                  <a:tcPr marL="7620" marR="7620" marT="7620" marB="0" anchor="ctr"/>
-                </a:tc>
-                <a:extLst>
-                  <a:ext uri="{0D108BD9-81ED-4DB2-BD59-A6C34878D82A}">
-                    <a16:rowId xmlns:a16="http://schemas.microsoft.com/office/drawing/2014/main" val="221627533"/>
-                  </a:ext>
-                </a:extLst>
-              </a:tr>
-              <a:tr h="386225">
-                <a:tc>
-                  <a:txBody>
-                    <a:bodyPr/>
-                    <a:lstStyle/>
-                    <a:p>
-                      <a:pPr algn="ctr" fontAlgn="b"/>
-                      <a:endParaRPr lang="pl-PL" sz="1100" b="1" i="0" u="none" strike="noStrike" kern="1200" dirty="0">
-                        <a:solidFill>
-                          <a:srgbClr val="FFFFFF"/>
-                        </a:solidFill>
-                        <a:effectLst/>
-                        <a:latin typeface="Calibri" panose="020F0502020204030204" pitchFamily="34" charset="0"/>
-                        <a:ea typeface="+mn-ea"/>
-                        <a:cs typeface="+mn-cs"/>
-                      </a:endParaRPr>
-                    </a:p>
-                  </a:txBody>
-                  <a:tcPr marL="7620" marR="7620" marT="7620" marB="0" anchor="ctr">
-                    <a:solidFill>
-                      <a:srgbClr val="465562"/>
-                    </a:solidFill>
-                  </a:tcPr>
-                </a:tc>
-                <a:tc>
-                  <a:txBody>
-                    <a:bodyPr/>
-                    <a:lstStyle/>
-                    <a:p>
-                      <a:pPr algn="ctr" fontAlgn="b"/>
-                      <a:endParaRPr lang="pl-PL" sz="1100" b="0" i="0" u="none" strike="noStrike">
-                        <a:solidFill>
-                          <a:srgbClr val="000000"/>
-                        </a:solidFill>
-                        <a:effectLst/>
-                        <a:latin typeface="Calibri" panose="020F0502020204030204" pitchFamily="34" charset="0"/>
-                      </a:endParaRPr>
-                    </a:p>
-                  </a:txBody>
-                  <a:tcPr marL="7620" marR="7620" marT="7620" marB="0" anchor="ctr"/>
-                </a:tc>
-                <a:tc>
-                  <a:txBody>
-                    <a:bodyPr/>
-                    <a:lstStyle/>
-                    <a:p>
-                      <a:pPr algn="ctr" fontAlgn="b"/>
-                      <a:endParaRPr lang="pl-PL" sz="1100" b="0" i="0" u="none" strike="noStrike">
-                        <a:solidFill>
-                          <a:srgbClr val="000000"/>
-                        </a:solidFill>
-                        <a:effectLst/>
-                        <a:latin typeface="Calibri" panose="020F0502020204030204" pitchFamily="34" charset="0"/>
-                      </a:endParaRPr>
-                    </a:p>
-                  </a:txBody>
-                  <a:tcPr marL="7620" marR="7620" marT="7620" marB="0" anchor="ctr"/>
-                </a:tc>
-                <a:tc>
-                  <a:txBody>
-                    <a:bodyPr/>
-                    <a:lstStyle/>
-                    <a:p>
-                      <a:pPr algn="ctr" fontAlgn="b"/>
-                      <a:endParaRPr lang="pl-PL" sz="1100" b="0" i="0" u="none" strike="noStrike">
-                        <a:solidFill>
-                          <a:srgbClr val="000000"/>
-                        </a:solidFill>
-                        <a:effectLst/>
-                        <a:latin typeface="Calibri" panose="020F0502020204030204" pitchFamily="34" charset="0"/>
-                      </a:endParaRPr>
-                    </a:p>
-                  </a:txBody>
-                  <a:tcPr marL="7620" marR="7620" marT="7620" marB="0" anchor="ctr"/>
-                </a:tc>
-                <a:tc>
-                  <a:txBody>
-                    <a:bodyPr/>
-                    <a:lstStyle/>
-                    <a:p>
-                      <a:pPr algn="ctr" fontAlgn="b"/>
-                      <a:endParaRPr lang="pl-PL" sz="1100" b="0" i="0" u="none" strike="noStrike">
-                        <a:solidFill>
-                          <a:srgbClr val="000000"/>
-                        </a:solidFill>
-                        <a:effectLst/>
-                        <a:latin typeface="Calibri" panose="020F0502020204030204" pitchFamily="34" charset="0"/>
-                      </a:endParaRPr>
-                    </a:p>
-                  </a:txBody>
-                  <a:tcPr marL="7620" marR="7620" marT="7620" marB="0" anchor="ctr"/>
-                </a:tc>
-                <a:tc>
-                  <a:txBody>
-                    <a:bodyPr/>
-                    <a:lstStyle/>
-                    <a:p>
-                      <a:pPr algn="ctr" fontAlgn="b"/>
-                      <a:endParaRPr lang="pl-PL" sz="1100" b="0" i="0" u="none" strike="noStrike" dirty="0">
-                        <a:solidFill>
-                          <a:srgbClr val="000000"/>
-                        </a:solidFill>
-                        <a:effectLst/>
-                        <a:latin typeface="Calibri" panose="020F0502020204030204" pitchFamily="34" charset="0"/>
-                      </a:endParaRPr>
-                    </a:p>
-                  </a:txBody>
-                  <a:tcPr marL="7620" marR="7620" marT="7620" marB="0" anchor="ctr"/>
-                </a:tc>
-                <a:extLst>
-                  <a:ext uri="{0D108BD9-81ED-4DB2-BD59-A6C34878D82A}">
-                    <a16:rowId xmlns:a16="http://schemas.microsoft.com/office/drawing/2014/main" val="1451166360"/>
-                  </a:ext>
-                </a:extLst>
-              </a:tr>
-              <a:tr h="386225">
-                <a:tc>
-                  <a:txBody>
-                    <a:bodyPr/>
-                    <a:lstStyle/>
-                    <a:p>
-                      <a:pPr algn="ctr" fontAlgn="b"/>
-                      <a:endParaRPr lang="pl-PL" sz="1100" b="1" i="0" u="none" strike="noStrike" kern="1200" dirty="0">
-                        <a:solidFill>
-                          <a:srgbClr val="FFFFFF"/>
-                        </a:solidFill>
-                        <a:effectLst/>
-                        <a:latin typeface="Calibri" panose="020F0502020204030204" pitchFamily="34" charset="0"/>
-                        <a:ea typeface="+mn-ea"/>
-                        <a:cs typeface="+mn-cs"/>
-                      </a:endParaRPr>
-                    </a:p>
-                  </a:txBody>
-                  <a:tcPr marL="7620" marR="7620" marT="7620" marB="0" anchor="ctr">
-                    <a:solidFill>
-                      <a:srgbClr val="465562"/>
-                    </a:solidFill>
-                  </a:tcPr>
-                </a:tc>
-                <a:tc>
-                  <a:txBody>
-                    <a:bodyPr/>
-                    <a:lstStyle/>
-                    <a:p>
-                      <a:pPr algn="ctr" fontAlgn="b"/>
-                      <a:endParaRPr lang="pl-PL" sz="1100" b="0" i="0" u="none" strike="noStrike">
-                        <a:solidFill>
-                          <a:srgbClr val="000000"/>
-                        </a:solidFill>
-                        <a:effectLst/>
-                        <a:latin typeface="Calibri" panose="020F0502020204030204" pitchFamily="34" charset="0"/>
-                      </a:endParaRPr>
-                    </a:p>
-                  </a:txBody>
-                  <a:tcPr marL="7620" marR="7620" marT="7620" marB="0" anchor="ctr"/>
-                </a:tc>
-                <a:tc>
-                  <a:txBody>
-                    <a:bodyPr/>
-                    <a:lstStyle/>
-                    <a:p>
-                      <a:pPr algn="ctr" fontAlgn="b"/>
-                      <a:endParaRPr lang="pl-PL" sz="1100" b="0" i="0" u="none" strike="noStrike" dirty="0">
-                        <a:solidFill>
-                          <a:srgbClr val="000000"/>
-                        </a:solidFill>
-                        <a:effectLst/>
-                        <a:latin typeface="Calibri" panose="020F0502020204030204" pitchFamily="34" charset="0"/>
-                      </a:endParaRPr>
-                    </a:p>
-                  </a:txBody>
-                  <a:tcPr marL="7620" marR="7620" marT="7620" marB="0" anchor="ctr"/>
-                </a:tc>
-                <a:tc>
-                  <a:txBody>
-                    <a:bodyPr/>
-                    <a:lstStyle/>
-                    <a:p>
-                      <a:pPr algn="ctr" fontAlgn="b"/>
-                      <a:endParaRPr lang="pl-PL" sz="1100" b="0" i="0" u="none" strike="noStrike">
-                        <a:solidFill>
-                          <a:srgbClr val="000000"/>
-                        </a:solidFill>
-                        <a:effectLst/>
-                        <a:latin typeface="Calibri" panose="020F0502020204030204" pitchFamily="34" charset="0"/>
-                      </a:endParaRPr>
-                    </a:p>
-                  </a:txBody>
-                  <a:tcPr marL="7620" marR="7620" marT="7620" marB="0" anchor="ctr"/>
-                </a:tc>
-                <a:tc>
-                  <a:txBody>
-                    <a:bodyPr/>
-                    <a:lstStyle/>
-                    <a:p>
-                      <a:pPr algn="ctr" fontAlgn="b"/>
-                      <a:endParaRPr lang="pl-PL" sz="1100" b="0" i="0" u="none" strike="noStrike">
-                        <a:solidFill>
-                          <a:srgbClr val="000000"/>
-                        </a:solidFill>
-                        <a:effectLst/>
-                        <a:latin typeface="Calibri" panose="020F0502020204030204" pitchFamily="34" charset="0"/>
-                      </a:endParaRPr>
-                    </a:p>
-                  </a:txBody>
-                  <a:tcPr marL="7620" marR="7620" marT="7620" marB="0" anchor="ctr"/>
-                </a:tc>
-                <a:tc>
-                  <a:txBody>
-                    <a:bodyPr/>
-                    <a:lstStyle/>
-                    <a:p>
-                      <a:pPr algn="ctr" fontAlgn="b"/>
-                      <a:endParaRPr lang="pl-PL" sz="1100" b="0" i="0" u="none" strike="noStrike" dirty="0">
-                        <a:solidFill>
-                          <a:srgbClr val="000000"/>
-                        </a:solidFill>
-                        <a:effectLst/>
-                        <a:latin typeface="Calibri" panose="020F0502020204030204" pitchFamily="34" charset="0"/>
-                      </a:endParaRPr>
-                    </a:p>
-                  </a:txBody>
-                  <a:tcPr marL="7620" marR="7620" marT="7620" marB="0" anchor="ctr"/>
-                </a:tc>
-                <a:extLst>
-                  <a:ext uri="{0D108BD9-81ED-4DB2-BD59-A6C34878D82A}">
-                    <a16:rowId xmlns:a16="http://schemas.microsoft.com/office/drawing/2014/main" val="141809059"/>
-                  </a:ext>
-                </a:extLst>
-              </a:tr>
-            </a:tbl>
-          </a:graphicData>
-        </a:graphic>
-      </p:graphicFrame>
+      <mc:AlternateContent xmlns:mc="http://schemas.openxmlformats.org/markup-compatibility/2006">
+        <mc:Choice xmlns:a14="http://schemas.microsoft.com/office/drawing/2010/main" Requires="a14">
+          <p:sp>
+            <p:nvSpPr>
+              <p:cNvPr id="2" name="Tytuł 1"/>
+              <p:cNvSpPr>
+                <a:spLocks noGrp="1"/>
+              </p:cNvSpPr>
+              <p:nvPr>
+                <p:ph type="title"/>
+              </p:nvPr>
+            </p:nvSpPr>
+            <p:spPr>
+              <a:xfrm>
+                <a:off x="1593436" y="764704"/>
+                <a:ext cx="10045592" cy="508917"/>
+              </a:xfrm>
+            </p:spPr>
+            <p:txBody>
+              <a:bodyPr>
+                <a:normAutofit/>
+              </a:bodyPr>
+              <a:lstStyle/>
+              <a:p>
+                <a:r>
+                  <a:rPr lang="pl-PL" sz="2400" dirty="0" smtClean="0"/>
+                  <a:t>Porównanie dokładności rozwiązań poprzez obliczanie normy </a:t>
+                </a:r>
+                <a14:m>
+                  <m:oMath xmlns:m="http://schemas.openxmlformats.org/officeDocument/2006/math">
+                    <m:d>
+                      <m:dPr>
+                        <m:begChr m:val="‖"/>
+                        <m:endChr m:val="‖"/>
+                        <m:ctrlPr>
+                          <a:rPr lang="pl-PL" sz="2400" i="1" smtClean="0">
+                            <a:latin typeface="Cambria Math" panose="02040503050406030204" pitchFamily="18" charset="0"/>
+                          </a:rPr>
+                        </m:ctrlPr>
+                      </m:dPr>
+                      <m:e>
+                        <m:r>
+                          <a:rPr lang="pl-PL" sz="2400" b="0" i="1" smtClean="0">
+                            <a:latin typeface="Cambria Math" panose="02040503050406030204" pitchFamily="18" charset="0"/>
+                          </a:rPr>
+                          <m:t>𝐴𝑥</m:t>
+                        </m:r>
+                        <m:r>
+                          <a:rPr lang="pl-PL" sz="2400" b="0" i="1" smtClean="0">
+                            <a:latin typeface="Cambria Math" panose="02040503050406030204" pitchFamily="18" charset="0"/>
+                          </a:rPr>
+                          <m:t>−</m:t>
+                        </m:r>
+                        <m:r>
+                          <a:rPr lang="pl-PL" sz="2400" b="0" i="1" smtClean="0">
+                            <a:latin typeface="Cambria Math" panose="02040503050406030204" pitchFamily="18" charset="0"/>
+                          </a:rPr>
+                          <m:t>𝑏</m:t>
+                        </m:r>
+                      </m:e>
+                    </m:d>
+                  </m:oMath>
+                </a14:m>
+                <a:r>
+                  <a:rPr lang="pl-PL" sz="2400" dirty="0" smtClean="0"/>
+                  <a:t>:</a:t>
+                </a:r>
+                <a:endParaRPr lang="pl-PL" sz="2400" dirty="0"/>
+              </a:p>
+            </p:txBody>
+          </p:sp>
+        </mc:Choice>
+        <mc:Fallback>
+          <p:sp>
+            <p:nvSpPr>
+              <p:cNvPr id="2" name="Tytuł 1"/>
+              <p:cNvSpPr>
+                <a:spLocks noGrp="1" noRot="1" noChangeAspect="1" noMove="1" noResize="1" noEditPoints="1" noAdjustHandles="1" noChangeArrowheads="1" noChangeShapeType="1" noTextEdit="1"/>
+              </p:cNvSpPr>
+              <p:nvPr>
+                <p:ph type="title"/>
+              </p:nvPr>
+            </p:nvSpPr>
+            <p:spPr>
+              <a:xfrm>
+                <a:off x="1593436" y="764704"/>
+                <a:ext cx="10045592" cy="508917"/>
+              </a:xfrm>
+              <a:blipFill>
+                <a:blip r:embed="rId2"/>
+                <a:stretch>
+                  <a:fillRect l="-910" b="-28571"/>
+                </a:stretch>
+              </a:blipFill>
+            </p:spPr>
+            <p:txBody>
+              <a:bodyPr/>
+              <a:lstStyle/>
+              <a:p>
+                <a:r>
+                  <a:rPr lang="pl-PL">
+                    <a:noFill/>
+                  </a:rPr>
+                  <a:t> </a:t>
+                </a:r>
+              </a:p>
+            </p:txBody>
+          </p:sp>
+        </mc:Fallback>
+      </mc:AlternateContent>
+      <p:pic>
+        <p:nvPicPr>
+          <p:cNvPr id="3" name="Obraz 2"/>
+          <p:cNvPicPr>
+            <a:picLocks noChangeAspect="1"/>
+          </p:cNvPicPr>
+          <p:nvPr/>
+        </p:nvPicPr>
+        <p:blipFill>
+          <a:blip r:embed="rId3">
+            <a:extLst>
+              <a:ext uri="{28A0092B-C50C-407E-A947-70E740481C1C}">
+                <a14:useLocalDpi xmlns:a14="http://schemas.microsoft.com/office/drawing/2010/main" val="0"/>
+              </a:ext>
+            </a:extLst>
+          </a:blip>
+          <a:stretch>
+            <a:fillRect/>
+          </a:stretch>
+        </p:blipFill>
+        <p:spPr>
+          <a:xfrm>
+            <a:off x="1958059" y="1484784"/>
+            <a:ext cx="9053553" cy="4679154"/>
+          </a:xfrm>
+          <a:prstGeom prst="rect">
+            <a:avLst/>
+          </a:prstGeom>
+        </p:spPr>
+      </p:pic>
+      <mc:AlternateContent xmlns:mc="http://schemas.openxmlformats.org/markup-compatibility/2006">
+        <mc:Choice xmlns:a14="http://schemas.microsoft.com/office/drawing/2010/main" Requires="a14">
+          <p:sp>
+            <p:nvSpPr>
+              <p:cNvPr id="4" name="pole tekstowe 3"/>
+              <p:cNvSpPr txBox="1"/>
+              <p:nvPr/>
+            </p:nvSpPr>
+            <p:spPr>
+              <a:xfrm>
+                <a:off x="3028451" y="6309320"/>
+                <a:ext cx="6912768" cy="461665"/>
+              </a:xfrm>
+              <a:prstGeom prst="rect">
+                <a:avLst/>
+              </a:prstGeom>
+              <a:noFill/>
+            </p:spPr>
+            <p:txBody>
+              <a:bodyPr wrap="square" rtlCol="0">
+                <a:spAutoFit/>
+              </a:bodyPr>
+              <a:lstStyle/>
+              <a:p>
+                <a:r>
+                  <a:rPr lang="pl-PL" sz="1200" dirty="0" smtClean="0"/>
+                  <a:t>Wykres przedstawia </a:t>
+                </a:r>
+                <a:r>
+                  <a:rPr lang="pl-PL" sz="1200" dirty="0" smtClean="0"/>
+                  <a:t>wartość normy </a:t>
+                </a:r>
+                <a14:m>
+                  <m:oMath xmlns:m="http://schemas.openxmlformats.org/officeDocument/2006/math">
+                    <m:d>
+                      <m:dPr>
+                        <m:begChr m:val="‖"/>
+                        <m:endChr m:val="‖"/>
+                        <m:ctrlPr>
+                          <a:rPr lang="pl-PL" sz="1200" i="1">
+                            <a:latin typeface="Cambria Math" panose="02040503050406030204" pitchFamily="18" charset="0"/>
+                          </a:rPr>
+                        </m:ctrlPr>
+                      </m:dPr>
+                      <m:e>
+                        <m:r>
+                          <a:rPr lang="pl-PL" sz="1200" i="1">
+                            <a:latin typeface="Cambria Math" panose="02040503050406030204" pitchFamily="18" charset="0"/>
+                          </a:rPr>
+                          <m:t>𝐴𝑥</m:t>
+                        </m:r>
+                        <m:r>
+                          <a:rPr lang="pl-PL" sz="1200" i="1">
+                            <a:latin typeface="Cambria Math" panose="02040503050406030204" pitchFamily="18" charset="0"/>
+                          </a:rPr>
+                          <m:t> −</m:t>
+                        </m:r>
+                        <m:r>
+                          <a:rPr lang="pl-PL" sz="1200" i="1">
+                            <a:latin typeface="Cambria Math" panose="02040503050406030204" pitchFamily="18" charset="0"/>
+                          </a:rPr>
+                          <m:t>𝑏</m:t>
+                        </m:r>
+                      </m:e>
+                    </m:d>
+                  </m:oMath>
+                </a14:m>
+                <a:r>
+                  <a:rPr lang="pl-PL" sz="1200" dirty="0" smtClean="0"/>
+                  <a:t> w </a:t>
+                </a:r>
+                <a:r>
+                  <a:rPr lang="pl-PL" sz="1200" dirty="0" smtClean="0"/>
+                  <a:t>funkcji </a:t>
+                </a:r>
+                <a:r>
+                  <a:rPr lang="pl-PL" sz="1200" dirty="0" smtClean="0"/>
+                  <a:t>rozmiaru </a:t>
+                </a:r>
+                <a14:m>
+                  <m:oMath xmlns:m="http://schemas.openxmlformats.org/officeDocument/2006/math">
+                    <m:r>
+                      <a:rPr lang="pl-PL" sz="1200" i="1">
+                        <a:latin typeface="Cambria Math" panose="02040503050406030204" pitchFamily="18" charset="0"/>
+                      </a:rPr>
+                      <m:t>𝑛</m:t>
+                    </m:r>
+                    <m:r>
+                      <a:rPr lang="pl-PL" sz="1200" i="1">
+                        <a:latin typeface="Cambria Math" panose="02040503050406030204" pitchFamily="18" charset="0"/>
+                      </a:rPr>
+                      <m:t> </m:t>
+                    </m:r>
+                  </m:oMath>
+                </a14:m>
+                <a:r>
+                  <a:rPr lang="pl-PL" sz="1200" dirty="0" smtClean="0"/>
+                  <a:t>macierzy układu dla rozkładu </a:t>
+                </a:r>
+                <a14:m>
+                  <m:oMath xmlns:m="http://schemas.openxmlformats.org/officeDocument/2006/math">
+                    <m:r>
+                      <a:rPr lang="pl-PL" sz="1200" i="1" dirty="0" smtClean="0">
+                        <a:latin typeface="Cambria Math" panose="02040503050406030204" pitchFamily="18" charset="0"/>
+                      </a:rPr>
+                      <m:t>𝐿𝑈</m:t>
+                    </m:r>
+                  </m:oMath>
+                </a14:m>
+                <a:r>
+                  <a:rPr lang="pl-PL" sz="1200" dirty="0" smtClean="0"/>
+                  <a:t> i transformacji </a:t>
+                </a:r>
+                <a:r>
+                  <a:rPr lang="pl-PL" sz="1200" dirty="0" err="1" smtClean="0"/>
+                  <a:t>Householdera</a:t>
+                </a:r>
+                <a:r>
+                  <a:rPr lang="pl-PL" sz="1200" dirty="0" smtClean="0"/>
+                  <a:t>.</a:t>
+                </a:r>
+                <a:endParaRPr lang="pl-PL" sz="1200" dirty="0"/>
+              </a:p>
+            </p:txBody>
+          </p:sp>
+        </mc:Choice>
+        <mc:Fallback>
+          <p:sp>
+            <p:nvSpPr>
+              <p:cNvPr id="4" name="pole tekstowe 3"/>
+              <p:cNvSpPr txBox="1">
+                <a:spLocks noRot="1" noChangeAspect="1" noMove="1" noResize="1" noEditPoints="1" noAdjustHandles="1" noChangeArrowheads="1" noChangeShapeType="1" noTextEdit="1"/>
+              </p:cNvSpPr>
+              <p:nvPr/>
+            </p:nvSpPr>
+            <p:spPr>
+              <a:xfrm>
+                <a:off x="3028451" y="6309320"/>
+                <a:ext cx="6912768" cy="461665"/>
+              </a:xfrm>
+              <a:prstGeom prst="rect">
+                <a:avLst/>
+              </a:prstGeom>
+              <a:blipFill>
+                <a:blip r:embed="rId4"/>
+                <a:stretch>
+                  <a:fillRect l="-88" t="-2632" b="-7895"/>
+                </a:stretch>
+              </a:blipFill>
+            </p:spPr>
+            <p:txBody>
+              <a:bodyPr/>
+              <a:lstStyle/>
+              <a:p>
+                <a:r>
+                  <a:rPr lang="pl-PL">
+                    <a:noFill/>
+                  </a:rPr>
+                  <a:t> </a:t>
+                </a:r>
+              </a:p>
+            </p:txBody>
+          </p:sp>
+        </mc:Fallback>
+      </mc:AlternateContent>
     </p:spTree>
     <p:extLst>
       <p:ext uri="{BB962C8B-B14F-4D97-AF65-F5344CB8AC3E}">
-        <p14:creationId xmlns:p14="http://schemas.microsoft.com/office/powerpoint/2010/main" val="115581895"/>
+        <p14:creationId xmlns:p14="http://schemas.microsoft.com/office/powerpoint/2010/main" val="1692969186"/>
       </p:ext>
     </p:extLst>
   </p:cSld>
@@ -21714,13 +20648,6 @@
       </p:transition>
     </mc:Fallback>
   </mc:AlternateContent>
-  <p:timing>
-    <p:tnLst>
-      <p:par>
-        <p:cTn id="1" dur="indefinite" restart="never" nodeType="tmRoot"/>
-      </p:par>
-    </p:tnLst>
-  </p:timing>
 </p:sld>
 </file>
 

</xml_diff>

<commit_message>
add summary in presentation in project2
</commit_message>
<xml_diff>
--- a/Project2/Presentation/P2Z20_AGR.pptx
+++ b/Project2/Presentation/P2Z20_AGR.pptx
@@ -5,10 +5,10 @@
     <p:sldMasterId id="2147483648" r:id="rId1"/>
   </p:sldMasterIdLst>
   <p:notesMasterIdLst>
-    <p:notesMasterId r:id="rId26"/>
+    <p:notesMasterId r:id="rId27"/>
   </p:notesMasterIdLst>
   <p:handoutMasterIdLst>
-    <p:handoutMasterId r:id="rId27"/>
+    <p:handoutMasterId r:id="rId28"/>
   </p:handoutMasterIdLst>
   <p:sldIdLst>
     <p:sldId id="256" r:id="rId2"/>
@@ -35,6 +35,7 @@
     <p:sldId id="312" r:id="rId23"/>
     <p:sldId id="311" r:id="rId24"/>
     <p:sldId id="313" r:id="rId25"/>
+    <p:sldId id="315" r:id="rId26"/>
   </p:sldIdLst>
   <p:sldSz cx="12188825" cy="6858000"/>
   <p:notesSz cx="6858000" cy="9144000"/>
@@ -7933,8 +7934,8 @@
           <a:chExt cx="0" cy="0"/>
         </a:xfrm>
       </p:grpSpPr>
-      <mc:AlternateContent xmlns:mc="http://schemas.openxmlformats.org/markup-compatibility/2006" xmlns:a14="http://schemas.microsoft.com/office/drawing/2010/main">
-        <mc:Choice Requires="a14">
+      <mc:AlternateContent xmlns:mc="http://schemas.openxmlformats.org/markup-compatibility/2006">
+        <mc:Choice xmlns:a14="http://schemas.microsoft.com/office/drawing/2010/main" Requires="a14">
           <p:sp>
             <p:nvSpPr>
               <p:cNvPr id="2" name="Tytuł 1"/>
@@ -7972,7 +7973,15 @@
                     <a:ea typeface="Cambria Math" panose="02040503050406030204" pitchFamily="18" charset="0"/>
                     <a:cs typeface="Calibri" panose="020F0502020204030204" pitchFamily="34" charset="0"/>
                   </a:rPr>
-                  <a:t>Obliczanie wskaźnika uwarunkowanie trójprzekątniowej, symetrycznej i rzeczywistej macierzy </a:t>
+                  <a:t>Obliczanie wskaźnika uwarunkowania </a:t>
+                </a:r>
+                <a:r>
+                  <a:rPr lang="pl-PL" sz="2400" dirty="0" smtClean="0">
+                    <a:latin typeface="Calibri" panose="020F0502020204030204" pitchFamily="34" charset="0"/>
+                    <a:ea typeface="Cambria Math" panose="02040503050406030204" pitchFamily="18" charset="0"/>
+                    <a:cs typeface="Calibri" panose="020F0502020204030204" pitchFamily="34" charset="0"/>
+                  </a:rPr>
+                  <a:t>trójprzekątniowej, symetrycznej i rzeczywistej macierzy </a:t>
                 </a:r>
                 <a14:m>
                   <m:oMath xmlns:m="http://schemas.openxmlformats.org/officeDocument/2006/math">
@@ -8078,41 +8087,10 @@
                           </m:ctrlPr>
                         </m:fPr>
                         <m:num>
-                          <m:sSub>
-                            <m:sSubPr>
-                              <m:ctrlPr>
-                                <a:rPr lang="pl-PL" sz="2400" i="1" smtClean="0">
-                                  <a:latin typeface="Cambria Math" panose="02040503050406030204" pitchFamily="18" charset="0"/>
-                                  <a:ea typeface="Cambria Math" panose="02040503050406030204" pitchFamily="18" charset="0"/>
-                                  <a:cs typeface="Calibri" panose="020F0502020204030204" pitchFamily="34" charset="0"/>
-                                </a:rPr>
-                              </m:ctrlPr>
-                            </m:sSubPr>
-                            <m:e>
-                              <m:r>
-                                <a:rPr lang="pl-PL" sz="2400" i="1" smtClean="0">
-                                  <a:latin typeface="Cambria Math" panose="02040503050406030204" pitchFamily="18" charset="0"/>
-                                  <a:ea typeface="Cambria Math" panose="02040503050406030204" pitchFamily="18" charset="0"/>
-                                  <a:cs typeface="Calibri" panose="020F0502020204030204" pitchFamily="34" charset="0"/>
-                                </a:rPr>
-                                <m:t>𝜆</m:t>
-                              </m:r>
-                            </m:e>
-                            <m:sub>
-                              <m:r>
-                                <a:rPr lang="pl-PL" sz="2400" b="0" i="1" smtClean="0">
-                                  <a:latin typeface="Cambria Math" panose="02040503050406030204" pitchFamily="18" charset="0"/>
-                                  <a:ea typeface="Cambria Math" panose="02040503050406030204" pitchFamily="18" charset="0"/>
-                                  <a:cs typeface="Calibri" panose="020F0502020204030204" pitchFamily="34" charset="0"/>
-                                </a:rPr>
-                                <m:t>𝑚𝑎𝑥</m:t>
-                              </m:r>
-                            </m:sub>
-                          </m:sSub>
-                        </m:num>
-                        <m:den>
-                          <m:sSub>
-                            <m:sSubPr>
+                          <m:d>
+                            <m:dPr>
+                              <m:begChr m:val="|"/>
+                              <m:endChr m:val="|"/>
                               <m:ctrlPr>
                                 <a:rPr lang="pl-PL" sz="2400" i="1">
                                   <a:latin typeface="Cambria Math" panose="02040503050406030204" pitchFamily="18" charset="0"/>
@@ -8120,36 +8098,97 @@
                                   <a:cs typeface="Calibri" panose="020F0502020204030204" pitchFamily="34" charset="0"/>
                                 </a:rPr>
                               </m:ctrlPr>
-                            </m:sSubPr>
+                            </m:dPr>
                             <m:e>
-                              <m:r>
+                              <m:sSub>
+                                <m:sSubPr>
+                                  <m:ctrlPr>
+                                    <a:rPr lang="pl-PL" sz="2400" i="1">
+                                      <a:latin typeface="Cambria Math" panose="02040503050406030204" pitchFamily="18" charset="0"/>
+                                      <a:ea typeface="Cambria Math" panose="02040503050406030204" pitchFamily="18" charset="0"/>
+                                      <a:cs typeface="Calibri" panose="020F0502020204030204" pitchFamily="34" charset="0"/>
+                                    </a:rPr>
+                                  </m:ctrlPr>
+                                </m:sSubPr>
+                                <m:e>
+                                  <m:r>
+                                    <a:rPr lang="pl-PL" sz="2400" i="1">
+                                      <a:latin typeface="Cambria Math" panose="02040503050406030204" pitchFamily="18" charset="0"/>
+                                      <a:ea typeface="Cambria Math" panose="02040503050406030204" pitchFamily="18" charset="0"/>
+                                      <a:cs typeface="Calibri" panose="020F0502020204030204" pitchFamily="34" charset="0"/>
+                                    </a:rPr>
+                                    <m:t>𝜆</m:t>
+                                  </m:r>
+                                </m:e>
+                                <m:sub>
+                                  <m:r>
+                                    <a:rPr lang="pl-PL" sz="2400" i="1">
+                                      <a:latin typeface="Cambria Math" panose="02040503050406030204" pitchFamily="18" charset="0"/>
+                                      <a:ea typeface="Cambria Math" panose="02040503050406030204" pitchFamily="18" charset="0"/>
+                                      <a:cs typeface="Calibri" panose="020F0502020204030204" pitchFamily="34" charset="0"/>
+                                    </a:rPr>
+                                    <m:t>𝑚𝑎𝑥</m:t>
+                                  </m:r>
+                                </m:sub>
+                              </m:sSub>
+                            </m:e>
+                          </m:d>
+                        </m:num>
+                        <m:den>
+                          <m:d>
+                            <m:dPr>
+                              <m:begChr m:val="|"/>
+                              <m:endChr m:val="|"/>
+                              <m:ctrlPr>
                                 <a:rPr lang="pl-PL" sz="2400" i="1">
                                   <a:latin typeface="Cambria Math" panose="02040503050406030204" pitchFamily="18" charset="0"/>
                                   <a:ea typeface="Cambria Math" panose="02040503050406030204" pitchFamily="18" charset="0"/>
                                   <a:cs typeface="Calibri" panose="020F0502020204030204" pitchFamily="34" charset="0"/>
                                 </a:rPr>
-                                <m:t>𝜆</m:t>
-                              </m:r>
+                              </m:ctrlPr>
+                            </m:dPr>
+                            <m:e>
+                              <m:sSub>
+                                <m:sSubPr>
+                                  <m:ctrlPr>
+                                    <a:rPr lang="pl-PL" sz="2400" i="1">
+                                      <a:latin typeface="Cambria Math" panose="02040503050406030204" pitchFamily="18" charset="0"/>
+                                      <a:ea typeface="Cambria Math" panose="02040503050406030204" pitchFamily="18" charset="0"/>
+                                      <a:cs typeface="Calibri" panose="020F0502020204030204" pitchFamily="34" charset="0"/>
+                                    </a:rPr>
+                                  </m:ctrlPr>
+                                </m:sSubPr>
+                                <m:e>
+                                  <m:r>
+                                    <a:rPr lang="pl-PL" sz="2400" i="1">
+                                      <a:latin typeface="Cambria Math" panose="02040503050406030204" pitchFamily="18" charset="0"/>
+                                      <a:ea typeface="Cambria Math" panose="02040503050406030204" pitchFamily="18" charset="0"/>
+                                      <a:cs typeface="Calibri" panose="020F0502020204030204" pitchFamily="34" charset="0"/>
+                                    </a:rPr>
+                                    <m:t>𝜆</m:t>
+                                  </m:r>
+                                </m:e>
+                                <m:sub>
+                                  <m:r>
+                                    <a:rPr lang="pl-PL" sz="2400" i="1">
+                                      <a:latin typeface="Cambria Math" panose="02040503050406030204" pitchFamily="18" charset="0"/>
+                                      <a:ea typeface="Cambria Math" panose="02040503050406030204" pitchFamily="18" charset="0"/>
+                                      <a:cs typeface="Calibri" panose="020F0502020204030204" pitchFamily="34" charset="0"/>
+                                    </a:rPr>
+                                    <m:t>𝑚</m:t>
+                                  </m:r>
+                                  <m:r>
+                                    <a:rPr lang="pl-PL" sz="2400" b="0" i="1" smtClean="0">
+                                      <a:latin typeface="Cambria Math" panose="02040503050406030204" pitchFamily="18" charset="0"/>
+                                      <a:ea typeface="Cambria Math" panose="02040503050406030204" pitchFamily="18" charset="0"/>
+                                      <a:cs typeface="Calibri" panose="020F0502020204030204" pitchFamily="34" charset="0"/>
+                                    </a:rPr>
+                                    <m:t>𝑖𝑛</m:t>
+                                  </m:r>
+                                </m:sub>
+                              </m:sSub>
                             </m:e>
-                            <m:sub>
-                              <m:r>
-                                <a:rPr lang="pl-PL" sz="2400" i="1">
-                                  <a:latin typeface="Cambria Math" panose="02040503050406030204" pitchFamily="18" charset="0"/>
-                                  <a:ea typeface="Cambria Math" panose="02040503050406030204" pitchFamily="18" charset="0"/>
-                                  <a:cs typeface="Calibri" panose="020F0502020204030204" pitchFamily="34" charset="0"/>
-                                </a:rPr>
-                                <m:t>𝑚</m:t>
-                              </m:r>
-                              <m:r>
-                                <a:rPr lang="pl-PL" sz="2400" b="0" i="1" smtClean="0">
-                                  <a:latin typeface="Cambria Math" panose="02040503050406030204" pitchFamily="18" charset="0"/>
-                                  <a:ea typeface="Cambria Math" panose="02040503050406030204" pitchFamily="18" charset="0"/>
-                                  <a:cs typeface="Calibri" panose="020F0502020204030204" pitchFamily="34" charset="0"/>
-                                </a:rPr>
-                                <m:t>𝑖𝑛</m:t>
-                              </m:r>
-                            </m:sub>
-                          </m:sSub>
+                          </m:d>
                         </m:den>
                       </m:f>
                     </m:oMath>
@@ -8355,7 +8394,7 @@
             </p:txBody>
           </p:sp>
         </mc:Choice>
-        <mc:Fallback xmlns="">
+        <mc:Fallback>
           <p:sp>
             <p:nvSpPr>
               <p:cNvPr id="2" name="Tytuł 1"/>
@@ -8374,7 +8413,7 @@
               <a:blipFill>
                 <a:blip r:embed="rId3"/>
                 <a:stretch>
-                  <a:fillRect l="-1101" t="-160" r="-1514" b="-3674"/>
+                  <a:fillRect l="-1101" t="-479" r="-1445" b="-3674"/>
                 </a:stretch>
               </a:blipFill>
             </p:spPr>
@@ -11585,8 +11624,8 @@
           <a:chExt cx="0" cy="0"/>
         </a:xfrm>
       </p:grpSpPr>
-      <mc:AlternateContent xmlns:mc="http://schemas.openxmlformats.org/markup-compatibility/2006" xmlns:a14="http://schemas.microsoft.com/office/drawing/2010/main">
-        <mc:Choice Requires="a14">
+      <mc:AlternateContent xmlns:mc="http://schemas.openxmlformats.org/markup-compatibility/2006">
+        <mc:Choice xmlns:a14="http://schemas.microsoft.com/office/drawing/2010/main" Requires="a14">
           <p:sp>
             <p:nvSpPr>
               <p:cNvPr id="3" name="Symbol zastępczy zawartości 2"/>
@@ -11600,7 +11639,7 @@
             <p:spPr>
               <a:xfrm>
                 <a:off x="1629916" y="2132856"/>
-                <a:ext cx="8496944" cy="4032448"/>
+                <a:ext cx="8496944" cy="2376264"/>
               </a:xfrm>
             </p:spPr>
             <p:txBody>
@@ -11751,7 +11790,15 @@
                 </a14:m>
                 <a:r>
                   <a:rPr lang="pl-PL" sz="2400" dirty="0" smtClean="0"/>
-                  <a:t>	- niezerowy wektor, ortogonalny do hiperpłaszczyzny 	  	  względem której ma nastąpić odbicie</a:t>
+                  <a:t>	- niezerowy wektor, ortogonalny do </a:t>
+                </a:r>
+                <a:r>
+                  <a:rPr lang="pl-PL" sz="2400" dirty="0" smtClean="0"/>
+                  <a:t>hiperpłaszczyzny, </a:t>
+                </a:r>
+                <a:r>
+                  <a:rPr lang="pl-PL" sz="2400" dirty="0" smtClean="0"/>
+                  <a:t>	  	  względem której ma nastąpić odbicie</a:t>
                 </a:r>
               </a:p>
               <a:p>
@@ -11763,7 +11810,7 @@
             </p:txBody>
           </p:sp>
         </mc:Choice>
-        <mc:Fallback xmlns="">
+        <mc:Fallback>
           <p:sp>
             <p:nvSpPr>
               <p:cNvPr id="3" name="Symbol zastępczy zawartości 2"/>
@@ -11777,7 +11824,7 @@
             <p:spPr>
               <a:xfrm>
                 <a:off x="1629916" y="2132856"/>
-                <a:ext cx="8496944" cy="4032448"/>
+                <a:ext cx="8496944" cy="2376264"/>
               </a:xfrm>
               <a:blipFill>
                 <a:blip r:embed="rId2"/>
@@ -12500,6 +12547,13 @@
       </p:transition>
     </mc:Fallback>
   </mc:AlternateContent>
+  <p:timing>
+    <p:tnLst>
+      <p:par>
+        <p:cTn id="1" dur="indefinite" restart="never" nodeType="tmRoot"/>
+      </p:par>
+    </p:tnLst>
+  </p:timing>
 </p:sld>
 </file>
 
@@ -19586,6 +19640,13 @@
       </p:transition>
     </mc:Fallback>
   </mc:AlternateContent>
+  <p:timing>
+    <p:tnLst>
+      <p:par>
+        <p:cTn id="1" dur="indefinite" restart="never" nodeType="tmRoot"/>
+      </p:par>
+    </p:tnLst>
+  </p:timing>
 </p:sld>
 </file>
 
@@ -20018,6 +20079,13 @@
       </p:transition>
     </mc:Fallback>
   </mc:AlternateContent>
+  <p:timing>
+    <p:tnLst>
+      <p:par>
+        <p:cTn id="1" dur="indefinite" restart="never" nodeType="tmRoot"/>
+      </p:par>
+    </p:tnLst>
+  </p:timing>
 </p:sld>
 </file>
 
@@ -20166,8 +20234,8 @@
           </a:prstGeom>
         </p:spPr>
       </p:pic>
-      <mc:AlternateContent xmlns:mc="http://schemas.openxmlformats.org/markup-compatibility/2006" xmlns:a14="http://schemas.microsoft.com/office/drawing/2010/main">
-        <mc:Choice Requires="a14">
+      <mc:AlternateContent xmlns:mc="http://schemas.openxmlformats.org/markup-compatibility/2006">
+        <mc:Choice xmlns:a14="http://schemas.microsoft.com/office/drawing/2010/main" Requires="a14">
           <p:sp>
             <p:nvSpPr>
               <p:cNvPr id="5" name="pole tekstowe 4"/>
@@ -20192,7 +20260,15 @@
               <a:p>
                 <a:r>
                   <a:rPr lang="pl-PL" sz="1200" dirty="0" smtClean="0"/>
-                  <a:t>Wykres przedstawia czas wykonania metody potęgowej dla macierzy o rozmiarze </a:t>
+                  <a:t>Wykres przedstawia czas wykonania </a:t>
+                </a:r>
+                <a:r>
+                  <a:rPr lang="pl-PL" sz="1200" dirty="0" smtClean="0"/>
+                  <a:t>odwrotnej metody </a:t>
+                </a:r>
+                <a:r>
+                  <a:rPr lang="pl-PL" sz="1200" dirty="0" smtClean="0"/>
+                  <a:t>potęgowej dla macierzy o rozmiarze </a:t>
                 </a:r>
                 <a14:m>
                   <m:oMath xmlns:m="http://schemas.openxmlformats.org/officeDocument/2006/math">
@@ -20240,7 +20316,7 @@
             </p:txBody>
           </p:sp>
         </mc:Choice>
-        <mc:Fallback xmlns="">
+        <mc:Fallback>
           <p:sp>
             <p:nvSpPr>
               <p:cNvPr id="5" name="pole tekstowe 4"/>
@@ -20301,6 +20377,13 @@
       </p:transition>
     </mc:Fallback>
   </mc:AlternateContent>
+  <p:timing>
+    <p:tnLst>
+      <p:par>
+        <p:cTn id="1" dur="indefinite" restart="never" nodeType="tmRoot"/>
+      </p:par>
+    </p:tnLst>
+  </p:timing>
 </p:sld>
 </file>
 
@@ -20321,8 +20404,8 @@
           <a:chExt cx="0" cy="0"/>
         </a:xfrm>
       </p:grpSpPr>
-      <mc:AlternateContent xmlns:mc="http://schemas.openxmlformats.org/markup-compatibility/2006">
-        <mc:Choice xmlns:a14="http://schemas.microsoft.com/office/drawing/2010/main" Requires="a14">
+      <mc:AlternateContent xmlns:mc="http://schemas.openxmlformats.org/markup-compatibility/2006" xmlns:a14="http://schemas.microsoft.com/office/drawing/2010/main">
+        <mc:Choice Requires="a14">
           <p:sp>
             <p:nvSpPr>
               <p:cNvPr id="2" name="Tytuł 1"/>
@@ -20393,7 +20476,7 @@
             </p:txBody>
           </p:sp>
         </mc:Choice>
-        <mc:Fallback>
+        <mc:Fallback xmlns="">
           <p:sp>
             <p:nvSpPr>
               <p:cNvPr id="2" name="Tytuł 1"/>
@@ -20461,8 +20544,8 @@
           </a:prstGeom>
         </p:spPr>
       </p:pic>
-      <mc:AlternateContent xmlns:mc="http://schemas.openxmlformats.org/markup-compatibility/2006">
-        <mc:Choice xmlns:a14="http://schemas.microsoft.com/office/drawing/2010/main" Requires="a14">
+      <mc:AlternateContent xmlns:mc="http://schemas.openxmlformats.org/markup-compatibility/2006" xmlns:a14="http://schemas.microsoft.com/office/drawing/2010/main">
+        <mc:Choice Requires="a14">
           <p:sp>
             <p:nvSpPr>
               <p:cNvPr id="4" name="pole tekstowe 3"/>
@@ -20487,11 +20570,7 @@
               <a:p>
                 <a:r>
                   <a:rPr lang="pl-PL" sz="1200" dirty="0" smtClean="0"/>
-                  <a:t>Wykres przedstawia </a:t>
-                </a:r>
-                <a:r>
-                  <a:rPr lang="pl-PL" sz="1200" dirty="0" smtClean="0"/>
-                  <a:t>wartość normy </a:t>
+                  <a:t>Wykres przedstawia wartość normy </a:t>
                 </a:r>
                 <a14:m>
                   <m:oMath xmlns:m="http://schemas.openxmlformats.org/officeDocument/2006/math">
@@ -20530,15 +20609,7 @@
                 </a14:m>
                 <a:r>
                   <a:rPr lang="pl-PL" sz="1200" dirty="0" smtClean="0"/>
-                  <a:t> w </a:t>
-                </a:r>
-                <a:r>
-                  <a:rPr lang="pl-PL" sz="1200" dirty="0" smtClean="0"/>
-                  <a:t>funkcji </a:t>
-                </a:r>
-                <a:r>
-                  <a:rPr lang="pl-PL" sz="1200" dirty="0" smtClean="0"/>
-                  <a:t>rozmiaru </a:t>
+                  <a:t> w funkcji rozmiaru </a:t>
                 </a:r>
                 <a14:m>
                   <m:oMath xmlns:m="http://schemas.openxmlformats.org/officeDocument/2006/math">
@@ -20587,7 +20658,7 @@
             </p:txBody>
           </p:sp>
         </mc:Choice>
-        <mc:Fallback>
+        <mc:Fallback xmlns="">
           <p:sp>
             <p:nvSpPr>
               <p:cNvPr id="4" name="pole tekstowe 3"/>
@@ -20630,6 +20701,216 @@
     <p:extLst>
       <p:ext uri="{BB962C8B-B14F-4D97-AF65-F5344CB8AC3E}">
         <p14:creationId xmlns:p14="http://schemas.microsoft.com/office/powerpoint/2010/main" val="1692969186"/>
+      </p:ext>
+    </p:extLst>
+  </p:cSld>
+  <p:clrMapOvr>
+    <a:masterClrMapping/>
+  </p:clrMapOvr>
+  <mc:AlternateContent xmlns:mc="http://schemas.openxmlformats.org/markup-compatibility/2006" xmlns:p14="http://schemas.microsoft.com/office/powerpoint/2010/main">
+    <mc:Choice Requires="p14">
+      <p:transition spd="med" p14:dur="700">
+        <p:fade/>
+      </p:transition>
+    </mc:Choice>
+    <mc:Fallback xmlns="">
+      <p:transition spd="med">
+        <p:fade/>
+      </p:transition>
+    </mc:Fallback>
+  </mc:AlternateContent>
+  <p:timing>
+    <p:tnLst>
+      <p:par>
+        <p:cTn id="1" dur="indefinite" restart="never" nodeType="tmRoot"/>
+      </p:par>
+    </p:tnLst>
+  </p:timing>
+</p:sld>
+</file>
+
+<file path=ppt/slides/slide25.xml><?xml version="1.0" encoding="utf-8"?>
+<p:sld xmlns:a="http://schemas.openxmlformats.org/drawingml/2006/main" xmlns:r="http://schemas.openxmlformats.org/officeDocument/2006/relationships" xmlns:p="http://schemas.openxmlformats.org/presentationml/2006/main">
+  <p:cSld>
+    <p:spTree>
+      <p:nvGrpSpPr>
+        <p:cNvPr id="1" name=""/>
+        <p:cNvGrpSpPr/>
+        <p:nvPr/>
+      </p:nvGrpSpPr>
+      <p:grpSpPr>
+        <a:xfrm>
+          <a:off x="0" y="0"/>
+          <a:ext cx="0" cy="0"/>
+          <a:chOff x="0" y="0"/>
+          <a:chExt cx="0" cy="0"/>
+        </a:xfrm>
+      </p:grpSpPr>
+      <p:sp>
+        <p:nvSpPr>
+          <p:cNvPr id="2" name="Tytuł 1"/>
+          <p:cNvSpPr>
+            <a:spLocks noGrp="1"/>
+          </p:cNvSpPr>
+          <p:nvPr>
+            <p:ph type="title"/>
+          </p:nvPr>
+        </p:nvSpPr>
+        <p:spPr/>
+        <p:txBody>
+          <a:bodyPr/>
+          <a:lstStyle/>
+          <a:p>
+            <a:r>
+              <a:rPr lang="pl-PL" dirty="0" smtClean="0"/>
+              <a:t>Wnioski:</a:t>
+            </a:r>
+            <a:endParaRPr lang="pl-PL" dirty="0"/>
+          </a:p>
+        </p:txBody>
+      </p:sp>
+      <mc:AlternateContent xmlns:mc="http://schemas.openxmlformats.org/markup-compatibility/2006">
+        <mc:Choice xmlns:a14="http://schemas.microsoft.com/office/drawing/2010/main" Requires="a14">
+          <p:sp>
+            <p:nvSpPr>
+              <p:cNvPr id="3" name="Symbol zastępczy zawartości 2"/>
+              <p:cNvSpPr>
+                <a:spLocks noGrp="1"/>
+              </p:cNvSpPr>
+              <p:nvPr>
+                <p:ph idx="1"/>
+              </p:nvPr>
+            </p:nvSpPr>
+            <p:spPr>
+              <a:xfrm>
+                <a:off x="1593436" y="1600200"/>
+                <a:ext cx="9782801" cy="2620888"/>
+              </a:xfrm>
+            </p:spPr>
+            <p:txBody>
+              <a:bodyPr>
+                <a:normAutofit/>
+              </a:bodyPr>
+              <a:lstStyle/>
+              <a:p>
+                <a:r>
+                  <a:rPr lang="pl-PL" sz="2400" dirty="0" smtClean="0"/>
+                  <a:t>Implementacja rozkładu LU była dla mnie znacząco prostsza niż implementacja transformacji </a:t>
+                </a:r>
+                <a:r>
+                  <a:rPr lang="pl-PL" sz="2400" dirty="0" err="1" smtClean="0"/>
+                  <a:t>Householdera</a:t>
+                </a:r>
+                <a:r>
+                  <a:rPr lang="pl-PL" sz="2400" dirty="0" smtClean="0"/>
+                  <a:t>.</a:t>
+                </a:r>
+              </a:p>
+              <a:p>
+                <a:r>
+                  <a:rPr lang="pl-PL" sz="2400" dirty="0" smtClean="0"/>
+                  <a:t>Czas obliczeniowy dla rozkład LU jest średnio dwukrotnie krótszy niż czas obliczeniowy transformacji </a:t>
+                </a:r>
+                <a:r>
+                  <a:rPr lang="pl-PL" sz="2400" dirty="0" err="1" smtClean="0"/>
+                  <a:t>Householdera</a:t>
+                </a:r>
+                <a:r>
+                  <a:rPr lang="pl-PL" sz="2400" dirty="0" smtClean="0"/>
+                  <a:t>.</a:t>
+                </a:r>
+              </a:p>
+              <a:p>
+                <a:r>
+                  <a:rPr lang="pl-PL" sz="2400" dirty="0" smtClean="0"/>
+                  <a:t>Rozkład LU wydaje się dawać średnio mniejszy błąd w postaci normy </a:t>
+                </a:r>
+                <a14:m>
+                  <m:oMath xmlns:m="http://schemas.openxmlformats.org/officeDocument/2006/math">
+                    <m:d>
+                      <m:dPr>
+                        <m:begChr m:val="‖"/>
+                        <m:endChr m:val="‖"/>
+                        <m:ctrlPr>
+                          <a:rPr lang="pl-PL" sz="2400" i="1">
+                            <a:latin typeface="Cambria Math" panose="02040503050406030204" pitchFamily="18" charset="0"/>
+                          </a:rPr>
+                        </m:ctrlPr>
+                      </m:dPr>
+                      <m:e>
+                        <m:r>
+                          <a:rPr lang="pl-PL" sz="2400" i="1">
+                            <a:latin typeface="Cambria Math" panose="02040503050406030204" pitchFamily="18" charset="0"/>
+                          </a:rPr>
+                          <m:t>𝐴𝑥</m:t>
+                        </m:r>
+                        <m:r>
+                          <a:rPr lang="pl-PL" sz="2400" i="1">
+                            <a:latin typeface="Cambria Math" panose="02040503050406030204" pitchFamily="18" charset="0"/>
+                          </a:rPr>
+                          <m:t> −</m:t>
+                        </m:r>
+                        <m:r>
+                          <a:rPr lang="pl-PL" sz="2400" i="1">
+                            <a:latin typeface="Cambria Math" panose="02040503050406030204" pitchFamily="18" charset="0"/>
+                          </a:rPr>
+                          <m:t>𝑏</m:t>
+                        </m:r>
+                      </m:e>
+                    </m:d>
+                  </m:oMath>
+                </a14:m>
+                <a:r>
+                  <a:rPr lang="pl-PL" sz="2400" dirty="0" smtClean="0"/>
+                  <a:t>.</a:t>
+                </a:r>
+                <a:endParaRPr lang="pl-PL" sz="2400" dirty="0"/>
+              </a:p>
+            </p:txBody>
+          </p:sp>
+        </mc:Choice>
+        <mc:Fallback>
+          <p:sp>
+            <p:nvSpPr>
+              <p:cNvPr id="3" name="Symbol zastępczy zawartości 2"/>
+              <p:cNvSpPr>
+                <a:spLocks noGrp="1" noRot="1" noChangeAspect="1" noMove="1" noResize="1" noEditPoints="1" noAdjustHandles="1" noChangeArrowheads="1" noChangeShapeType="1" noTextEdit="1"/>
+              </p:cNvSpPr>
+              <p:nvPr>
+                <p:ph idx="1"/>
+              </p:nvPr>
+            </p:nvSpPr>
+            <p:spPr>
+              <a:xfrm>
+                <a:off x="1593436" y="1600200"/>
+                <a:ext cx="9782801" cy="2620888"/>
+              </a:xfrm>
+              <a:blipFill>
+                <a:blip r:embed="rId2"/>
+                <a:stretch>
+                  <a:fillRect l="-810" t="-3030" r="-1059"/>
+                </a:stretch>
+              </a:blipFill>
+            </p:spPr>
+            <p:txBody>
+              <a:bodyPr/>
+              <a:lstStyle/>
+              <a:p>
+                <a:r>
+                  <a:rPr lang="pl-PL">
+                    <a:noFill/>
+                  </a:rPr>
+                  <a:t> </a:t>
+                </a:r>
+              </a:p>
+            </p:txBody>
+          </p:sp>
+        </mc:Fallback>
+      </mc:AlternateContent>
+    </p:spTree>
+    <p:extLst>
+      <p:ext uri="{BB962C8B-B14F-4D97-AF65-F5344CB8AC3E}">
+        <p14:creationId xmlns:p14="http://schemas.microsoft.com/office/powerpoint/2010/main" val="3152126274"/>
       </p:ext>
     </p:extLst>
   </p:cSld>

</xml_diff>

<commit_message>
adjust presentation to the latest project2 modifications
</commit_message>
<xml_diff>
--- a/Project2/Presentation/P2Z20_AGR.pptx
+++ b/Project2/Presentation/P2Z20_AGR.pptx
@@ -22,7 +22,7 @@
     <p:sldId id="295" r:id="rId10"/>
     <p:sldId id="296" r:id="rId11"/>
     <p:sldId id="297" r:id="rId12"/>
-    <p:sldId id="298" r:id="rId13"/>
+    <p:sldId id="316" r:id="rId13"/>
     <p:sldId id="299" r:id="rId14"/>
     <p:sldId id="300" r:id="rId15"/>
     <p:sldId id="301" r:id="rId16"/>
@@ -256,7 +256,7 @@
             <a:pPr rtl="0"/>
             <a:fld id="{259B836B-1D14-4898-A0A6-D61FF17C9DBC}" type="datetime1">
               <a:rPr lang="pl-PL" smtClean="0"/>
-              <a:t>30.12.2023</a:t>
+              <a:t>01.01.2024</a:t>
             </a:fld>
             <a:endParaRPr lang="pl-PL" dirty="0"/>
           </a:p>
@@ -433,7 +433,7 @@
             <a:fld id="{0B49425D-C08F-42D2-9661-205968B2C1FB}" type="datetime1">
               <a:rPr lang="pl-PL" smtClean="0"/>
               <a:pPr/>
-              <a:t>30.12.2023</a:t>
+              <a:t>01.01.2024</a:t>
             </a:fld>
             <a:endParaRPr lang="pl-PL" dirty="0"/>
           </a:p>
@@ -1805,7 +1805,7 @@
             <a:fld id="{0891712C-DFA3-4BBB-949A-441F8D94FB78}" type="datetime1">
               <a:rPr lang="pl-PL" smtClean="0"/>
               <a:pPr/>
-              <a:t>30.12.2023</a:t>
+              <a:t>01.01.2024</a:t>
             </a:fld>
             <a:endParaRPr lang="pl-PL" dirty="0"/>
           </a:p>
@@ -2037,7 +2037,7 @@
             <a:fld id="{945AF6E0-399A-47E1-A1DB-7B7324AFFA86}" type="datetime1">
               <a:rPr lang="pl-PL" smtClean="0"/>
               <a:pPr/>
-              <a:t>30.12.2023</a:t>
+              <a:t>01.01.2024</a:t>
             </a:fld>
             <a:endParaRPr lang="pl-PL" dirty="0"/>
           </a:p>
@@ -2865,7 +2865,7 @@
             <a:fld id="{C607926C-DC73-443E-A62B-EE34064092FB}" type="datetime1">
               <a:rPr lang="pl-PL" smtClean="0"/>
               <a:pPr/>
-              <a:t>30.12.2023</a:t>
+              <a:t>01.01.2024</a:t>
             </a:fld>
             <a:endParaRPr lang="pl-PL" dirty="0"/>
           </a:p>
@@ -3075,7 +3075,7 @@
             <a:fld id="{E5FE2A44-E43C-4DB0-9333-8D36003B44E7}" type="datetime1">
               <a:rPr lang="pl-PL" smtClean="0"/>
               <a:pPr/>
-              <a:t>30.12.2023</a:t>
+              <a:t>01.01.2024</a:t>
             </a:fld>
             <a:endParaRPr lang="pl-PL" dirty="0"/>
           </a:p>
@@ -4346,7 +4346,7 @@
             <a:fld id="{73A63387-177D-4170-9A3F-154CB0D93663}" type="datetime1">
               <a:rPr lang="pl-PL" smtClean="0"/>
               <a:pPr/>
-              <a:t>30.12.2023</a:t>
+              <a:t>01.01.2024</a:t>
             </a:fld>
             <a:endParaRPr lang="pl-PL" dirty="0"/>
           </a:p>
@@ -4680,7 +4680,7 @@
             <a:fld id="{1CFAE661-66FE-4314-8504-F784411951F4}" type="datetime1">
               <a:rPr lang="pl-PL" smtClean="0"/>
               <a:pPr/>
-              <a:t>30.12.2023</a:t>
+              <a:t>01.01.2024</a:t>
             </a:fld>
             <a:endParaRPr lang="pl-PL" dirty="0"/>
           </a:p>
@@ -5140,7 +5140,7 @@
             <a:fld id="{33DE8A6F-0E38-430F-8DDD-319E6F7E6EAA}" type="datetime1">
               <a:rPr lang="pl-PL" smtClean="0"/>
               <a:pPr/>
-              <a:t>30.12.2023</a:t>
+              <a:t>01.01.2024</a:t>
             </a:fld>
             <a:endParaRPr lang="pl-PL" dirty="0"/>
           </a:p>
@@ -5282,7 +5282,7 @@
             <a:fld id="{14227057-05C3-4648-ABCB-F25BC875C77C}" type="datetime1">
               <a:rPr lang="pl-PL" smtClean="0"/>
               <a:pPr/>
-              <a:t>30.12.2023</a:t>
+              <a:t>01.01.2024</a:t>
             </a:fld>
             <a:endParaRPr lang="pl-PL" dirty="0"/>
           </a:p>
@@ -5628,7 +5628,7 @@
             <a:fld id="{9DD6C040-6C40-4FE1-A91C-782E8F88FE59}" type="datetime1">
               <a:rPr lang="pl-PL" smtClean="0"/>
               <a:pPr/>
-              <a:t>30.12.2023</a:t>
+              <a:t>01.01.2024</a:t>
             </a:fld>
             <a:endParaRPr lang="pl-PL" dirty="0"/>
           </a:p>
@@ -6132,7 +6132,7 @@
             <a:fld id="{C1F1E1EE-6F53-47AB-A934-DBB9363F4AE6}" type="datetime1">
               <a:rPr lang="pl-PL" smtClean="0"/>
               <a:pPr/>
-              <a:t>30.12.2023</a:t>
+              <a:t>01.01.2024</a:t>
             </a:fld>
             <a:endParaRPr lang="pl-PL" dirty="0"/>
           </a:p>
@@ -6589,7 +6589,7 @@
             <a:fld id="{88F116C8-0054-4794-B06D-CBA61F961298}" type="datetime1">
               <a:rPr lang="pl-PL" smtClean="0"/>
               <a:pPr/>
-              <a:t>30.12.2023</a:t>
+              <a:t>01.01.2024</a:t>
             </a:fld>
             <a:endParaRPr lang="pl-PL" dirty="0"/>
           </a:p>
@@ -7496,7 +7496,7 @@
             <a:fld id="{7513D91F-FF86-4B7D-8E15-3B9D5855F3A0}" type="datetime1">
               <a:rPr lang="pl-PL" smtClean="0"/>
               <a:pPr/>
-              <a:t>30.12.2023</a:t>
+              <a:t>01.01.2024</a:t>
             </a:fld>
             <a:endParaRPr lang="pl-PL" dirty="0"/>
           </a:p>
@@ -8580,8 +8580,8 @@
           <a:chExt cx="0" cy="0"/>
         </a:xfrm>
       </p:grpSpPr>
-      <mc:AlternateContent xmlns:mc="http://schemas.openxmlformats.org/markup-compatibility/2006">
-        <mc:Choice xmlns:a14="http://schemas.microsoft.com/office/drawing/2010/main" Requires="a14">
+      <mc:AlternateContent xmlns:mc="http://schemas.openxmlformats.org/markup-compatibility/2006" xmlns:a14="http://schemas.microsoft.com/office/drawing/2010/main">
+        <mc:Choice Requires="a14">
           <p:sp>
             <p:nvSpPr>
               <p:cNvPr id="3" name="Symbol zastępczy zawartości 2"/>
@@ -9116,7 +9116,7 @@
             </p:txBody>
           </p:sp>
         </mc:Choice>
-        <mc:Fallback>
+        <mc:Fallback xmlns="">
           <p:sp>
             <p:nvSpPr>
               <p:cNvPr id="3" name="Symbol zastępczy zawartości 2"/>
@@ -10315,8 +10315,8 @@
             </p:nvSpPr>
             <p:spPr>
               <a:xfrm>
-                <a:off x="1593436" y="1916832"/>
-                <a:ext cx="9782801" cy="3168352"/>
+                <a:off x="1593436" y="1772816"/>
+                <a:ext cx="9782801" cy="2808312"/>
               </a:xfrm>
             </p:spPr>
             <p:txBody>
@@ -10334,38 +10334,69 @@
                       <m:jc m:val="centerGroup"/>
                     </m:oMathParaPr>
                     <m:oMath xmlns:m="http://schemas.openxmlformats.org/officeDocument/2006/math">
-                      <m:d>
-                        <m:dPr>
-                          <m:begChr m:val="‖"/>
-                          <m:endChr m:val="‖"/>
+                      <m:f>
+                        <m:fPr>
                           <m:ctrlPr>
                             <a:rPr lang="pl-PL" sz="2400" i="1" smtClean="0">
                               <a:latin typeface="Cambria Math" panose="02040503050406030204" pitchFamily="18" charset="0"/>
                             </a:rPr>
                           </m:ctrlPr>
-                        </m:dPr>
-                        <m:e>
-                          <m:r>
-                            <a:rPr lang="pl-PL" sz="2400" i="1" smtClean="0">
-                              <a:latin typeface="Cambria Math" panose="02040503050406030204" pitchFamily="18" charset="0"/>
-                            </a:rPr>
-                            <m:t>𝑠</m:t>
-                          </m:r>
-                          <m:r>
-                            <a:rPr lang="pl-PL" sz="2400" b="0" i="1" smtClean="0">
-                              <a:latin typeface="Cambria Math" panose="02040503050406030204" pitchFamily="18" charset="0"/>
-                            </a:rPr>
-                            <m:t>𝑖𝑔𝑛</m:t>
-                          </m:r>
+                        </m:fPr>
+                        <m:num>
                           <m:d>
                             <m:dPr>
+                              <m:begChr m:val="‖"/>
+                              <m:endChr m:val="‖"/>
                               <m:ctrlPr>
-                                <a:rPr lang="pl-PL" sz="2400" b="0" i="1" smtClean="0">
+                                <a:rPr lang="pl-PL" sz="2400" i="1" smtClean="0">
                                   <a:latin typeface="Cambria Math" panose="02040503050406030204" pitchFamily="18" charset="0"/>
                                 </a:rPr>
                               </m:ctrlPr>
                             </m:dPr>
                             <m:e>
+                              <m:sSup>
+                                <m:sSupPr>
+                                  <m:ctrlPr>
+                                    <a:rPr lang="pl-PL" sz="2400" i="1">
+                                      <a:latin typeface="Cambria Math" panose="02040503050406030204" pitchFamily="18" charset="0"/>
+                                    </a:rPr>
+                                  </m:ctrlPr>
+                                </m:sSupPr>
+                                <m:e>
+                                  <m:r>
+                                    <a:rPr lang="pl-PL" sz="2400" i="1">
+                                      <a:latin typeface="Cambria Math" panose="02040503050406030204" pitchFamily="18" charset="0"/>
+                                    </a:rPr>
+                                    <m:t>𝑥</m:t>
+                                  </m:r>
+                                </m:e>
+                                <m:sup>
+                                  <m:r>
+                                    <a:rPr lang="pl-PL" sz="2400" i="1">
+                                      <a:latin typeface="Cambria Math" panose="02040503050406030204" pitchFamily="18" charset="0"/>
+                                    </a:rPr>
+                                    <m:t>(</m:t>
+                                  </m:r>
+                                  <m:r>
+                                    <a:rPr lang="pl-PL" sz="2400" i="1">
+                                      <a:latin typeface="Cambria Math" panose="02040503050406030204" pitchFamily="18" charset="0"/>
+                                    </a:rPr>
+                                    <m:t>𝑘</m:t>
+                                  </m:r>
+                                  <m:r>
+                                    <a:rPr lang="pl-PL" sz="2400" i="1">
+                                      <a:latin typeface="Cambria Math" panose="02040503050406030204" pitchFamily="18" charset="0"/>
+                                    </a:rPr>
+                                    <m:t>+1)</m:t>
+                                  </m:r>
+                                </m:sup>
+                              </m:sSup>
+                              <m:r>
+                                <a:rPr lang="pl-PL" sz="2400" b="0" i="1" smtClean="0">
+                                  <a:latin typeface="Cambria Math" panose="02040503050406030204" pitchFamily="18" charset="0"/>
+                                </a:rPr>
+                                <m:t>−</m:t>
+                              </m:r>
                               <m:sSubSup>
                                 <m:sSubSupPr>
                                   <m:ctrlPr>
@@ -10374,6 +10405,53 @@
                                     </a:rPr>
                                   </m:ctrlPr>
                                 </m:sSubSupPr>
+                                <m:e>
+                                  <m:r>
+                                    <a:rPr lang="pl-PL" sz="2400" i="1">
+                                      <a:latin typeface="Cambria Math" panose="02040503050406030204" pitchFamily="18" charset="0"/>
+                                      <a:ea typeface="Cambria Math" panose="02040503050406030204" pitchFamily="18" charset="0"/>
+                                      <a:cs typeface="Calibri" panose="020F0502020204030204" pitchFamily="34" charset="0"/>
+                                    </a:rPr>
+                                    <m:t>𝜆</m:t>
+                                  </m:r>
+                                </m:e>
+                                <m:sub>
+                                  <m:r>
+                                    <a:rPr lang="pl-PL" sz="2400" b="0" i="1" smtClean="0">
+                                      <a:latin typeface="Cambria Math" panose="02040503050406030204" pitchFamily="18" charset="0"/>
+                                    </a:rPr>
+                                    <m:t>𝑛</m:t>
+                                  </m:r>
+                                </m:sub>
+                                <m:sup>
+                                  <m:r>
+                                    <a:rPr lang="pl-PL" sz="2400" b="0" i="1" smtClean="0">
+                                      <a:latin typeface="Cambria Math" panose="02040503050406030204" pitchFamily="18" charset="0"/>
+                                    </a:rPr>
+                                    <m:t>(</m:t>
+                                  </m:r>
+                                  <m:r>
+                                    <a:rPr lang="pl-PL" sz="2400" b="0" i="1" smtClean="0">
+                                      <a:latin typeface="Cambria Math" panose="02040503050406030204" pitchFamily="18" charset="0"/>
+                                    </a:rPr>
+                                    <m:t>𝑘</m:t>
+                                  </m:r>
+                                  <m:r>
+                                    <a:rPr lang="pl-PL" sz="2400" b="0" i="1" smtClean="0">
+                                      <a:latin typeface="Cambria Math" panose="02040503050406030204" pitchFamily="18" charset="0"/>
+                                    </a:rPr>
+                                    <m:t>)</m:t>
+                                  </m:r>
+                                </m:sup>
+                              </m:sSubSup>
+                              <m:sSup>
+                                <m:sSupPr>
+                                  <m:ctrlPr>
+                                    <a:rPr lang="pl-PL" sz="2400" i="1">
+                                      <a:latin typeface="Cambria Math" panose="02040503050406030204" pitchFamily="18" charset="0"/>
+                                    </a:rPr>
+                                  </m:ctrlPr>
+                                </m:sSupPr>
                                 <m:e>
                                   <m:acc>
                                     <m:accPr>
@@ -10394,120 +10472,37 @@
                                     </m:e>
                                   </m:acc>
                                 </m:e>
-                                <m:sub>
-                                  <m:r>
-                                    <a:rPr lang="pl-PL" sz="2400" b="0" i="1" smtClean="0">
-                                      <a:latin typeface="Cambria Math" panose="02040503050406030204" pitchFamily="18" charset="0"/>
-                                    </a:rPr>
-                                    <m:t>𝑖</m:t>
-                                  </m:r>
-                                </m:sub>
                                 <m:sup>
-                                  <m:d>
-                                    <m:dPr>
-                                      <m:ctrlPr>
-                                        <a:rPr lang="pl-PL" sz="2400" b="0" i="1" smtClean="0">
-                                          <a:latin typeface="Cambria Math" panose="02040503050406030204" pitchFamily="18" charset="0"/>
-                                        </a:rPr>
-                                      </m:ctrlPr>
-                                    </m:dPr>
-                                    <m:e>
-                                      <m:r>
-                                        <a:rPr lang="pl-PL" sz="2400" b="0" i="1" smtClean="0">
-                                          <a:latin typeface="Cambria Math" panose="02040503050406030204" pitchFamily="18" charset="0"/>
-                                        </a:rPr>
-                                        <m:t>𝑘</m:t>
-                                      </m:r>
-                                      <m:r>
-                                        <a:rPr lang="pl-PL" sz="2400" b="0" i="1" smtClean="0">
-                                          <a:latin typeface="Cambria Math" panose="02040503050406030204" pitchFamily="18" charset="0"/>
-                                        </a:rPr>
-                                        <m:t>+1</m:t>
-                                      </m:r>
-                                    </m:e>
-                                  </m:d>
-                                </m:sup>
-                              </m:sSubSup>
-                            </m:e>
-                          </m:d>
-                          <m:r>
-                            <a:rPr lang="pl-PL" sz="2400" b="0" i="1" smtClean="0">
-                              <a:latin typeface="Cambria Math" panose="02040503050406030204" pitchFamily="18" charset="0"/>
-                              <a:ea typeface="Cambria Math" panose="02040503050406030204" pitchFamily="18" charset="0"/>
-                            </a:rPr>
-                            <m:t>∙</m:t>
-                          </m:r>
-                          <m:sSup>
-                            <m:sSupPr>
-                              <m:ctrlPr>
-                                <a:rPr lang="pl-PL" sz="2400" i="1">
-                                  <a:latin typeface="Cambria Math" panose="02040503050406030204" pitchFamily="18" charset="0"/>
-                                </a:rPr>
-                              </m:ctrlPr>
-                            </m:sSupPr>
-                            <m:e>
-                              <m:acc>
-                                <m:accPr>
-                                  <m:chr m:val="̃"/>
-                                  <m:ctrlPr>
-                                    <a:rPr lang="pl-PL" sz="2400" i="1">
-                                      <a:latin typeface="Cambria Math" panose="02040503050406030204" pitchFamily="18" charset="0"/>
-                                    </a:rPr>
-                                  </m:ctrlPr>
-                                </m:accPr>
-                                <m:e>
                                   <m:r>
                                     <a:rPr lang="pl-PL" sz="2400" i="1">
                                       <a:latin typeface="Cambria Math" panose="02040503050406030204" pitchFamily="18" charset="0"/>
                                     </a:rPr>
-                                    <m:t>𝑥</m:t>
+                                    <m:t>(</m:t>
                                   </m:r>
-                                </m:e>
-                              </m:acc>
+                                  <m:r>
+                                    <a:rPr lang="pl-PL" sz="2400" i="1">
+                                      <a:latin typeface="Cambria Math" panose="02040503050406030204" pitchFamily="18" charset="0"/>
+                                    </a:rPr>
+                                    <m:t>𝑘</m:t>
+                                  </m:r>
+                                  <m:r>
+                                    <a:rPr lang="pl-PL" sz="2400" i="1">
+                                      <a:latin typeface="Cambria Math" panose="02040503050406030204" pitchFamily="18" charset="0"/>
+                                    </a:rPr>
+                                    <m:t>)</m:t>
+                                  </m:r>
+                                </m:sup>
+                              </m:sSup>
                             </m:e>
-                            <m:sup>
-                              <m:r>
-                                <a:rPr lang="pl-PL" sz="2400" i="1">
-                                  <a:latin typeface="Cambria Math" panose="02040503050406030204" pitchFamily="18" charset="0"/>
-                                </a:rPr>
-                                <m:t>(</m:t>
-                              </m:r>
-                              <m:r>
-                                <a:rPr lang="pl-PL" sz="2400" i="1">
-                                  <a:latin typeface="Cambria Math" panose="02040503050406030204" pitchFamily="18" charset="0"/>
-                                </a:rPr>
-                                <m:t>𝑘</m:t>
-                              </m:r>
-                              <m:r>
-                                <a:rPr lang="pl-PL" sz="2400" b="0" i="1" smtClean="0">
-                                  <a:latin typeface="Cambria Math" panose="02040503050406030204" pitchFamily="18" charset="0"/>
-                                </a:rPr>
-                                <m:t>+1</m:t>
-                              </m:r>
-                              <m:r>
-                                <a:rPr lang="pl-PL" sz="2400" i="1">
-                                  <a:latin typeface="Cambria Math" panose="02040503050406030204" pitchFamily="18" charset="0"/>
-                                </a:rPr>
-                                <m:t>)</m:t>
-                              </m:r>
-                            </m:sup>
-                          </m:sSup>
-                          <m:r>
-                            <a:rPr lang="pl-PL" sz="2400" b="0" i="1" smtClean="0">
-                              <a:latin typeface="Cambria Math" panose="02040503050406030204" pitchFamily="18" charset="0"/>
-                            </a:rPr>
-                            <m:t>−</m:t>
-                          </m:r>
-                          <m:r>
-                            <a:rPr lang="pl-PL" sz="2400" i="1">
-                              <a:latin typeface="Cambria Math" panose="02040503050406030204" pitchFamily="18" charset="0"/>
-                            </a:rPr>
-                            <m:t>𝑠𝑖𝑔𝑛</m:t>
-                          </m:r>
+                          </m:d>
+                        </m:num>
+                        <m:den>
                           <m:d>
                             <m:dPr>
+                              <m:begChr m:val="|"/>
+                              <m:endChr m:val="|"/>
                               <m:ctrlPr>
-                                <a:rPr lang="pl-PL" sz="2400" i="1">
+                                <a:rPr lang="pl-PL" sz="2400" i="1" smtClean="0">
                                   <a:latin typeface="Cambria Math" panose="02040503050406030204" pitchFamily="18" charset="0"/>
                                 </a:rPr>
                               </m:ctrlPr>
@@ -10522,113 +10517,50 @@
                                   </m:ctrlPr>
                                 </m:sSubSupPr>
                                 <m:e>
-                                  <m:acc>
-                                    <m:accPr>
-                                      <m:chr m:val="̃"/>
-                                      <m:ctrlPr>
-                                        <a:rPr lang="pl-PL" sz="2400" i="1">
-                                          <a:latin typeface="Cambria Math" panose="02040503050406030204" pitchFamily="18" charset="0"/>
-                                        </a:rPr>
-                                      </m:ctrlPr>
-                                    </m:accPr>
-                                    <m:e>
-                                      <m:r>
-                                        <a:rPr lang="pl-PL" sz="2400" i="1">
-                                          <a:latin typeface="Cambria Math" panose="02040503050406030204" pitchFamily="18" charset="0"/>
-                                        </a:rPr>
-                                        <m:t>𝑥</m:t>
-                                      </m:r>
-                                    </m:e>
-                                  </m:acc>
+                                  <m:r>
+                                    <a:rPr lang="pl-PL" sz="2400" i="1">
+                                      <a:latin typeface="Cambria Math" panose="02040503050406030204" pitchFamily="18" charset="0"/>
+                                      <a:ea typeface="Cambria Math" panose="02040503050406030204" pitchFamily="18" charset="0"/>
+                                      <a:cs typeface="Calibri" panose="020F0502020204030204" pitchFamily="34" charset="0"/>
+                                    </a:rPr>
+                                    <m:t>𝜆</m:t>
+                                  </m:r>
                                 </m:e>
                                 <m:sub>
+                                  <m:r>
+                                    <a:rPr lang="pl-PL" sz="2400" b="0" i="1" smtClean="0">
+                                      <a:latin typeface="Cambria Math" panose="02040503050406030204" pitchFamily="18" charset="0"/>
+                                      <a:ea typeface="Cambria Math" panose="02040503050406030204" pitchFamily="18" charset="0"/>
+                                      <a:cs typeface="Calibri" panose="020F0502020204030204" pitchFamily="34" charset="0"/>
+                                    </a:rPr>
+                                    <m:t>𝑛</m:t>
+                                  </m:r>
+                                </m:sub>
+                                <m:sup>
                                   <m:r>
                                     <a:rPr lang="pl-PL" sz="2400" i="1">
                                       <a:latin typeface="Cambria Math" panose="02040503050406030204" pitchFamily="18" charset="0"/>
                                     </a:rPr>
-                                    <m:t>𝑖</m:t>
+                                    <m:t>(</m:t>
                                   </m:r>
-                                </m:sub>
-                                <m:sup>
-                                  <m:d>
-                                    <m:dPr>
-                                      <m:ctrlPr>
-                                        <a:rPr lang="pl-PL" sz="2400" i="1">
-                                          <a:latin typeface="Cambria Math" panose="02040503050406030204" pitchFamily="18" charset="0"/>
-                                        </a:rPr>
-                                      </m:ctrlPr>
-                                    </m:dPr>
-                                    <m:e>
-                                      <m:r>
-                                        <a:rPr lang="pl-PL" sz="2400" i="1">
-                                          <a:latin typeface="Cambria Math" panose="02040503050406030204" pitchFamily="18" charset="0"/>
-                                        </a:rPr>
-                                        <m:t>𝑘</m:t>
-                                      </m:r>
-                                    </m:e>
-                                  </m:d>
+                                  <m:r>
+                                    <a:rPr lang="pl-PL" sz="2400" i="1">
+                                      <a:latin typeface="Cambria Math" panose="02040503050406030204" pitchFamily="18" charset="0"/>
+                                    </a:rPr>
+                                    <m:t>𝑘</m:t>
+                                  </m:r>
+                                  <m:r>
+                                    <a:rPr lang="pl-PL" sz="2400" i="1">
+                                      <a:latin typeface="Cambria Math" panose="02040503050406030204" pitchFamily="18" charset="0"/>
+                                    </a:rPr>
+                                    <m:t>)</m:t>
+                                  </m:r>
                                 </m:sup>
                               </m:sSubSup>
                             </m:e>
                           </m:d>
-                          <m:r>
-                            <a:rPr lang="pl-PL" sz="2400" i="1">
-                              <a:latin typeface="Cambria Math" panose="02040503050406030204" pitchFamily="18" charset="0"/>
-                              <a:ea typeface="Cambria Math" panose="02040503050406030204" pitchFamily="18" charset="0"/>
-                            </a:rPr>
-                            <m:t>∙</m:t>
-                          </m:r>
-                          <m:sSup>
-                            <m:sSupPr>
-                              <m:ctrlPr>
-                                <a:rPr lang="pl-PL" sz="2400" i="1">
-                                  <a:latin typeface="Cambria Math" panose="02040503050406030204" pitchFamily="18" charset="0"/>
-                                </a:rPr>
-                              </m:ctrlPr>
-                            </m:sSupPr>
-                            <m:e>
-                              <m:acc>
-                                <m:accPr>
-                                  <m:chr m:val="̃"/>
-                                  <m:ctrlPr>
-                                    <a:rPr lang="pl-PL" sz="2400" i="1">
-                                      <a:latin typeface="Cambria Math" panose="02040503050406030204" pitchFamily="18" charset="0"/>
-                                    </a:rPr>
-                                  </m:ctrlPr>
-                                </m:accPr>
-                                <m:e>
-                                  <m:r>
-                                    <a:rPr lang="pl-PL" sz="2400" i="1">
-                                      <a:latin typeface="Cambria Math" panose="02040503050406030204" pitchFamily="18" charset="0"/>
-                                    </a:rPr>
-                                    <m:t>𝑥</m:t>
-                                  </m:r>
-                                </m:e>
-                              </m:acc>
-                            </m:e>
-                            <m:sup>
-                              <m:r>
-                                <a:rPr lang="pl-PL" sz="2400" i="1">
-                                  <a:latin typeface="Cambria Math" panose="02040503050406030204" pitchFamily="18" charset="0"/>
-                                </a:rPr>
-                                <m:t>(</m:t>
-                              </m:r>
-                              <m:r>
-                                <a:rPr lang="pl-PL" sz="2400" i="1">
-                                  <a:latin typeface="Cambria Math" panose="02040503050406030204" pitchFamily="18" charset="0"/>
-                                </a:rPr>
-                                <m:t>𝑘</m:t>
-                              </m:r>
-                              <m:r>
-                                <a:rPr lang="pl-PL" sz="2400" i="1">
-                                  <a:latin typeface="Cambria Math" panose="02040503050406030204" pitchFamily="18" charset="0"/>
-                                </a:rPr>
-                                <m:t>)</m:t>
-                              </m:r>
-                            </m:sup>
-                          </m:sSup>
-                        </m:e>
-                      </m:d>
+                        </m:den>
+                      </m:f>
                       <m:r>
                         <a:rPr lang="pl-PL" sz="2400" b="0" i="1" smtClean="0">
                           <a:latin typeface="Cambria Math" panose="02040503050406030204" pitchFamily="18" charset="0"/>
@@ -10673,121 +10605,6 @@
                   <a:buNone/>
                 </a:pPr>
                 <a14:m>
-                  <m:oMathPara xmlns:m="http://schemas.openxmlformats.org/officeDocument/2006/math">
-                    <m:oMathParaPr>
-                      <m:jc m:val="left"/>
-                    </m:oMathParaPr>
-                    <m:oMath xmlns:m="http://schemas.openxmlformats.org/officeDocument/2006/math">
-                      <m:r>
-                        <a:rPr lang="pl-PL" sz="2400" i="1">
-                          <a:latin typeface="Cambria Math" panose="02040503050406030204" pitchFamily="18" charset="0"/>
-                        </a:rPr>
-                        <m:t>𝑠𝑖𝑔𝑛</m:t>
-                      </m:r>
-                      <m:d>
-                        <m:dPr>
-                          <m:ctrlPr>
-                            <a:rPr lang="pl-PL" sz="2400" b="0" i="1" smtClean="0">
-                              <a:latin typeface="Cambria Math" panose="02040503050406030204" pitchFamily="18" charset="0"/>
-                            </a:rPr>
-                          </m:ctrlPr>
-                        </m:dPr>
-                        <m:e>
-                          <m:r>
-                            <a:rPr lang="pl-PL" sz="2400" b="0" i="1" smtClean="0">
-                              <a:latin typeface="Cambria Math" panose="02040503050406030204" pitchFamily="18" charset="0"/>
-                            </a:rPr>
-                            <m:t>𝑥</m:t>
-                          </m:r>
-                        </m:e>
-                      </m:d>
-                      <m:r>
-                        <a:rPr lang="pl-PL" sz="2400" b="0" i="1" smtClean="0">
-                          <a:latin typeface="Cambria Math" panose="02040503050406030204" pitchFamily="18" charset="0"/>
-                        </a:rPr>
-                        <m:t>= </m:t>
-                      </m:r>
-                      <m:d>
-                        <m:dPr>
-                          <m:begChr m:val="{"/>
-                          <m:endChr m:val=""/>
-                          <m:ctrlPr>
-                            <a:rPr lang="pl-PL" sz="2400" b="0" i="1" smtClean="0">
-                              <a:latin typeface="Cambria Math" panose="02040503050406030204" pitchFamily="18" charset="0"/>
-                            </a:rPr>
-                          </m:ctrlPr>
-                        </m:dPr>
-                        <m:e>
-                          <m:eqArr>
-                            <m:eqArrPr>
-                              <m:ctrlPr>
-                                <a:rPr lang="pl-PL" sz="2400" b="0" i="1" smtClean="0">
-                                  <a:latin typeface="Cambria Math" panose="02040503050406030204" pitchFamily="18" charset="0"/>
-                                </a:rPr>
-                              </m:ctrlPr>
-                            </m:eqArrPr>
-                            <m:e>
-                              <m:r>
-                                <a:rPr lang="pl-PL" sz="2400" b="0" i="1" smtClean="0">
-                                  <a:latin typeface="Cambria Math" panose="02040503050406030204" pitchFamily="18" charset="0"/>
-                                </a:rPr>
-                                <m:t>   1,  </m:t>
-                              </m:r>
-                              <m:r>
-                                <a:rPr lang="pl-PL" sz="2400" b="0" i="1" smtClean="0">
-                                  <a:latin typeface="Cambria Math" panose="02040503050406030204" pitchFamily="18" charset="0"/>
-                                </a:rPr>
-                                <m:t>𝑥</m:t>
-                              </m:r>
-                              <m:r>
-                                <a:rPr lang="pl-PL" sz="2400" b="0" i="1" smtClean="0">
-                                  <a:latin typeface="Cambria Math" panose="02040503050406030204" pitchFamily="18" charset="0"/>
-                                </a:rPr>
-                                <m:t>≥0</m:t>
-                              </m:r>
-                            </m:e>
-                            <m:e>
-                              <m:r>
-                                <a:rPr lang="pl-PL" sz="2400" b="0" i="1" smtClean="0">
-                                  <a:latin typeface="Cambria Math" panose="02040503050406030204" pitchFamily="18" charset="0"/>
-                                </a:rPr>
-                                <m:t>−1,  </m:t>
-                              </m:r>
-                              <m:r>
-                                <a:rPr lang="pl-PL" sz="2400" i="1">
-                                  <a:latin typeface="Cambria Math" panose="02040503050406030204" pitchFamily="18" charset="0"/>
-                                </a:rPr>
-                                <m:t>𝑥</m:t>
-                              </m:r>
-                              <m:r>
-                                <a:rPr lang="pl-PL" sz="2400" b="0" i="1" smtClean="0">
-                                  <a:latin typeface="Cambria Math" panose="02040503050406030204" pitchFamily="18" charset="0"/>
-                                </a:rPr>
-                                <m:t>&lt;</m:t>
-                              </m:r>
-                              <m:r>
-                                <a:rPr lang="pl-PL" sz="2400" i="1">
-                                  <a:latin typeface="Cambria Math" panose="02040503050406030204" pitchFamily="18" charset="0"/>
-                                </a:rPr>
-                                <m:t>0</m:t>
-                              </m:r>
-                            </m:e>
-                          </m:eqArr>
-                        </m:e>
-                      </m:d>
-                    </m:oMath>
-                  </m:oMathPara>
-                </a14:m>
-                <a:endParaRPr lang="pl-PL" sz="2400" dirty="0" smtClean="0">
-                  <a:latin typeface="Calibri" panose="020F0502020204030204" pitchFamily="34" charset="0"/>
-                  <a:cs typeface="Calibri" panose="020F0502020204030204" pitchFamily="34" charset="0"/>
-                </a:endParaRPr>
-              </a:p>
-              <a:p>
-                <a:pPr marL="0" indent="0">
-                  <a:buNone/>
-                </a:pPr>
-                <a14:m>
                   <m:oMath xmlns:m="http://schemas.openxmlformats.org/officeDocument/2006/math">
                     <m:sSubSup>
                       <m:sSubSupPr>
@@ -10798,51 +10615,44 @@
                         </m:ctrlPr>
                       </m:sSubSupPr>
                       <m:e>
-                        <m:acc>
-                          <m:accPr>
-                            <m:chr m:val="̃"/>
-                            <m:ctrlPr>
-                              <a:rPr lang="pl-PL" sz="2400" i="1">
-                                <a:latin typeface="Cambria Math" panose="02040503050406030204" pitchFamily="18" charset="0"/>
-                              </a:rPr>
-                            </m:ctrlPr>
-                          </m:accPr>
-                          <m:e>
-                            <m:r>
-                              <a:rPr lang="pl-PL" sz="2400" i="1">
-                                <a:latin typeface="Cambria Math" panose="02040503050406030204" pitchFamily="18" charset="0"/>
-                              </a:rPr>
-                              <m:t>𝑥</m:t>
-                            </m:r>
-                          </m:e>
-                        </m:acc>
+                        <m:r>
+                          <a:rPr lang="pl-PL" sz="2400" i="1">
+                            <a:latin typeface="Cambria Math" panose="02040503050406030204" pitchFamily="18" charset="0"/>
+                            <a:ea typeface="Cambria Math" panose="02040503050406030204" pitchFamily="18" charset="0"/>
+                            <a:cs typeface="Calibri" panose="020F0502020204030204" pitchFamily="34" charset="0"/>
+                          </a:rPr>
+                          <m:t>𝜆</m:t>
+                        </m:r>
                       </m:e>
                       <m:sub>
                         <m:r>
-                          <a:rPr lang="pl-PL" sz="2400" i="1">
-                            <a:latin typeface="Cambria Math" panose="02040503050406030204" pitchFamily="18" charset="0"/>
-                          </a:rPr>
-                          <m:t>𝑖</m:t>
+                          <a:rPr lang="pl-PL" sz="2400" b="0" i="1" smtClean="0">
+                            <a:latin typeface="Cambria Math" panose="02040503050406030204" pitchFamily="18" charset="0"/>
+                            <a:ea typeface="Cambria Math" panose="02040503050406030204" pitchFamily="18" charset="0"/>
+                            <a:cs typeface="Calibri" panose="020F0502020204030204" pitchFamily="34" charset="0"/>
+                          </a:rPr>
+                          <m:t>𝑛</m:t>
                         </m:r>
                       </m:sub>
                       <m:sup>
-                        <m:d>
-                          <m:dPr>
-                            <m:ctrlPr>
-                              <a:rPr lang="pl-PL" sz="2400" i="1">
-                                <a:latin typeface="Cambria Math" panose="02040503050406030204" pitchFamily="18" charset="0"/>
-                              </a:rPr>
-                            </m:ctrlPr>
-                          </m:dPr>
-                          <m:e>
-                            <m:r>
-                              <a:rPr lang="pl-PL" sz="2400" i="1">
-                                <a:latin typeface="Cambria Math" panose="02040503050406030204" pitchFamily="18" charset="0"/>
-                              </a:rPr>
-                              <m:t>𝑘</m:t>
-                            </m:r>
-                          </m:e>
-                        </m:d>
+                        <m:r>
+                          <a:rPr lang="pl-PL" sz="2400" i="1">
+                            <a:latin typeface="Cambria Math" panose="02040503050406030204" pitchFamily="18" charset="0"/>
+                          </a:rPr>
+                          <m:t>(</m:t>
+                        </m:r>
+                        <m:r>
+                          <a:rPr lang="pl-PL" sz="2400" i="1">
+                            <a:latin typeface="Cambria Math" panose="02040503050406030204" pitchFamily="18" charset="0"/>
+                          </a:rPr>
+                          <m:t>𝑘</m:t>
+                        </m:r>
+                        <m:r>
+                          <a:rPr lang="pl-PL" sz="2400" i="1">
+                            <a:latin typeface="Cambria Math" panose="02040503050406030204" pitchFamily="18" charset="0"/>
+                          </a:rPr>
+                          <m:t>)</m:t>
+                        </m:r>
                       </m:sup>
                     </m:sSubSup>
                   </m:oMath>
@@ -10852,61 +10662,25 @@
                     <a:latin typeface="Calibri" panose="020F0502020204030204" pitchFamily="34" charset="0"/>
                     <a:cs typeface="Calibri" panose="020F0502020204030204" pitchFamily="34" charset="0"/>
                   </a:rPr>
-                  <a:t>	- maksymalna co do modułu współrzędna wektora </a:t>
+                  <a:t>	- przybliżenie wartości własnej w </a:t>
                 </a:r>
                 <a14:m>
                   <m:oMath xmlns:m="http://schemas.openxmlformats.org/officeDocument/2006/math">
-                    <m:sSup>
-                      <m:sSupPr>
-                        <m:ctrlPr>
-                          <a:rPr lang="pl-PL" sz="2400" i="1">
-                            <a:latin typeface="Cambria Math" panose="02040503050406030204" pitchFamily="18" charset="0"/>
-                          </a:rPr>
-                        </m:ctrlPr>
-                      </m:sSupPr>
-                      <m:e>
-                        <m:acc>
-                          <m:accPr>
-                            <m:chr m:val="̃"/>
-                            <m:ctrlPr>
-                              <a:rPr lang="pl-PL" sz="2400" i="1">
-                                <a:latin typeface="Cambria Math" panose="02040503050406030204" pitchFamily="18" charset="0"/>
-                              </a:rPr>
-                            </m:ctrlPr>
-                          </m:accPr>
-                          <m:e>
-                            <m:r>
-                              <a:rPr lang="pl-PL" sz="2400" i="1">
-                                <a:latin typeface="Cambria Math" panose="02040503050406030204" pitchFamily="18" charset="0"/>
-                              </a:rPr>
-                              <m:t>𝑥</m:t>
-                            </m:r>
-                          </m:e>
-                        </m:acc>
-                      </m:e>
-                      <m:sup>
-                        <m:r>
-                          <a:rPr lang="pl-PL" sz="2400" i="1">
-                            <a:latin typeface="Cambria Math" panose="02040503050406030204" pitchFamily="18" charset="0"/>
-                          </a:rPr>
-                          <m:t>(</m:t>
-                        </m:r>
-                        <m:r>
-                          <a:rPr lang="pl-PL" sz="2400" i="1">
-                            <a:latin typeface="Cambria Math" panose="02040503050406030204" pitchFamily="18" charset="0"/>
-                          </a:rPr>
-                          <m:t>𝑘</m:t>
-                        </m:r>
-                        <m:r>
-                          <a:rPr lang="pl-PL" sz="2400" i="1">
-                            <a:latin typeface="Cambria Math" panose="02040503050406030204" pitchFamily="18" charset="0"/>
-                          </a:rPr>
-                          <m:t>)</m:t>
-                        </m:r>
-                      </m:sup>
-                    </m:sSup>
+                    <m:r>
+                      <a:rPr lang="pl-PL" sz="2400" i="1">
+                        <a:latin typeface="Cambria Math" panose="02040503050406030204" pitchFamily="18" charset="0"/>
+                      </a:rPr>
+                      <m:t>𝑘</m:t>
+                    </m:r>
                   </m:oMath>
                 </a14:m>
+                <a:r>
+                  <a:rPr lang="pl-PL" sz="2400" dirty="0" smtClean="0">
+                    <a:latin typeface="Calibri" panose="020F0502020204030204" pitchFamily="34" charset="0"/>
+                    <a:cs typeface="Calibri" panose="020F0502020204030204" pitchFamily="34" charset="0"/>
+                  </a:rPr>
+                  <a:t>-tym kroku</a:t>
+                </a:r>
                 <a:endParaRPr lang="pl-PL" sz="2400" dirty="0" smtClean="0">
                   <a:latin typeface="Calibri" panose="020F0502020204030204" pitchFamily="34" charset="0"/>
                   <a:cs typeface="Calibri" panose="020F0502020204030204" pitchFamily="34" charset="0"/>
@@ -10931,15 +10705,13 @@
                     <a:latin typeface="Calibri" panose="020F0502020204030204" pitchFamily="34" charset="0"/>
                     <a:cs typeface="Calibri" panose="020F0502020204030204" pitchFamily="34" charset="0"/>
                   </a:rPr>
-                  <a:t>	- parametr określający </a:t>
+                  <a:t>	- parametr określający dokładność</a:t>
                 </a:r>
-                <a:r>
-                  <a:rPr lang="pl-PL" sz="2400" dirty="0" smtClean="0">
-                    <a:latin typeface="Calibri" panose="020F0502020204030204" pitchFamily="34" charset="0"/>
-                    <a:cs typeface="Calibri" panose="020F0502020204030204" pitchFamily="34" charset="0"/>
-                  </a:rPr>
-                  <a:t>dokładność</a:t>
-                </a:r>
+              </a:p>
+              <a:p>
+                <a:pPr marL="0" indent="0">
+                  <a:buNone/>
+                </a:pPr>
                 <a:endParaRPr lang="pl-PL" sz="2400" dirty="0">
                   <a:latin typeface="Calibri" panose="020F0502020204030204" pitchFamily="34" charset="0"/>
                   <a:cs typeface="Calibri" panose="020F0502020204030204" pitchFamily="34" charset="0"/>
@@ -10961,13 +10733,13 @@
             </p:nvSpPr>
             <p:spPr>
               <a:xfrm>
-                <a:off x="1593436" y="1916832"/>
-                <a:ext cx="9782801" cy="3168352"/>
+                <a:off x="1593436" y="1772816"/>
+                <a:ext cx="9782801" cy="2808312"/>
               </a:xfrm>
               <a:blipFill>
                 <a:blip r:embed="rId2"/>
                 <a:stretch>
-                  <a:fillRect l="-935"/>
+                  <a:fillRect l="-935" b="-1739"/>
                 </a:stretch>
               </a:blipFill>
             </p:spPr>
@@ -10989,7 +10761,7 @@
     </p:spTree>
     <p:extLst>
       <p:ext uri="{BB962C8B-B14F-4D97-AF65-F5344CB8AC3E}">
-        <p14:creationId xmlns:p14="http://schemas.microsoft.com/office/powerpoint/2010/main" val="3874404765"/>
+        <p14:creationId xmlns:p14="http://schemas.microsoft.com/office/powerpoint/2010/main" val="3476693267"/>
       </p:ext>
     </p:extLst>
   </p:cSld>
@@ -11071,8 +10843,8 @@
           </a:p>
         </p:txBody>
       </p:sp>
-      <mc:AlternateContent xmlns:mc="http://schemas.openxmlformats.org/markup-compatibility/2006">
-        <mc:Choice xmlns:a14="http://schemas.microsoft.com/office/drawing/2010/main" Requires="a14">
+      <mc:AlternateContent xmlns:mc="http://schemas.openxmlformats.org/markup-compatibility/2006" xmlns:a14="http://schemas.microsoft.com/office/drawing/2010/main">
+        <mc:Choice Requires="a14">
           <p:sp>
             <p:nvSpPr>
               <p:cNvPr id="4" name="Symbol zastępczy zawartości 2"/>
@@ -11583,7 +11355,7 @@
             </p:txBody>
           </p:sp>
         </mc:Choice>
-        <mc:Fallback>
+        <mc:Fallback xmlns="">
           <p:sp>
             <p:nvSpPr>
               <p:cNvPr id="4" name="Symbol zastępczy zawartości 2"/>
@@ -11762,8 +11534,8 @@
           <a:chExt cx="0" cy="0"/>
         </a:xfrm>
       </p:grpSpPr>
-      <mc:AlternateContent xmlns:mc="http://schemas.openxmlformats.org/markup-compatibility/2006">
-        <mc:Choice xmlns:a14="http://schemas.microsoft.com/office/drawing/2010/main" Requires="a14">
+      <mc:AlternateContent xmlns:mc="http://schemas.openxmlformats.org/markup-compatibility/2006" xmlns:a14="http://schemas.microsoft.com/office/drawing/2010/main">
+        <mc:Choice Requires="a14">
           <p:sp>
             <p:nvSpPr>
               <p:cNvPr id="3" name="Symbol zastępczy zawartości 2"/>
@@ -11955,7 +11727,7 @@
             </p:txBody>
           </p:sp>
         </mc:Choice>
-        <mc:Fallback>
+        <mc:Fallback xmlns="">
           <p:sp>
             <p:nvSpPr>
               <p:cNvPr id="3" name="Symbol zastępczy zawartości 2"/>
@@ -12138,7 +11910,7 @@
             <p:spPr>
               <a:xfrm>
                 <a:off x="1629916" y="1844824"/>
-                <a:ext cx="9505056" cy="2088232"/>
+                <a:ext cx="9505056" cy="3960440"/>
               </a:xfrm>
             </p:spPr>
             <p:txBody>
@@ -12317,8 +12089,19 @@
                     <a:latin typeface="Calibri" panose="020F0502020204030204" pitchFamily="34" charset="0"/>
                     <a:cs typeface="Calibri" panose="020F0502020204030204" pitchFamily="34" charset="0"/>
                   </a:rPr>
-                  <a:t> (tym samym odwracalna)</a:t>
+                  <a:t> (tym samym odwracalna</a:t>
                 </a:r>
+                <a:r>
+                  <a:rPr lang="pl-PL" sz="2400" dirty="0" smtClean="0">
+                    <a:latin typeface="Calibri" panose="020F0502020204030204" pitchFamily="34" charset="0"/>
+                    <a:cs typeface="Calibri" panose="020F0502020204030204" pitchFamily="34" charset="0"/>
+                  </a:rPr>
+                  <a:t>).</a:t>
+                </a:r>
+                <a:endParaRPr lang="pl-PL" sz="2400" dirty="0" smtClean="0">
+                  <a:latin typeface="Calibri" panose="020F0502020204030204" pitchFamily="34" charset="0"/>
+                  <a:cs typeface="Calibri" panose="020F0502020204030204" pitchFamily="34" charset="0"/>
+                </a:endParaRPr>
               </a:p>
               <a:p>
                 <a:r>
@@ -12457,6 +12240,578 @@
                   <a:t>.</a:t>
                 </a:r>
               </a:p>
+              <a:p>
+                <a:r>
+                  <a:rPr lang="pl-PL" sz="2400" dirty="0" smtClean="0">
+                    <a:latin typeface="Calibri" panose="020F0502020204030204" pitchFamily="34" charset="0"/>
+                    <a:cs typeface="Calibri" panose="020F0502020204030204" pitchFamily="34" charset="0"/>
+                  </a:rPr>
+                  <a:t>Dla każdego wektora </a:t>
+                </a:r>
+                <a14:m>
+                  <m:oMath xmlns:m="http://schemas.openxmlformats.org/officeDocument/2006/math">
+                    <m:r>
+                      <a:rPr lang="pl-PL" sz="2400" b="0" i="1" smtClean="0">
+                        <a:latin typeface="Cambria Math" panose="02040503050406030204" pitchFamily="18" charset="0"/>
+                        <a:cs typeface="Calibri" panose="020F0502020204030204" pitchFamily="34" charset="0"/>
+                      </a:rPr>
+                      <m:t>𝑥</m:t>
+                    </m:r>
+                    <m:r>
+                      <a:rPr lang="pl-PL" sz="2400" dirty="0">
+                        <a:latin typeface="Cambria Math" panose="02040503050406030204" pitchFamily="18" charset="0"/>
+                        <a:ea typeface="Cambria Math" panose="02040503050406030204" pitchFamily="18" charset="0"/>
+                        <a:cs typeface="Calibri" panose="020F0502020204030204" pitchFamily="34" charset="0"/>
+                      </a:rPr>
+                      <m:t>∈</m:t>
+                    </m:r>
+                    <m:sSup>
+                      <m:sSupPr>
+                        <m:ctrlPr>
+                          <a:rPr lang="pl-PL" sz="2400" i="1" dirty="0" smtClean="0">
+                            <a:latin typeface="Cambria Math" panose="02040503050406030204" pitchFamily="18" charset="0"/>
+                            <a:ea typeface="Cambria Math" panose="02040503050406030204" pitchFamily="18" charset="0"/>
+                            <a:cs typeface="Calibri" panose="020F0502020204030204" pitchFamily="34" charset="0"/>
+                          </a:rPr>
+                        </m:ctrlPr>
+                      </m:sSupPr>
+                      <m:e>
+                        <m:r>
+                          <a:rPr lang="pl-PL" sz="2400" b="0" i="1" dirty="0" smtClean="0">
+                            <a:latin typeface="Cambria Math" panose="02040503050406030204" pitchFamily="18" charset="0"/>
+                            <a:ea typeface="Cambria Math" panose="02040503050406030204" pitchFamily="18" charset="0"/>
+                            <a:cs typeface="Calibri" panose="020F0502020204030204" pitchFamily="34" charset="0"/>
+                          </a:rPr>
+                          <m:t>𝑅</m:t>
+                        </m:r>
+                      </m:e>
+                      <m:sup>
+                        <m:r>
+                          <a:rPr lang="pl-PL" sz="2400" b="0" i="1" dirty="0" smtClean="0">
+                            <a:latin typeface="Cambria Math" panose="02040503050406030204" pitchFamily="18" charset="0"/>
+                            <a:ea typeface="Cambria Math" panose="02040503050406030204" pitchFamily="18" charset="0"/>
+                            <a:cs typeface="Calibri" panose="020F0502020204030204" pitchFamily="34" charset="0"/>
+                          </a:rPr>
+                          <m:t>𝑛</m:t>
+                        </m:r>
+                      </m:sup>
+                    </m:sSup>
+                  </m:oMath>
+                </a14:m>
+                <a:r>
+                  <a:rPr lang="pl-PL" sz="2400" dirty="0" smtClean="0">
+                    <a:latin typeface="Calibri" panose="020F0502020204030204" pitchFamily="34" charset="0"/>
+                    <a:cs typeface="Calibri" panose="020F0502020204030204" pitchFamily="34" charset="0"/>
+                  </a:rPr>
+                  <a:t> mamy: </a:t>
+                </a:r>
+                <a14:m>
+                  <m:oMath xmlns:m="http://schemas.openxmlformats.org/officeDocument/2006/math">
+                    <m:sSub>
+                      <m:sSubPr>
+                        <m:ctrlPr>
+                          <a:rPr lang="pl-PL" sz="2400" i="1" smtClean="0">
+                            <a:latin typeface="Cambria Math" panose="02040503050406030204" pitchFamily="18" charset="0"/>
+                            <a:cs typeface="Calibri" panose="020F0502020204030204" pitchFamily="34" charset="0"/>
+                          </a:rPr>
+                        </m:ctrlPr>
+                      </m:sSubPr>
+                      <m:e>
+                        <m:d>
+                          <m:dPr>
+                            <m:begChr m:val="‖"/>
+                            <m:endChr m:val="‖"/>
+                            <m:ctrlPr>
+                              <a:rPr lang="pl-PL" sz="2400" i="1">
+                                <a:latin typeface="Cambria Math" panose="02040503050406030204" pitchFamily="18" charset="0"/>
+                                <a:cs typeface="Calibri" panose="020F0502020204030204" pitchFamily="34" charset="0"/>
+                              </a:rPr>
+                            </m:ctrlPr>
+                          </m:dPr>
+                          <m:e>
+                            <m:r>
+                              <a:rPr lang="pl-PL" sz="2400" i="1">
+                                <a:latin typeface="Cambria Math" panose="02040503050406030204" pitchFamily="18" charset="0"/>
+                                <a:cs typeface="Calibri" panose="020F0502020204030204" pitchFamily="34" charset="0"/>
+                              </a:rPr>
+                              <m:t>𝐻𝑥</m:t>
+                            </m:r>
+                          </m:e>
+                        </m:d>
+                      </m:e>
+                      <m:sub>
+                        <m:r>
+                          <a:rPr lang="pl-PL" sz="2400" b="0" i="1" smtClean="0">
+                            <a:latin typeface="Cambria Math" panose="02040503050406030204" pitchFamily="18" charset="0"/>
+                            <a:cs typeface="Calibri" panose="020F0502020204030204" pitchFamily="34" charset="0"/>
+                          </a:rPr>
+                          <m:t>2</m:t>
+                        </m:r>
+                      </m:sub>
+                    </m:sSub>
+                    <m:r>
+                      <a:rPr lang="pl-PL" sz="2400" b="0" i="1" smtClean="0">
+                        <a:latin typeface="Cambria Math" panose="02040503050406030204" pitchFamily="18" charset="0"/>
+                        <a:cs typeface="Calibri" panose="020F0502020204030204" pitchFamily="34" charset="0"/>
+                      </a:rPr>
+                      <m:t>=</m:t>
+                    </m:r>
+                    <m:sSub>
+                      <m:sSubPr>
+                        <m:ctrlPr>
+                          <a:rPr lang="pl-PL" sz="2400" i="1">
+                            <a:latin typeface="Cambria Math" panose="02040503050406030204" pitchFamily="18" charset="0"/>
+                            <a:cs typeface="Calibri" panose="020F0502020204030204" pitchFamily="34" charset="0"/>
+                          </a:rPr>
+                        </m:ctrlPr>
+                      </m:sSubPr>
+                      <m:e>
+                        <m:d>
+                          <m:dPr>
+                            <m:begChr m:val="‖"/>
+                            <m:endChr m:val="‖"/>
+                            <m:ctrlPr>
+                              <a:rPr lang="pl-PL" sz="2400" i="1">
+                                <a:latin typeface="Cambria Math" panose="02040503050406030204" pitchFamily="18" charset="0"/>
+                                <a:cs typeface="Calibri" panose="020F0502020204030204" pitchFamily="34" charset="0"/>
+                              </a:rPr>
+                            </m:ctrlPr>
+                          </m:dPr>
+                          <m:e>
+                            <m:r>
+                              <a:rPr lang="pl-PL" sz="2400" i="1">
+                                <a:latin typeface="Cambria Math" panose="02040503050406030204" pitchFamily="18" charset="0"/>
+                                <a:cs typeface="Calibri" panose="020F0502020204030204" pitchFamily="34" charset="0"/>
+                              </a:rPr>
+                              <m:t>𝑥</m:t>
+                            </m:r>
+                          </m:e>
+                        </m:d>
+                      </m:e>
+                      <m:sub>
+                        <m:r>
+                          <a:rPr lang="pl-PL" sz="2400" i="1">
+                            <a:latin typeface="Cambria Math" panose="02040503050406030204" pitchFamily="18" charset="0"/>
+                            <a:cs typeface="Calibri" panose="020F0502020204030204" pitchFamily="34" charset="0"/>
+                          </a:rPr>
+                          <m:t>2</m:t>
+                        </m:r>
+                      </m:sub>
+                    </m:sSub>
+                  </m:oMath>
+                </a14:m>
+                <a:r>
+                  <a:rPr lang="pl-PL" sz="2400" dirty="0" smtClean="0">
+                    <a:latin typeface="Calibri" panose="020F0502020204030204" pitchFamily="34" charset="0"/>
+                    <a:cs typeface="Calibri" panose="020F0502020204030204" pitchFamily="34" charset="0"/>
+                  </a:rPr>
+                  <a:t>.</a:t>
+                </a:r>
+              </a:p>
+              <a:p>
+                <a:r>
+                  <a:rPr lang="pl-PL" sz="2400" dirty="0" smtClean="0">
+                    <a:latin typeface="Calibri" panose="020F0502020204030204" pitchFamily="34" charset="0"/>
+                    <a:cs typeface="Calibri" panose="020F0502020204030204" pitchFamily="34" charset="0"/>
+                  </a:rPr>
+                  <a:t>Dla każdej macierzy </a:t>
+                </a:r>
+                <a14:m>
+                  <m:oMath xmlns:m="http://schemas.openxmlformats.org/officeDocument/2006/math">
+                    <m:r>
+                      <m:rPr>
+                        <m:sty m:val="p"/>
+                      </m:rPr>
+                      <a:rPr lang="pl-PL" sz="2400" dirty="0">
+                        <a:latin typeface="Cambria Math" panose="02040503050406030204" pitchFamily="18" charset="0"/>
+                        <a:ea typeface="Cambria Math" panose="02040503050406030204" pitchFamily="18" charset="0"/>
+                        <a:cs typeface="Calibri" panose="020F0502020204030204" pitchFamily="34" charset="0"/>
+                      </a:rPr>
+                      <m:t>M</m:t>
+                    </m:r>
+                    <m:r>
+                      <a:rPr lang="pl-PL" sz="2400" dirty="0">
+                        <a:latin typeface="Cambria Math" panose="02040503050406030204" pitchFamily="18" charset="0"/>
+                        <a:ea typeface="Cambria Math" panose="02040503050406030204" pitchFamily="18" charset="0"/>
+                        <a:cs typeface="Calibri" panose="020F0502020204030204" pitchFamily="34" charset="0"/>
+                      </a:rPr>
+                      <m:t>∈</m:t>
+                    </m:r>
+                    <m:sSup>
+                      <m:sSupPr>
+                        <m:ctrlPr>
+                          <a:rPr lang="pl-PL" sz="2400" i="1" dirty="0">
+                            <a:latin typeface="Cambria Math" panose="02040503050406030204" pitchFamily="18" charset="0"/>
+                            <a:ea typeface="Cambria Math" panose="02040503050406030204" pitchFamily="18" charset="0"/>
+                            <a:cs typeface="Calibri" panose="020F0502020204030204" pitchFamily="34" charset="0"/>
+                          </a:rPr>
+                        </m:ctrlPr>
+                      </m:sSupPr>
+                      <m:e>
+                        <m:r>
+                          <a:rPr lang="pl-PL" sz="2400" i="1" dirty="0">
+                            <a:latin typeface="Cambria Math" panose="02040503050406030204" pitchFamily="18" charset="0"/>
+                            <a:ea typeface="Cambria Math" panose="02040503050406030204" pitchFamily="18" charset="0"/>
+                            <a:cs typeface="Calibri" panose="020F0502020204030204" pitchFamily="34" charset="0"/>
+                          </a:rPr>
+                          <m:t>𝑅</m:t>
+                        </m:r>
+                      </m:e>
+                      <m:sup>
+                        <m:r>
+                          <a:rPr lang="pl-PL" sz="2400" i="1" dirty="0">
+                            <a:latin typeface="Cambria Math" panose="02040503050406030204" pitchFamily="18" charset="0"/>
+                            <a:ea typeface="Cambria Math" panose="02040503050406030204" pitchFamily="18" charset="0"/>
+                            <a:cs typeface="Calibri" panose="020F0502020204030204" pitchFamily="34" charset="0"/>
+                          </a:rPr>
+                          <m:t>𝑛</m:t>
+                        </m:r>
+                        <m:r>
+                          <a:rPr lang="pl-PL" sz="2400" i="1" dirty="0" smtClean="0">
+                            <a:latin typeface="Cambria Math" panose="02040503050406030204" pitchFamily="18" charset="0"/>
+                            <a:ea typeface="Cambria Math" panose="02040503050406030204" pitchFamily="18" charset="0"/>
+                            <a:cs typeface="Calibri" panose="020F0502020204030204" pitchFamily="34" charset="0"/>
+                          </a:rPr>
+                          <m:t>×</m:t>
+                        </m:r>
+                        <m:r>
+                          <a:rPr lang="pl-PL" sz="2400" b="0" i="1" dirty="0" smtClean="0">
+                            <a:latin typeface="Cambria Math" panose="02040503050406030204" pitchFamily="18" charset="0"/>
+                            <a:ea typeface="Cambria Math" panose="02040503050406030204" pitchFamily="18" charset="0"/>
+                            <a:cs typeface="Calibri" panose="020F0502020204030204" pitchFamily="34" charset="0"/>
+                          </a:rPr>
+                          <m:t>𝑛</m:t>
+                        </m:r>
+                      </m:sup>
+                    </m:sSup>
+                  </m:oMath>
+                </a14:m>
+                <a:r>
+                  <a:rPr lang="pl-PL" sz="2400" dirty="0" smtClean="0">
+                    <a:latin typeface="Calibri" panose="020F0502020204030204" pitchFamily="34" charset="0"/>
+                    <a:cs typeface="Calibri" panose="020F0502020204030204" pitchFamily="34" charset="0"/>
+                  </a:rPr>
+                  <a:t> mamy: </a:t>
+                </a:r>
+                <a14:m>
+                  <m:oMath xmlns:m="http://schemas.openxmlformats.org/officeDocument/2006/math">
+                    <m:sSub>
+                      <m:sSubPr>
+                        <m:ctrlPr>
+                          <a:rPr lang="pl-PL" sz="2400" i="1">
+                            <a:latin typeface="Cambria Math" panose="02040503050406030204" pitchFamily="18" charset="0"/>
+                            <a:cs typeface="Calibri" panose="020F0502020204030204" pitchFamily="34" charset="0"/>
+                          </a:rPr>
+                        </m:ctrlPr>
+                      </m:sSubPr>
+                      <m:e>
+                        <m:d>
+                          <m:dPr>
+                            <m:begChr m:val="‖"/>
+                            <m:endChr m:val="‖"/>
+                            <m:ctrlPr>
+                              <a:rPr lang="pl-PL" sz="2400" i="1">
+                                <a:latin typeface="Cambria Math" panose="02040503050406030204" pitchFamily="18" charset="0"/>
+                                <a:cs typeface="Calibri" panose="020F0502020204030204" pitchFamily="34" charset="0"/>
+                              </a:rPr>
+                            </m:ctrlPr>
+                          </m:dPr>
+                          <m:e>
+                            <m:r>
+                              <a:rPr lang="pl-PL" sz="2400" i="1">
+                                <a:latin typeface="Cambria Math" panose="02040503050406030204" pitchFamily="18" charset="0"/>
+                                <a:cs typeface="Calibri" panose="020F0502020204030204" pitchFamily="34" charset="0"/>
+                              </a:rPr>
+                              <m:t>𝐻</m:t>
+                            </m:r>
+                            <m:r>
+                              <a:rPr lang="pl-PL" sz="2400" b="0" i="1" smtClean="0">
+                                <a:latin typeface="Cambria Math" panose="02040503050406030204" pitchFamily="18" charset="0"/>
+                                <a:cs typeface="Calibri" panose="020F0502020204030204" pitchFamily="34" charset="0"/>
+                              </a:rPr>
+                              <m:t>𝑀</m:t>
+                            </m:r>
+                          </m:e>
+                        </m:d>
+                      </m:e>
+                      <m:sub>
+                        <m:r>
+                          <a:rPr lang="pl-PL" sz="2400" i="1">
+                            <a:latin typeface="Cambria Math" panose="02040503050406030204" pitchFamily="18" charset="0"/>
+                            <a:cs typeface="Calibri" panose="020F0502020204030204" pitchFamily="34" charset="0"/>
+                          </a:rPr>
+                          <m:t>2</m:t>
+                        </m:r>
+                      </m:sub>
+                    </m:sSub>
+                    <m:r>
+                      <a:rPr lang="pl-PL" sz="2400" i="1">
+                        <a:latin typeface="Cambria Math" panose="02040503050406030204" pitchFamily="18" charset="0"/>
+                        <a:cs typeface="Calibri" panose="020F0502020204030204" pitchFamily="34" charset="0"/>
+                      </a:rPr>
+                      <m:t>=</m:t>
+                    </m:r>
+                    <m:sSub>
+                      <m:sSubPr>
+                        <m:ctrlPr>
+                          <a:rPr lang="pl-PL" sz="2400" i="1">
+                            <a:latin typeface="Cambria Math" panose="02040503050406030204" pitchFamily="18" charset="0"/>
+                            <a:cs typeface="Calibri" panose="020F0502020204030204" pitchFamily="34" charset="0"/>
+                          </a:rPr>
+                        </m:ctrlPr>
+                      </m:sSubPr>
+                      <m:e>
+                        <m:d>
+                          <m:dPr>
+                            <m:begChr m:val="‖"/>
+                            <m:endChr m:val="‖"/>
+                            <m:ctrlPr>
+                              <a:rPr lang="pl-PL" sz="2400" i="1">
+                                <a:latin typeface="Cambria Math" panose="02040503050406030204" pitchFamily="18" charset="0"/>
+                                <a:cs typeface="Calibri" panose="020F0502020204030204" pitchFamily="34" charset="0"/>
+                              </a:rPr>
+                            </m:ctrlPr>
+                          </m:dPr>
+                          <m:e>
+                            <m:r>
+                              <a:rPr lang="pl-PL" sz="2400" b="0" i="1" smtClean="0">
+                                <a:latin typeface="Cambria Math" panose="02040503050406030204" pitchFamily="18" charset="0"/>
+                                <a:cs typeface="Calibri" panose="020F0502020204030204" pitchFamily="34" charset="0"/>
+                              </a:rPr>
+                              <m:t>𝑀</m:t>
+                            </m:r>
+                          </m:e>
+                        </m:d>
+                      </m:e>
+                      <m:sub>
+                        <m:r>
+                          <a:rPr lang="pl-PL" sz="2400" i="1">
+                            <a:latin typeface="Cambria Math" panose="02040503050406030204" pitchFamily="18" charset="0"/>
+                            <a:cs typeface="Calibri" panose="020F0502020204030204" pitchFamily="34" charset="0"/>
+                          </a:rPr>
+                          <m:t>2</m:t>
+                        </m:r>
+                      </m:sub>
+                    </m:sSub>
+                  </m:oMath>
+                </a14:m>
+                <a:r>
+                  <a:rPr lang="pl-PL" sz="2400" dirty="0" smtClean="0">
+                    <a:latin typeface="Calibri" panose="020F0502020204030204" pitchFamily="34" charset="0"/>
+                    <a:cs typeface="Calibri" panose="020F0502020204030204" pitchFamily="34" charset="0"/>
+                  </a:rPr>
+                  <a:t>.</a:t>
+                </a:r>
+              </a:p>
+              <a:p>
+                <a:r>
+                  <a:rPr lang="pl-PL" sz="2400" dirty="0">
+                    <a:latin typeface="Calibri" panose="020F0502020204030204" pitchFamily="34" charset="0"/>
+                    <a:cs typeface="Calibri" panose="020F0502020204030204" pitchFamily="34" charset="0"/>
+                  </a:rPr>
+                  <a:t>Dla każdej macierzy </a:t>
+                </a:r>
+                <a14:m>
+                  <m:oMath xmlns:m="http://schemas.openxmlformats.org/officeDocument/2006/math">
+                    <m:r>
+                      <m:rPr>
+                        <m:sty m:val="p"/>
+                      </m:rPr>
+                      <a:rPr lang="pl-PL" sz="2400" dirty="0">
+                        <a:latin typeface="Cambria Math" panose="02040503050406030204" pitchFamily="18" charset="0"/>
+                        <a:ea typeface="Cambria Math" panose="02040503050406030204" pitchFamily="18" charset="0"/>
+                        <a:cs typeface="Calibri" panose="020F0502020204030204" pitchFamily="34" charset="0"/>
+                      </a:rPr>
+                      <m:t>M</m:t>
+                    </m:r>
+                    <m:r>
+                      <a:rPr lang="pl-PL" sz="2400" dirty="0">
+                        <a:latin typeface="Cambria Math" panose="02040503050406030204" pitchFamily="18" charset="0"/>
+                        <a:ea typeface="Cambria Math" panose="02040503050406030204" pitchFamily="18" charset="0"/>
+                        <a:cs typeface="Calibri" panose="020F0502020204030204" pitchFamily="34" charset="0"/>
+                      </a:rPr>
+                      <m:t>∈</m:t>
+                    </m:r>
+                    <m:sSup>
+                      <m:sSupPr>
+                        <m:ctrlPr>
+                          <a:rPr lang="pl-PL" sz="2400" i="1" dirty="0">
+                            <a:latin typeface="Cambria Math" panose="02040503050406030204" pitchFamily="18" charset="0"/>
+                            <a:ea typeface="Cambria Math" panose="02040503050406030204" pitchFamily="18" charset="0"/>
+                            <a:cs typeface="Calibri" panose="020F0502020204030204" pitchFamily="34" charset="0"/>
+                          </a:rPr>
+                        </m:ctrlPr>
+                      </m:sSupPr>
+                      <m:e>
+                        <m:r>
+                          <a:rPr lang="pl-PL" sz="2400" i="1" dirty="0">
+                            <a:latin typeface="Cambria Math" panose="02040503050406030204" pitchFamily="18" charset="0"/>
+                            <a:ea typeface="Cambria Math" panose="02040503050406030204" pitchFamily="18" charset="0"/>
+                            <a:cs typeface="Calibri" panose="020F0502020204030204" pitchFamily="34" charset="0"/>
+                          </a:rPr>
+                          <m:t>𝑅</m:t>
+                        </m:r>
+                      </m:e>
+                      <m:sup>
+                        <m:r>
+                          <a:rPr lang="pl-PL" sz="2400" i="1" dirty="0">
+                            <a:latin typeface="Cambria Math" panose="02040503050406030204" pitchFamily="18" charset="0"/>
+                            <a:ea typeface="Cambria Math" panose="02040503050406030204" pitchFamily="18" charset="0"/>
+                            <a:cs typeface="Calibri" panose="020F0502020204030204" pitchFamily="34" charset="0"/>
+                          </a:rPr>
+                          <m:t>𝑛</m:t>
+                        </m:r>
+                        <m:r>
+                          <a:rPr lang="pl-PL" sz="2400" i="1" dirty="0">
+                            <a:latin typeface="Cambria Math" panose="02040503050406030204" pitchFamily="18" charset="0"/>
+                            <a:ea typeface="Cambria Math" panose="02040503050406030204" pitchFamily="18" charset="0"/>
+                            <a:cs typeface="Calibri" panose="020F0502020204030204" pitchFamily="34" charset="0"/>
+                          </a:rPr>
+                          <m:t>×</m:t>
+                        </m:r>
+                        <m:r>
+                          <a:rPr lang="pl-PL" sz="2400" i="1" dirty="0">
+                            <a:latin typeface="Cambria Math" panose="02040503050406030204" pitchFamily="18" charset="0"/>
+                            <a:ea typeface="Cambria Math" panose="02040503050406030204" pitchFamily="18" charset="0"/>
+                            <a:cs typeface="Calibri" panose="020F0502020204030204" pitchFamily="34" charset="0"/>
+                          </a:rPr>
+                          <m:t>𝑛</m:t>
+                        </m:r>
+                      </m:sup>
+                    </m:sSup>
+                  </m:oMath>
+                </a14:m>
+                <a:r>
+                  <a:rPr lang="pl-PL" sz="2400" dirty="0">
+                    <a:latin typeface="Calibri" panose="020F0502020204030204" pitchFamily="34" charset="0"/>
+                    <a:cs typeface="Calibri" panose="020F0502020204030204" pitchFamily="34" charset="0"/>
+                  </a:rPr>
+                  <a:t> mamy</a:t>
+                </a:r>
+                <a:r>
+                  <a:rPr lang="pl-PL" sz="2400" dirty="0" smtClean="0">
+                    <a:latin typeface="Calibri" panose="020F0502020204030204" pitchFamily="34" charset="0"/>
+                    <a:cs typeface="Calibri" panose="020F0502020204030204" pitchFamily="34" charset="0"/>
+                  </a:rPr>
+                  <a:t>: </a:t>
+                </a:r>
+                <a14:m>
+                  <m:oMath xmlns:m="http://schemas.openxmlformats.org/officeDocument/2006/math">
+                    <m:sSub>
+                      <m:sSubPr>
+                        <m:ctrlPr>
+                          <a:rPr lang="pl-PL" sz="2400" b="0" i="1" smtClean="0">
+                            <a:latin typeface="Cambria Math" panose="02040503050406030204" pitchFamily="18" charset="0"/>
+                            <a:cs typeface="Calibri" panose="020F0502020204030204" pitchFamily="34" charset="0"/>
+                          </a:rPr>
+                        </m:ctrlPr>
+                      </m:sSubPr>
+                      <m:e>
+                        <m:r>
+                          <a:rPr lang="pl-PL" sz="2400" i="1">
+                            <a:latin typeface="Cambria Math" panose="02040503050406030204" pitchFamily="18" charset="0"/>
+                            <a:cs typeface="Calibri" panose="020F0502020204030204" pitchFamily="34" charset="0"/>
+                          </a:rPr>
+                          <m:t>𝑐𝑜𝑛𝑑</m:t>
+                        </m:r>
+                      </m:e>
+                      <m:sub>
+                        <m:r>
+                          <a:rPr lang="pl-PL" sz="2400" b="0" i="1" smtClean="0">
+                            <a:latin typeface="Cambria Math" panose="02040503050406030204" pitchFamily="18" charset="0"/>
+                            <a:cs typeface="Calibri" panose="020F0502020204030204" pitchFamily="34" charset="0"/>
+                          </a:rPr>
+                          <m:t>2</m:t>
+                        </m:r>
+                      </m:sub>
+                    </m:sSub>
+                    <m:d>
+                      <m:dPr>
+                        <m:ctrlPr>
+                          <a:rPr lang="pl-PL" sz="2400" b="0" i="1" smtClean="0">
+                            <a:latin typeface="Cambria Math" panose="02040503050406030204" pitchFamily="18" charset="0"/>
+                            <a:cs typeface="Calibri" panose="020F0502020204030204" pitchFamily="34" charset="0"/>
+                          </a:rPr>
+                        </m:ctrlPr>
+                      </m:dPr>
+                      <m:e>
+                        <m:r>
+                          <a:rPr lang="pl-PL" sz="2400" b="0" i="1" smtClean="0">
+                            <a:latin typeface="Cambria Math" panose="02040503050406030204" pitchFamily="18" charset="0"/>
+                            <a:cs typeface="Calibri" panose="020F0502020204030204" pitchFamily="34" charset="0"/>
+                          </a:rPr>
+                          <m:t>𝐻𝑀</m:t>
+                        </m:r>
+                      </m:e>
+                    </m:d>
+                    <m:r>
+                      <a:rPr lang="pl-PL" sz="2400" b="0" i="1" smtClean="0">
+                        <a:latin typeface="Cambria Math" panose="02040503050406030204" pitchFamily="18" charset="0"/>
+                        <a:cs typeface="Calibri" panose="020F0502020204030204" pitchFamily="34" charset="0"/>
+                      </a:rPr>
+                      <m:t>=</m:t>
+                    </m:r>
+                    <m:sSub>
+                      <m:sSubPr>
+                        <m:ctrlPr>
+                          <a:rPr lang="pl-PL" sz="2400" i="1">
+                            <a:latin typeface="Cambria Math" panose="02040503050406030204" pitchFamily="18" charset="0"/>
+                            <a:cs typeface="Calibri" panose="020F0502020204030204" pitchFamily="34" charset="0"/>
+                          </a:rPr>
+                        </m:ctrlPr>
+                      </m:sSubPr>
+                      <m:e>
+                        <m:r>
+                          <a:rPr lang="pl-PL" sz="2400" i="1">
+                            <a:latin typeface="Cambria Math" panose="02040503050406030204" pitchFamily="18" charset="0"/>
+                            <a:cs typeface="Calibri" panose="020F0502020204030204" pitchFamily="34" charset="0"/>
+                          </a:rPr>
+                          <m:t>𝑐𝑜𝑛𝑑</m:t>
+                        </m:r>
+                      </m:e>
+                      <m:sub>
+                        <m:r>
+                          <a:rPr lang="pl-PL" sz="2400" i="1">
+                            <a:latin typeface="Cambria Math" panose="02040503050406030204" pitchFamily="18" charset="0"/>
+                            <a:cs typeface="Calibri" panose="020F0502020204030204" pitchFamily="34" charset="0"/>
+                          </a:rPr>
+                          <m:t>2</m:t>
+                        </m:r>
+                      </m:sub>
+                    </m:sSub>
+                    <m:d>
+                      <m:dPr>
+                        <m:ctrlPr>
+                          <a:rPr lang="pl-PL" sz="2400" i="1">
+                            <a:latin typeface="Cambria Math" panose="02040503050406030204" pitchFamily="18" charset="0"/>
+                            <a:cs typeface="Calibri" panose="020F0502020204030204" pitchFamily="34" charset="0"/>
+                          </a:rPr>
+                        </m:ctrlPr>
+                      </m:dPr>
+                      <m:e>
+                        <m:r>
+                          <a:rPr lang="pl-PL" sz="2400" i="1">
+                            <a:latin typeface="Cambria Math" panose="02040503050406030204" pitchFamily="18" charset="0"/>
+                            <a:cs typeface="Calibri" panose="020F0502020204030204" pitchFamily="34" charset="0"/>
+                          </a:rPr>
+                          <m:t>𝑀</m:t>
+                        </m:r>
+                      </m:e>
+                    </m:d>
+                  </m:oMath>
+                </a14:m>
+                <a:r>
+                  <a:rPr lang="pl-PL" sz="2400" dirty="0" smtClean="0">
+                    <a:latin typeface="Calibri" panose="020F0502020204030204" pitchFamily="34" charset="0"/>
+                    <a:cs typeface="Calibri" panose="020F0502020204030204" pitchFamily="34" charset="0"/>
+                  </a:rPr>
+                  <a:t>.</a:t>
+                </a:r>
+                <a:endParaRPr lang="pl-PL" sz="2400" dirty="0" smtClean="0">
+                  <a:latin typeface="Calibri" panose="020F0502020204030204" pitchFamily="34" charset="0"/>
+                  <a:cs typeface="Calibri" panose="020F0502020204030204" pitchFamily="34" charset="0"/>
+                </a:endParaRPr>
+              </a:p>
             </p:txBody>
           </p:sp>
         </mc:Choice>
@@ -12474,12 +12829,12 @@
             <p:spPr>
               <a:xfrm>
                 <a:off x="1629916" y="1844824"/>
-                <a:ext cx="9505056" cy="2088232"/>
+                <a:ext cx="9505056" cy="3960440"/>
               </a:xfrm>
               <a:blipFill>
                 <a:blip r:embed="rId2"/>
                 <a:stretch>
-                  <a:fillRect l="-833" t="-4094"/>
+                  <a:fillRect l="-833" t="-2157"/>
                 </a:stretch>
               </a:blipFill>
             </p:spPr>
@@ -12583,8 +12938,8 @@
           </a:p>
         </p:txBody>
       </p:sp>
-      <mc:AlternateContent xmlns:mc="http://schemas.openxmlformats.org/markup-compatibility/2006">
-        <mc:Choice xmlns:a14="http://schemas.microsoft.com/office/drawing/2010/main" Requires="a14">
+      <mc:AlternateContent xmlns:mc="http://schemas.openxmlformats.org/markup-compatibility/2006" xmlns:a14="http://schemas.microsoft.com/office/drawing/2010/main">
+        <mc:Choice Requires="a14">
           <p:sp>
             <p:nvSpPr>
               <p:cNvPr id="3" name="Symbol zastępczy zawartości 2"/>
@@ -12676,7 +13031,7 @@
             </p:txBody>
           </p:sp>
         </mc:Choice>
-        <mc:Fallback>
+        <mc:Fallback xmlns="">
           <p:sp>
             <p:nvSpPr>
               <p:cNvPr id="3" name="Symbol zastępczy zawartości 2"/>
@@ -12988,7 +13343,7 @@
             <p:spPr>
               <a:xfrm>
                 <a:off x="1701924" y="1700808"/>
-                <a:ext cx="4248472" cy="1872208"/>
+                <a:ext cx="4608512" cy="1872208"/>
               </a:xfrm>
             </p:spPr>
             <p:txBody>
@@ -13093,12 +13448,12 @@
             <p:spPr>
               <a:xfrm>
                 <a:off x="1701924" y="1700808"/>
-                <a:ext cx="4248472" cy="1872208"/>
+                <a:ext cx="4608512" cy="1872208"/>
               </a:xfrm>
               <a:blipFill>
                 <a:blip r:embed="rId2"/>
                 <a:stretch>
-                  <a:fillRect l="-2152" t="-4560" r="-3730" b="-326"/>
+                  <a:fillRect l="-1984" t="-4560" r="-3175"/>
                 </a:stretch>
               </a:blipFill>
             </p:spPr>
@@ -13227,8 +13582,8 @@
           </a:p>
         </p:txBody>
       </p:sp>
-      <mc:AlternateContent xmlns:mc="http://schemas.openxmlformats.org/markup-compatibility/2006">
-        <mc:Choice xmlns:a14="http://schemas.microsoft.com/office/drawing/2010/main" Requires="a14">
+      <mc:AlternateContent xmlns:mc="http://schemas.openxmlformats.org/markup-compatibility/2006" xmlns:a14="http://schemas.microsoft.com/office/drawing/2010/main">
+        <mc:Choice Requires="a14">
           <p:sp>
             <p:nvSpPr>
               <p:cNvPr id="7" name="pole tekstowe 6"/>
@@ -13969,7 +14324,7 @@
             </p:txBody>
           </p:sp>
         </mc:Choice>
-        <mc:Fallback>
+        <mc:Fallback xmlns="">
           <p:sp>
             <p:nvSpPr>
               <p:cNvPr id="7" name="pole tekstowe 6"/>
@@ -14342,8 +14697,8 @@
           <a:chExt cx="0" cy="0"/>
         </a:xfrm>
       </p:grpSpPr>
-      <mc:AlternateContent xmlns:mc="http://schemas.openxmlformats.org/markup-compatibility/2006">
-        <mc:Choice xmlns:a14="http://schemas.microsoft.com/office/drawing/2010/main" Requires="a14">
+      <mc:AlternateContent xmlns:mc="http://schemas.openxmlformats.org/markup-compatibility/2006" xmlns:a14="http://schemas.microsoft.com/office/drawing/2010/main">
+        <mc:Choice Requires="a14">
           <p:sp>
             <p:nvSpPr>
               <p:cNvPr id="2" name="Tytuł 1"/>
@@ -14398,7 +14753,7 @@
             </p:txBody>
           </p:sp>
         </mc:Choice>
-        <mc:Fallback>
+        <mc:Fallback xmlns="">
           <p:sp>
             <p:nvSpPr>
               <p:cNvPr id="2" name="Tytuł 1"/>
@@ -14436,8 +14791,8 @@
           </p:sp>
         </mc:Fallback>
       </mc:AlternateContent>
-      <mc:AlternateContent xmlns:mc="http://schemas.openxmlformats.org/markup-compatibility/2006">
-        <mc:Choice xmlns:a14="http://schemas.microsoft.com/office/drawing/2010/main" Requires="a14">
+      <mc:AlternateContent xmlns:mc="http://schemas.openxmlformats.org/markup-compatibility/2006" xmlns:a14="http://schemas.microsoft.com/office/drawing/2010/main">
+        <mc:Choice Requires="a14">
           <p:sp>
             <p:nvSpPr>
               <p:cNvPr id="3" name="Symbol zastępczy zawartości 2"/>
@@ -14742,7 +15097,7 @@
             </p:txBody>
           </p:sp>
         </mc:Choice>
-        <mc:Fallback>
+        <mc:Fallback xmlns="">
           <p:sp>
             <p:nvSpPr>
               <p:cNvPr id="3" name="Symbol zastępczy zawartości 2"/>
@@ -14829,8 +15184,8 @@
           <a:chExt cx="0" cy="0"/>
         </a:xfrm>
       </p:grpSpPr>
-      <mc:AlternateContent xmlns:mc="http://schemas.openxmlformats.org/markup-compatibility/2006">
-        <mc:Choice xmlns:a14="http://schemas.microsoft.com/office/drawing/2010/main" Requires="a14">
+      <mc:AlternateContent xmlns:mc="http://schemas.openxmlformats.org/markup-compatibility/2006" xmlns:a14="http://schemas.microsoft.com/office/drawing/2010/main">
+        <mc:Choice Requires="a14">
           <p:sp>
             <p:nvSpPr>
               <p:cNvPr id="2" name="Tytuł 1"/>
@@ -14898,7 +15253,7 @@
             </p:txBody>
           </p:sp>
         </mc:Choice>
-        <mc:Fallback>
+        <mc:Fallback xmlns="">
           <p:sp>
             <p:nvSpPr>
               <p:cNvPr id="2" name="Tytuł 1"/>
@@ -14966,8 +15321,8 @@
           </a:prstGeom>
         </p:spPr>
       </p:pic>
-      <mc:AlternateContent xmlns:mc="http://schemas.openxmlformats.org/markup-compatibility/2006">
-        <mc:Choice xmlns:a14="http://schemas.microsoft.com/office/drawing/2010/main" Requires="a14">
+      <mc:AlternateContent xmlns:mc="http://schemas.openxmlformats.org/markup-compatibility/2006" xmlns:a14="http://schemas.microsoft.com/office/drawing/2010/main">
+        <mc:Choice Requires="a14">
           <p:sp>
             <p:nvSpPr>
               <p:cNvPr id="5" name="pole tekstowe 4"/>
@@ -15052,7 +15407,7 @@
             </p:txBody>
           </p:sp>
         </mc:Choice>
-        <mc:Fallback>
+        <mc:Fallback xmlns="">
           <p:sp>
             <p:nvSpPr>
               <p:cNvPr id="5" name="pole tekstowe 4"/>
@@ -15140,8 +15495,8 @@
           <a:chExt cx="0" cy="0"/>
         </a:xfrm>
       </p:grpSpPr>
-      <mc:AlternateContent xmlns:mc="http://schemas.openxmlformats.org/markup-compatibility/2006">
-        <mc:Choice xmlns:a14="http://schemas.microsoft.com/office/drawing/2010/main" Requires="a14">
+      <mc:AlternateContent xmlns:mc="http://schemas.openxmlformats.org/markup-compatibility/2006" xmlns:a14="http://schemas.microsoft.com/office/drawing/2010/main">
+        <mc:Choice Requires="a14">
           <p:sp>
             <p:nvSpPr>
               <p:cNvPr id="2" name="Tytuł 1"/>
@@ -15221,7 +15576,7 @@
             </p:txBody>
           </p:sp>
         </mc:Choice>
-        <mc:Fallback>
+        <mc:Fallback xmlns="">
           <p:sp>
             <p:nvSpPr>
               <p:cNvPr id="2" name="Tytuł 1"/>
@@ -15289,8 +15644,8 @@
           </a:prstGeom>
         </p:spPr>
       </p:pic>
-      <mc:AlternateContent xmlns:mc="http://schemas.openxmlformats.org/markup-compatibility/2006">
-        <mc:Choice xmlns:a14="http://schemas.microsoft.com/office/drawing/2010/main" Requires="a14">
+      <mc:AlternateContent xmlns:mc="http://schemas.openxmlformats.org/markup-compatibility/2006" xmlns:a14="http://schemas.microsoft.com/office/drawing/2010/main">
+        <mc:Choice Requires="a14">
           <p:sp>
             <p:nvSpPr>
               <p:cNvPr id="4" name="pole tekstowe 3"/>
@@ -15424,7 +15779,7 @@
             </p:txBody>
           </p:sp>
         </mc:Choice>
-        <mc:Fallback>
+        <mc:Fallback xmlns="">
           <p:sp>
             <p:nvSpPr>
               <p:cNvPr id="4" name="pole tekstowe 3"/>
@@ -15546,8 +15901,8 @@
           </a:p>
         </p:txBody>
       </p:sp>
-      <mc:AlternateContent xmlns:mc="http://schemas.openxmlformats.org/markup-compatibility/2006">
-        <mc:Choice xmlns:a14="http://schemas.microsoft.com/office/drawing/2010/main" Requires="a14">
+      <mc:AlternateContent xmlns:mc="http://schemas.openxmlformats.org/markup-compatibility/2006" xmlns:a14="http://schemas.microsoft.com/office/drawing/2010/main">
+        <mc:Choice Requires="a14">
           <p:sp>
             <p:nvSpPr>
               <p:cNvPr id="3" name="Symbol zastępczy zawartości 2"/>
@@ -15673,7 +16028,7 @@
             </p:txBody>
           </p:sp>
         </mc:Choice>
-        <mc:Fallback>
+        <mc:Fallback xmlns="">
           <p:sp>
             <p:nvSpPr>
               <p:cNvPr id="3" name="Symbol zastępczy zawartości 2"/>
@@ -15921,8 +16276,8 @@
           <a:chExt cx="0" cy="0"/>
         </a:xfrm>
       </p:grpSpPr>
-      <mc:AlternateContent xmlns:mc="http://schemas.openxmlformats.org/markup-compatibility/2006">
-        <mc:Choice xmlns:a14="http://schemas.microsoft.com/office/drawing/2010/main" Requires="a14">
+      <mc:AlternateContent xmlns:mc="http://schemas.openxmlformats.org/markup-compatibility/2006" xmlns:a14="http://schemas.microsoft.com/office/drawing/2010/main">
+        <mc:Choice Requires="a14">
           <p:sp>
             <p:nvSpPr>
               <p:cNvPr id="3" name="Symbol zastępczy zawartości 2"/>
@@ -16630,7 +16985,7 @@
             </p:txBody>
           </p:sp>
         </mc:Choice>
-        <mc:Fallback>
+        <mc:Fallback xmlns="">
           <p:sp>
             <p:nvSpPr>
               <p:cNvPr id="3" name="Symbol zastępczy zawartości 2"/>
@@ -17825,8 +18180,8 @@
             </p:nvSpPr>
             <p:spPr>
               <a:xfrm>
-                <a:off x="1593436" y="1916832"/>
-                <a:ext cx="9782801" cy="3024336"/>
+                <a:off x="1593436" y="1772816"/>
+                <a:ext cx="9782801" cy="2808312"/>
               </a:xfrm>
             </p:spPr>
             <p:txBody>
@@ -17844,38 +18199,69 @@
                       <m:jc m:val="centerGroup"/>
                     </m:oMathParaPr>
                     <m:oMath xmlns:m="http://schemas.openxmlformats.org/officeDocument/2006/math">
-                      <m:d>
-                        <m:dPr>
-                          <m:begChr m:val="‖"/>
-                          <m:endChr m:val="‖"/>
+                      <m:f>
+                        <m:fPr>
                           <m:ctrlPr>
                             <a:rPr lang="pl-PL" sz="2400" i="1" smtClean="0">
                               <a:latin typeface="Cambria Math" panose="02040503050406030204" pitchFamily="18" charset="0"/>
                             </a:rPr>
                           </m:ctrlPr>
-                        </m:dPr>
-                        <m:e>
-                          <m:r>
-                            <a:rPr lang="pl-PL" sz="2400" i="1" smtClean="0">
-                              <a:latin typeface="Cambria Math" panose="02040503050406030204" pitchFamily="18" charset="0"/>
-                            </a:rPr>
-                            <m:t>𝑠</m:t>
-                          </m:r>
-                          <m:r>
-                            <a:rPr lang="pl-PL" sz="2400" b="0" i="1" smtClean="0">
-                              <a:latin typeface="Cambria Math" panose="02040503050406030204" pitchFamily="18" charset="0"/>
-                            </a:rPr>
-                            <m:t>𝑖𝑔𝑛</m:t>
-                          </m:r>
+                        </m:fPr>
+                        <m:num>
                           <m:d>
                             <m:dPr>
+                              <m:begChr m:val="‖"/>
+                              <m:endChr m:val="‖"/>
                               <m:ctrlPr>
-                                <a:rPr lang="pl-PL" sz="2400" b="0" i="1" smtClean="0">
+                                <a:rPr lang="pl-PL" sz="2400" i="1" smtClean="0">
                                   <a:latin typeface="Cambria Math" panose="02040503050406030204" pitchFamily="18" charset="0"/>
                                 </a:rPr>
                               </m:ctrlPr>
                             </m:dPr>
                             <m:e>
+                              <m:sSup>
+                                <m:sSupPr>
+                                  <m:ctrlPr>
+                                    <a:rPr lang="pl-PL" sz="2400" i="1">
+                                      <a:latin typeface="Cambria Math" panose="02040503050406030204" pitchFamily="18" charset="0"/>
+                                    </a:rPr>
+                                  </m:ctrlPr>
+                                </m:sSupPr>
+                                <m:e>
+                                  <m:r>
+                                    <a:rPr lang="pl-PL" sz="2400" i="1">
+                                      <a:latin typeface="Cambria Math" panose="02040503050406030204" pitchFamily="18" charset="0"/>
+                                    </a:rPr>
+                                    <m:t>𝑥</m:t>
+                                  </m:r>
+                                </m:e>
+                                <m:sup>
+                                  <m:r>
+                                    <a:rPr lang="pl-PL" sz="2400" i="1">
+                                      <a:latin typeface="Cambria Math" panose="02040503050406030204" pitchFamily="18" charset="0"/>
+                                    </a:rPr>
+                                    <m:t>(</m:t>
+                                  </m:r>
+                                  <m:r>
+                                    <a:rPr lang="pl-PL" sz="2400" i="1">
+                                      <a:latin typeface="Cambria Math" panose="02040503050406030204" pitchFamily="18" charset="0"/>
+                                    </a:rPr>
+                                    <m:t>𝑘</m:t>
+                                  </m:r>
+                                  <m:r>
+                                    <a:rPr lang="pl-PL" sz="2400" i="1">
+                                      <a:latin typeface="Cambria Math" panose="02040503050406030204" pitchFamily="18" charset="0"/>
+                                    </a:rPr>
+                                    <m:t>+1)</m:t>
+                                  </m:r>
+                                </m:sup>
+                              </m:sSup>
+                              <m:r>
+                                <a:rPr lang="pl-PL" sz="2400" b="0" i="1" smtClean="0">
+                                  <a:latin typeface="Cambria Math" panose="02040503050406030204" pitchFamily="18" charset="0"/>
+                                </a:rPr>
+                                <m:t>−</m:t>
+                              </m:r>
                               <m:sSubSup>
                                 <m:sSubSupPr>
                                   <m:ctrlPr>
@@ -17884,6 +18270,53 @@
                                     </a:rPr>
                                   </m:ctrlPr>
                                 </m:sSubSupPr>
+                                <m:e>
+                                  <m:r>
+                                    <a:rPr lang="pl-PL" sz="2400" i="1">
+                                      <a:latin typeface="Cambria Math" panose="02040503050406030204" pitchFamily="18" charset="0"/>
+                                      <a:ea typeface="Cambria Math" panose="02040503050406030204" pitchFamily="18" charset="0"/>
+                                      <a:cs typeface="Calibri" panose="020F0502020204030204" pitchFamily="34" charset="0"/>
+                                    </a:rPr>
+                                    <m:t>𝜆</m:t>
+                                  </m:r>
+                                </m:e>
+                                <m:sub>
+                                  <m:r>
+                                    <a:rPr lang="pl-PL" sz="2400" b="0" i="1" smtClean="0">
+                                      <a:latin typeface="Cambria Math" panose="02040503050406030204" pitchFamily="18" charset="0"/>
+                                    </a:rPr>
+                                    <m:t>1</m:t>
+                                  </m:r>
+                                </m:sub>
+                                <m:sup>
+                                  <m:r>
+                                    <a:rPr lang="pl-PL" sz="2400" b="0" i="1" smtClean="0">
+                                      <a:latin typeface="Cambria Math" panose="02040503050406030204" pitchFamily="18" charset="0"/>
+                                    </a:rPr>
+                                    <m:t>(</m:t>
+                                  </m:r>
+                                  <m:r>
+                                    <a:rPr lang="pl-PL" sz="2400" b="0" i="1" smtClean="0">
+                                      <a:latin typeface="Cambria Math" panose="02040503050406030204" pitchFamily="18" charset="0"/>
+                                    </a:rPr>
+                                    <m:t>𝑘</m:t>
+                                  </m:r>
+                                  <m:r>
+                                    <a:rPr lang="pl-PL" sz="2400" b="0" i="1" smtClean="0">
+                                      <a:latin typeface="Cambria Math" panose="02040503050406030204" pitchFamily="18" charset="0"/>
+                                    </a:rPr>
+                                    <m:t>)</m:t>
+                                  </m:r>
+                                </m:sup>
+                              </m:sSubSup>
+                              <m:sSup>
+                                <m:sSupPr>
+                                  <m:ctrlPr>
+                                    <a:rPr lang="pl-PL" sz="2400" i="1">
+                                      <a:latin typeface="Cambria Math" panose="02040503050406030204" pitchFamily="18" charset="0"/>
+                                    </a:rPr>
+                                  </m:ctrlPr>
+                                </m:sSupPr>
                                 <m:e>
                                   <m:acc>
                                     <m:accPr>
@@ -17904,120 +18337,37 @@
                                     </m:e>
                                   </m:acc>
                                 </m:e>
-                                <m:sub>
-                                  <m:r>
-                                    <a:rPr lang="pl-PL" sz="2400" b="0" i="1" smtClean="0">
-                                      <a:latin typeface="Cambria Math" panose="02040503050406030204" pitchFamily="18" charset="0"/>
-                                    </a:rPr>
-                                    <m:t>𝑖</m:t>
-                                  </m:r>
-                                </m:sub>
                                 <m:sup>
-                                  <m:d>
-                                    <m:dPr>
-                                      <m:ctrlPr>
-                                        <a:rPr lang="pl-PL" sz="2400" b="0" i="1" smtClean="0">
-                                          <a:latin typeface="Cambria Math" panose="02040503050406030204" pitchFamily="18" charset="0"/>
-                                        </a:rPr>
-                                      </m:ctrlPr>
-                                    </m:dPr>
-                                    <m:e>
-                                      <m:r>
-                                        <a:rPr lang="pl-PL" sz="2400" b="0" i="1" smtClean="0">
-                                          <a:latin typeface="Cambria Math" panose="02040503050406030204" pitchFamily="18" charset="0"/>
-                                        </a:rPr>
-                                        <m:t>𝑘</m:t>
-                                      </m:r>
-                                      <m:r>
-                                        <a:rPr lang="pl-PL" sz="2400" b="0" i="1" smtClean="0">
-                                          <a:latin typeface="Cambria Math" panose="02040503050406030204" pitchFamily="18" charset="0"/>
-                                        </a:rPr>
-                                        <m:t>+1</m:t>
-                                      </m:r>
-                                    </m:e>
-                                  </m:d>
-                                </m:sup>
-                              </m:sSubSup>
-                            </m:e>
-                          </m:d>
-                          <m:r>
-                            <a:rPr lang="pl-PL" sz="2400" b="0" i="1" smtClean="0">
-                              <a:latin typeface="Cambria Math" panose="02040503050406030204" pitchFamily="18" charset="0"/>
-                              <a:ea typeface="Cambria Math" panose="02040503050406030204" pitchFamily="18" charset="0"/>
-                            </a:rPr>
-                            <m:t>∙</m:t>
-                          </m:r>
-                          <m:sSup>
-                            <m:sSupPr>
-                              <m:ctrlPr>
-                                <a:rPr lang="pl-PL" sz="2400" i="1">
-                                  <a:latin typeface="Cambria Math" panose="02040503050406030204" pitchFamily="18" charset="0"/>
-                                </a:rPr>
-                              </m:ctrlPr>
-                            </m:sSupPr>
-                            <m:e>
-                              <m:acc>
-                                <m:accPr>
-                                  <m:chr m:val="̃"/>
-                                  <m:ctrlPr>
-                                    <a:rPr lang="pl-PL" sz="2400" i="1">
-                                      <a:latin typeface="Cambria Math" panose="02040503050406030204" pitchFamily="18" charset="0"/>
-                                    </a:rPr>
-                                  </m:ctrlPr>
-                                </m:accPr>
-                                <m:e>
                                   <m:r>
                                     <a:rPr lang="pl-PL" sz="2400" i="1">
                                       <a:latin typeface="Cambria Math" panose="02040503050406030204" pitchFamily="18" charset="0"/>
                                     </a:rPr>
-                                    <m:t>𝑥</m:t>
+                                    <m:t>(</m:t>
                                   </m:r>
-                                </m:e>
-                              </m:acc>
+                                  <m:r>
+                                    <a:rPr lang="pl-PL" sz="2400" i="1">
+                                      <a:latin typeface="Cambria Math" panose="02040503050406030204" pitchFamily="18" charset="0"/>
+                                    </a:rPr>
+                                    <m:t>𝑘</m:t>
+                                  </m:r>
+                                  <m:r>
+                                    <a:rPr lang="pl-PL" sz="2400" i="1">
+                                      <a:latin typeface="Cambria Math" panose="02040503050406030204" pitchFamily="18" charset="0"/>
+                                    </a:rPr>
+                                    <m:t>)</m:t>
+                                  </m:r>
+                                </m:sup>
+                              </m:sSup>
                             </m:e>
-                            <m:sup>
-                              <m:r>
-                                <a:rPr lang="pl-PL" sz="2400" i="1">
-                                  <a:latin typeface="Cambria Math" panose="02040503050406030204" pitchFamily="18" charset="0"/>
-                                </a:rPr>
-                                <m:t>(</m:t>
-                              </m:r>
-                              <m:r>
-                                <a:rPr lang="pl-PL" sz="2400" i="1">
-                                  <a:latin typeface="Cambria Math" panose="02040503050406030204" pitchFamily="18" charset="0"/>
-                                </a:rPr>
-                                <m:t>𝑘</m:t>
-                              </m:r>
-                              <m:r>
-                                <a:rPr lang="pl-PL" sz="2400" b="0" i="1" smtClean="0">
-                                  <a:latin typeface="Cambria Math" panose="02040503050406030204" pitchFamily="18" charset="0"/>
-                                </a:rPr>
-                                <m:t>+1</m:t>
-                              </m:r>
-                              <m:r>
-                                <a:rPr lang="pl-PL" sz="2400" i="1">
-                                  <a:latin typeface="Cambria Math" panose="02040503050406030204" pitchFamily="18" charset="0"/>
-                                </a:rPr>
-                                <m:t>)</m:t>
-                              </m:r>
-                            </m:sup>
-                          </m:sSup>
-                          <m:r>
-                            <a:rPr lang="pl-PL" sz="2400" b="0" i="1" smtClean="0">
-                              <a:latin typeface="Cambria Math" panose="02040503050406030204" pitchFamily="18" charset="0"/>
-                            </a:rPr>
-                            <m:t>−</m:t>
-                          </m:r>
-                          <m:r>
-                            <a:rPr lang="pl-PL" sz="2400" i="1">
-                              <a:latin typeface="Cambria Math" panose="02040503050406030204" pitchFamily="18" charset="0"/>
-                            </a:rPr>
-                            <m:t>𝑠𝑖𝑔𝑛</m:t>
-                          </m:r>
+                          </m:d>
+                        </m:num>
+                        <m:den>
                           <m:d>
                             <m:dPr>
+                              <m:begChr m:val="|"/>
+                              <m:endChr m:val="|"/>
                               <m:ctrlPr>
-                                <a:rPr lang="pl-PL" sz="2400" i="1">
+                                <a:rPr lang="pl-PL" sz="2400" i="1" smtClean="0">
                                   <a:latin typeface="Cambria Math" panose="02040503050406030204" pitchFamily="18" charset="0"/>
                                 </a:rPr>
                               </m:ctrlPr>
@@ -18032,113 +18382,48 @@
                                   </m:ctrlPr>
                                 </m:sSubSupPr>
                                 <m:e>
-                                  <m:acc>
-                                    <m:accPr>
-                                      <m:chr m:val="̃"/>
-                                      <m:ctrlPr>
-                                        <a:rPr lang="pl-PL" sz="2400" i="1">
-                                          <a:latin typeface="Cambria Math" panose="02040503050406030204" pitchFamily="18" charset="0"/>
-                                        </a:rPr>
-                                      </m:ctrlPr>
-                                    </m:accPr>
-                                    <m:e>
-                                      <m:r>
-                                        <a:rPr lang="pl-PL" sz="2400" i="1">
-                                          <a:latin typeface="Cambria Math" panose="02040503050406030204" pitchFamily="18" charset="0"/>
-                                        </a:rPr>
-                                        <m:t>𝑥</m:t>
-                                      </m:r>
-                                    </m:e>
-                                  </m:acc>
+                                  <m:r>
+                                    <a:rPr lang="pl-PL" sz="2400" i="1">
+                                      <a:latin typeface="Cambria Math" panose="02040503050406030204" pitchFamily="18" charset="0"/>
+                                      <a:ea typeface="Cambria Math" panose="02040503050406030204" pitchFamily="18" charset="0"/>
+                                      <a:cs typeface="Calibri" panose="020F0502020204030204" pitchFamily="34" charset="0"/>
+                                    </a:rPr>
+                                    <m:t>𝜆</m:t>
+                                  </m:r>
                                 </m:e>
                                 <m:sub>
                                   <m:r>
                                     <a:rPr lang="pl-PL" sz="2400" i="1">
                                       <a:latin typeface="Cambria Math" panose="02040503050406030204" pitchFamily="18" charset="0"/>
                                     </a:rPr>
-                                    <m:t>𝑖</m:t>
+                                    <m:t>1</m:t>
                                   </m:r>
                                 </m:sub>
                                 <m:sup>
-                                  <m:d>
-                                    <m:dPr>
-                                      <m:ctrlPr>
-                                        <a:rPr lang="pl-PL" sz="2400" i="1">
-                                          <a:latin typeface="Cambria Math" panose="02040503050406030204" pitchFamily="18" charset="0"/>
-                                        </a:rPr>
-                                      </m:ctrlPr>
-                                    </m:dPr>
-                                    <m:e>
-                                      <m:r>
-                                        <a:rPr lang="pl-PL" sz="2400" i="1">
-                                          <a:latin typeface="Cambria Math" panose="02040503050406030204" pitchFamily="18" charset="0"/>
-                                        </a:rPr>
-                                        <m:t>𝑘</m:t>
-                                      </m:r>
-                                    </m:e>
-                                  </m:d>
+                                  <m:r>
+                                    <a:rPr lang="pl-PL" sz="2400" i="1">
+                                      <a:latin typeface="Cambria Math" panose="02040503050406030204" pitchFamily="18" charset="0"/>
+                                    </a:rPr>
+                                    <m:t>(</m:t>
+                                  </m:r>
+                                  <m:r>
+                                    <a:rPr lang="pl-PL" sz="2400" i="1">
+                                      <a:latin typeface="Cambria Math" panose="02040503050406030204" pitchFamily="18" charset="0"/>
+                                    </a:rPr>
+                                    <m:t>𝑘</m:t>
+                                  </m:r>
+                                  <m:r>
+                                    <a:rPr lang="pl-PL" sz="2400" i="1">
+                                      <a:latin typeface="Cambria Math" panose="02040503050406030204" pitchFamily="18" charset="0"/>
+                                    </a:rPr>
+                                    <m:t>)</m:t>
+                                  </m:r>
                                 </m:sup>
                               </m:sSubSup>
                             </m:e>
                           </m:d>
-                          <m:r>
-                            <a:rPr lang="pl-PL" sz="2400" i="1">
-                              <a:latin typeface="Cambria Math" panose="02040503050406030204" pitchFamily="18" charset="0"/>
-                              <a:ea typeface="Cambria Math" panose="02040503050406030204" pitchFamily="18" charset="0"/>
-                            </a:rPr>
-                            <m:t>∙</m:t>
-                          </m:r>
-                          <m:sSup>
-                            <m:sSupPr>
-                              <m:ctrlPr>
-                                <a:rPr lang="pl-PL" sz="2400" i="1">
-                                  <a:latin typeface="Cambria Math" panose="02040503050406030204" pitchFamily="18" charset="0"/>
-                                </a:rPr>
-                              </m:ctrlPr>
-                            </m:sSupPr>
-                            <m:e>
-                              <m:acc>
-                                <m:accPr>
-                                  <m:chr m:val="̃"/>
-                                  <m:ctrlPr>
-                                    <a:rPr lang="pl-PL" sz="2400" i="1">
-                                      <a:latin typeface="Cambria Math" panose="02040503050406030204" pitchFamily="18" charset="0"/>
-                                    </a:rPr>
-                                  </m:ctrlPr>
-                                </m:accPr>
-                                <m:e>
-                                  <m:r>
-                                    <a:rPr lang="pl-PL" sz="2400" i="1">
-                                      <a:latin typeface="Cambria Math" panose="02040503050406030204" pitchFamily="18" charset="0"/>
-                                    </a:rPr>
-                                    <m:t>𝑥</m:t>
-                                  </m:r>
-                                </m:e>
-                              </m:acc>
-                            </m:e>
-                            <m:sup>
-                              <m:r>
-                                <a:rPr lang="pl-PL" sz="2400" i="1">
-                                  <a:latin typeface="Cambria Math" panose="02040503050406030204" pitchFamily="18" charset="0"/>
-                                </a:rPr>
-                                <m:t>(</m:t>
-                              </m:r>
-                              <m:r>
-                                <a:rPr lang="pl-PL" sz="2400" i="1">
-                                  <a:latin typeface="Cambria Math" panose="02040503050406030204" pitchFamily="18" charset="0"/>
-                                </a:rPr>
-                                <m:t>𝑘</m:t>
-                              </m:r>
-                              <m:r>
-                                <a:rPr lang="pl-PL" sz="2400" i="1">
-                                  <a:latin typeface="Cambria Math" panose="02040503050406030204" pitchFamily="18" charset="0"/>
-                                </a:rPr>
-                                <m:t>)</m:t>
-                              </m:r>
-                            </m:sup>
-                          </m:sSup>
-                        </m:e>
-                      </m:d>
+                        </m:den>
+                      </m:f>
                       <m:r>
                         <a:rPr lang="pl-PL" sz="2400" b="0" i="1" smtClean="0">
                           <a:latin typeface="Cambria Math" panose="02040503050406030204" pitchFamily="18" charset="0"/>
@@ -18183,121 +18468,6 @@
                   <a:buNone/>
                 </a:pPr>
                 <a14:m>
-                  <m:oMathPara xmlns:m="http://schemas.openxmlformats.org/officeDocument/2006/math">
-                    <m:oMathParaPr>
-                      <m:jc m:val="left"/>
-                    </m:oMathParaPr>
-                    <m:oMath xmlns:m="http://schemas.openxmlformats.org/officeDocument/2006/math">
-                      <m:r>
-                        <a:rPr lang="pl-PL" sz="2400" i="1">
-                          <a:latin typeface="Cambria Math" panose="02040503050406030204" pitchFamily="18" charset="0"/>
-                        </a:rPr>
-                        <m:t>𝑠𝑖𝑔𝑛</m:t>
-                      </m:r>
-                      <m:d>
-                        <m:dPr>
-                          <m:ctrlPr>
-                            <a:rPr lang="pl-PL" sz="2400" b="0" i="1" smtClean="0">
-                              <a:latin typeface="Cambria Math" panose="02040503050406030204" pitchFamily="18" charset="0"/>
-                            </a:rPr>
-                          </m:ctrlPr>
-                        </m:dPr>
-                        <m:e>
-                          <m:r>
-                            <a:rPr lang="pl-PL" sz="2400" b="0" i="1" smtClean="0">
-                              <a:latin typeface="Cambria Math" panose="02040503050406030204" pitchFamily="18" charset="0"/>
-                            </a:rPr>
-                            <m:t>𝑥</m:t>
-                          </m:r>
-                        </m:e>
-                      </m:d>
-                      <m:r>
-                        <a:rPr lang="pl-PL" sz="2400" b="0" i="1" smtClean="0">
-                          <a:latin typeface="Cambria Math" panose="02040503050406030204" pitchFamily="18" charset="0"/>
-                        </a:rPr>
-                        <m:t>= </m:t>
-                      </m:r>
-                      <m:d>
-                        <m:dPr>
-                          <m:begChr m:val="{"/>
-                          <m:endChr m:val=""/>
-                          <m:ctrlPr>
-                            <a:rPr lang="pl-PL" sz="2400" b="0" i="1" smtClean="0">
-                              <a:latin typeface="Cambria Math" panose="02040503050406030204" pitchFamily="18" charset="0"/>
-                            </a:rPr>
-                          </m:ctrlPr>
-                        </m:dPr>
-                        <m:e>
-                          <m:eqArr>
-                            <m:eqArrPr>
-                              <m:ctrlPr>
-                                <a:rPr lang="pl-PL" sz="2400" b="0" i="1" smtClean="0">
-                                  <a:latin typeface="Cambria Math" panose="02040503050406030204" pitchFamily="18" charset="0"/>
-                                </a:rPr>
-                              </m:ctrlPr>
-                            </m:eqArrPr>
-                            <m:e>
-                              <m:r>
-                                <a:rPr lang="pl-PL" sz="2400" b="0" i="1" smtClean="0">
-                                  <a:latin typeface="Cambria Math" panose="02040503050406030204" pitchFamily="18" charset="0"/>
-                                </a:rPr>
-                                <m:t>   1,  </m:t>
-                              </m:r>
-                              <m:r>
-                                <a:rPr lang="pl-PL" sz="2400" b="0" i="1" smtClean="0">
-                                  <a:latin typeface="Cambria Math" panose="02040503050406030204" pitchFamily="18" charset="0"/>
-                                </a:rPr>
-                                <m:t>𝑥</m:t>
-                              </m:r>
-                              <m:r>
-                                <a:rPr lang="pl-PL" sz="2400" b="0" i="1" smtClean="0">
-                                  <a:latin typeface="Cambria Math" panose="02040503050406030204" pitchFamily="18" charset="0"/>
-                                </a:rPr>
-                                <m:t>≥0</m:t>
-                              </m:r>
-                            </m:e>
-                            <m:e>
-                              <m:r>
-                                <a:rPr lang="pl-PL" sz="2400" b="0" i="1" smtClean="0">
-                                  <a:latin typeface="Cambria Math" panose="02040503050406030204" pitchFamily="18" charset="0"/>
-                                </a:rPr>
-                                <m:t>−1,  </m:t>
-                              </m:r>
-                              <m:r>
-                                <a:rPr lang="pl-PL" sz="2400" i="1">
-                                  <a:latin typeface="Cambria Math" panose="02040503050406030204" pitchFamily="18" charset="0"/>
-                                </a:rPr>
-                                <m:t>𝑥</m:t>
-                              </m:r>
-                              <m:r>
-                                <a:rPr lang="pl-PL" sz="2400" b="0" i="1" smtClean="0">
-                                  <a:latin typeface="Cambria Math" panose="02040503050406030204" pitchFamily="18" charset="0"/>
-                                </a:rPr>
-                                <m:t>&lt;</m:t>
-                              </m:r>
-                              <m:r>
-                                <a:rPr lang="pl-PL" sz="2400" i="1">
-                                  <a:latin typeface="Cambria Math" panose="02040503050406030204" pitchFamily="18" charset="0"/>
-                                </a:rPr>
-                                <m:t>0</m:t>
-                              </m:r>
-                            </m:e>
-                          </m:eqArr>
-                        </m:e>
-                      </m:d>
-                    </m:oMath>
-                  </m:oMathPara>
-                </a14:m>
-                <a:endParaRPr lang="pl-PL" sz="2400" dirty="0" smtClean="0">
-                  <a:latin typeface="Calibri" panose="020F0502020204030204" pitchFamily="34" charset="0"/>
-                  <a:cs typeface="Calibri" panose="020F0502020204030204" pitchFamily="34" charset="0"/>
-                </a:endParaRPr>
-              </a:p>
-              <a:p>
-                <a:pPr marL="0" indent="0">
-                  <a:buNone/>
-                </a:pPr>
-                <a14:m>
                   <m:oMath xmlns:m="http://schemas.openxmlformats.org/officeDocument/2006/math">
                     <m:sSubSup>
                       <m:sSubSupPr>
@@ -18308,51 +18478,42 @@
                         </m:ctrlPr>
                       </m:sSubSupPr>
                       <m:e>
-                        <m:acc>
-                          <m:accPr>
-                            <m:chr m:val="̃"/>
-                            <m:ctrlPr>
-                              <a:rPr lang="pl-PL" sz="2400" i="1">
-                                <a:latin typeface="Cambria Math" panose="02040503050406030204" pitchFamily="18" charset="0"/>
-                              </a:rPr>
-                            </m:ctrlPr>
-                          </m:accPr>
-                          <m:e>
-                            <m:r>
-                              <a:rPr lang="pl-PL" sz="2400" i="1">
-                                <a:latin typeface="Cambria Math" panose="02040503050406030204" pitchFamily="18" charset="0"/>
-                              </a:rPr>
-                              <m:t>𝑥</m:t>
-                            </m:r>
-                          </m:e>
-                        </m:acc>
+                        <m:r>
+                          <a:rPr lang="pl-PL" sz="2400" i="1">
+                            <a:latin typeface="Cambria Math" panose="02040503050406030204" pitchFamily="18" charset="0"/>
+                            <a:ea typeface="Cambria Math" panose="02040503050406030204" pitchFamily="18" charset="0"/>
+                            <a:cs typeface="Calibri" panose="020F0502020204030204" pitchFamily="34" charset="0"/>
+                          </a:rPr>
+                          <m:t>𝜆</m:t>
+                        </m:r>
                       </m:e>
                       <m:sub>
                         <m:r>
                           <a:rPr lang="pl-PL" sz="2400" i="1">
                             <a:latin typeface="Cambria Math" panose="02040503050406030204" pitchFamily="18" charset="0"/>
                           </a:rPr>
-                          <m:t>𝑖</m:t>
+                          <m:t>1</m:t>
                         </m:r>
                       </m:sub>
                       <m:sup>
-                        <m:d>
-                          <m:dPr>
-                            <m:ctrlPr>
-                              <a:rPr lang="pl-PL" sz="2400" i="1">
-                                <a:latin typeface="Cambria Math" panose="02040503050406030204" pitchFamily="18" charset="0"/>
-                              </a:rPr>
-                            </m:ctrlPr>
-                          </m:dPr>
-                          <m:e>
-                            <m:r>
-                              <a:rPr lang="pl-PL" sz="2400" i="1">
-                                <a:latin typeface="Cambria Math" panose="02040503050406030204" pitchFamily="18" charset="0"/>
-                              </a:rPr>
-                              <m:t>𝑘</m:t>
-                            </m:r>
-                          </m:e>
-                        </m:d>
+                        <m:r>
+                          <a:rPr lang="pl-PL" sz="2400" i="1">
+                            <a:latin typeface="Cambria Math" panose="02040503050406030204" pitchFamily="18" charset="0"/>
+                          </a:rPr>
+                          <m:t>(</m:t>
+                        </m:r>
+                        <m:r>
+                          <a:rPr lang="pl-PL" sz="2400" i="1">
+                            <a:latin typeface="Cambria Math" panose="02040503050406030204" pitchFamily="18" charset="0"/>
+                          </a:rPr>
+                          <m:t>𝑘</m:t>
+                        </m:r>
+                        <m:r>
+                          <a:rPr lang="pl-PL" sz="2400" i="1">
+                            <a:latin typeface="Cambria Math" panose="02040503050406030204" pitchFamily="18" charset="0"/>
+                          </a:rPr>
+                          <m:t>)</m:t>
+                        </m:r>
                       </m:sup>
                     </m:sSubSup>
                   </m:oMath>
@@ -18362,61 +18523,25 @@
                     <a:latin typeface="Calibri" panose="020F0502020204030204" pitchFamily="34" charset="0"/>
                     <a:cs typeface="Calibri" panose="020F0502020204030204" pitchFamily="34" charset="0"/>
                   </a:rPr>
-                  <a:t>	- maksymalna co do modułu współrzędna wektora </a:t>
+                  <a:t>	- przybliżenie wartości własnej w </a:t>
                 </a:r>
                 <a14:m>
                   <m:oMath xmlns:m="http://schemas.openxmlformats.org/officeDocument/2006/math">
-                    <m:sSup>
-                      <m:sSupPr>
-                        <m:ctrlPr>
-                          <a:rPr lang="pl-PL" sz="2400" i="1">
-                            <a:latin typeface="Cambria Math" panose="02040503050406030204" pitchFamily="18" charset="0"/>
-                          </a:rPr>
-                        </m:ctrlPr>
-                      </m:sSupPr>
-                      <m:e>
-                        <m:acc>
-                          <m:accPr>
-                            <m:chr m:val="̃"/>
-                            <m:ctrlPr>
-                              <a:rPr lang="pl-PL" sz="2400" i="1">
-                                <a:latin typeface="Cambria Math" panose="02040503050406030204" pitchFamily="18" charset="0"/>
-                              </a:rPr>
-                            </m:ctrlPr>
-                          </m:accPr>
-                          <m:e>
-                            <m:r>
-                              <a:rPr lang="pl-PL" sz="2400" i="1">
-                                <a:latin typeface="Cambria Math" panose="02040503050406030204" pitchFamily="18" charset="0"/>
-                              </a:rPr>
-                              <m:t>𝑥</m:t>
-                            </m:r>
-                          </m:e>
-                        </m:acc>
-                      </m:e>
-                      <m:sup>
-                        <m:r>
-                          <a:rPr lang="pl-PL" sz="2400" i="1">
-                            <a:latin typeface="Cambria Math" panose="02040503050406030204" pitchFamily="18" charset="0"/>
-                          </a:rPr>
-                          <m:t>(</m:t>
-                        </m:r>
-                        <m:r>
-                          <a:rPr lang="pl-PL" sz="2400" i="1">
-                            <a:latin typeface="Cambria Math" panose="02040503050406030204" pitchFamily="18" charset="0"/>
-                          </a:rPr>
-                          <m:t>𝑘</m:t>
-                        </m:r>
-                        <m:r>
-                          <a:rPr lang="pl-PL" sz="2400" i="1">
-                            <a:latin typeface="Cambria Math" panose="02040503050406030204" pitchFamily="18" charset="0"/>
-                          </a:rPr>
-                          <m:t>)</m:t>
-                        </m:r>
-                      </m:sup>
-                    </m:sSup>
+                    <m:r>
+                      <a:rPr lang="pl-PL" sz="2400" i="1">
+                        <a:latin typeface="Cambria Math" panose="02040503050406030204" pitchFamily="18" charset="0"/>
+                      </a:rPr>
+                      <m:t>𝑘</m:t>
+                    </m:r>
                   </m:oMath>
                 </a14:m>
+                <a:r>
+                  <a:rPr lang="pl-PL" sz="2400" dirty="0" smtClean="0">
+                    <a:latin typeface="Calibri" panose="020F0502020204030204" pitchFamily="34" charset="0"/>
+                    <a:cs typeface="Calibri" panose="020F0502020204030204" pitchFamily="34" charset="0"/>
+                  </a:rPr>
+                  <a:t>-tym kroku</a:t>
+                </a:r>
                 <a:endParaRPr lang="pl-PL" sz="2400" dirty="0" smtClean="0">
                   <a:latin typeface="Calibri" panose="020F0502020204030204" pitchFamily="34" charset="0"/>
                   <a:cs typeface="Calibri" panose="020F0502020204030204" pitchFamily="34" charset="0"/>
@@ -18469,13 +18594,13 @@
             </p:nvSpPr>
             <p:spPr>
               <a:xfrm>
-                <a:off x="1593436" y="1916832"/>
-                <a:ext cx="9782801" cy="3024336"/>
+                <a:off x="1593436" y="1772816"/>
+                <a:ext cx="9782801" cy="2808312"/>
               </a:xfrm>
               <a:blipFill>
                 <a:blip r:embed="rId2"/>
                 <a:stretch>
-                  <a:fillRect l="-935" b="-1207"/>
+                  <a:fillRect l="-935" b="-2174"/>
                 </a:stretch>
               </a:blipFill>
             </p:spPr>
@@ -18579,8 +18704,8 @@
           </a:p>
         </p:txBody>
       </p:sp>
-      <mc:AlternateContent xmlns:mc="http://schemas.openxmlformats.org/markup-compatibility/2006">
-        <mc:Choice xmlns:a14="http://schemas.microsoft.com/office/drawing/2010/main" Requires="a14">
+      <mc:AlternateContent xmlns:mc="http://schemas.openxmlformats.org/markup-compatibility/2006" xmlns:a14="http://schemas.microsoft.com/office/drawing/2010/main">
+        <mc:Choice Requires="a14">
           <p:sp>
             <p:nvSpPr>
               <p:cNvPr id="4" name="Symbol zastępczy zawartości 2"/>
@@ -18926,7 +19051,7 @@
             </p:txBody>
           </p:sp>
         </mc:Choice>
-        <mc:Fallback>
+        <mc:Fallback xmlns="">
           <p:sp>
             <p:nvSpPr>
               <p:cNvPr id="4" name="Symbol zastępczy zawartości 2"/>

</xml_diff>

<commit_message>
fix spelling in presentation in project2
</commit_message>
<xml_diff>
--- a/Project2/Presentation/P2Z20_AGR.pptx
+++ b/Project2/Presentation/P2Z20_AGR.pptx
@@ -256,7 +256,7 @@
             <a:pPr rtl="0"/>
             <a:fld id="{259B836B-1D14-4898-A0A6-D61FF17C9DBC}" type="datetime1">
               <a:rPr lang="pl-PL" smtClean="0"/>
-              <a:t>01.01.2024</a:t>
+              <a:t>02.01.2024</a:t>
             </a:fld>
             <a:endParaRPr lang="pl-PL" dirty="0"/>
           </a:p>
@@ -433,7 +433,7 @@
             <a:fld id="{0B49425D-C08F-42D2-9661-205968B2C1FB}" type="datetime1">
               <a:rPr lang="pl-PL" smtClean="0"/>
               <a:pPr/>
-              <a:t>01.01.2024</a:t>
+              <a:t>02.01.2024</a:t>
             </a:fld>
             <a:endParaRPr lang="pl-PL" dirty="0"/>
           </a:p>
@@ -1805,7 +1805,7 @@
             <a:fld id="{0891712C-DFA3-4BBB-949A-441F8D94FB78}" type="datetime1">
               <a:rPr lang="pl-PL" smtClean="0"/>
               <a:pPr/>
-              <a:t>01.01.2024</a:t>
+              <a:t>02.01.2024</a:t>
             </a:fld>
             <a:endParaRPr lang="pl-PL" dirty="0"/>
           </a:p>
@@ -2037,7 +2037,7 @@
             <a:fld id="{945AF6E0-399A-47E1-A1DB-7B7324AFFA86}" type="datetime1">
               <a:rPr lang="pl-PL" smtClean="0"/>
               <a:pPr/>
-              <a:t>01.01.2024</a:t>
+              <a:t>02.01.2024</a:t>
             </a:fld>
             <a:endParaRPr lang="pl-PL" dirty="0"/>
           </a:p>
@@ -2865,7 +2865,7 @@
             <a:fld id="{C607926C-DC73-443E-A62B-EE34064092FB}" type="datetime1">
               <a:rPr lang="pl-PL" smtClean="0"/>
               <a:pPr/>
-              <a:t>01.01.2024</a:t>
+              <a:t>02.01.2024</a:t>
             </a:fld>
             <a:endParaRPr lang="pl-PL" dirty="0"/>
           </a:p>
@@ -3075,7 +3075,7 @@
             <a:fld id="{E5FE2A44-E43C-4DB0-9333-8D36003B44E7}" type="datetime1">
               <a:rPr lang="pl-PL" smtClean="0"/>
               <a:pPr/>
-              <a:t>01.01.2024</a:t>
+              <a:t>02.01.2024</a:t>
             </a:fld>
             <a:endParaRPr lang="pl-PL" dirty="0"/>
           </a:p>
@@ -4346,7 +4346,7 @@
             <a:fld id="{73A63387-177D-4170-9A3F-154CB0D93663}" type="datetime1">
               <a:rPr lang="pl-PL" smtClean="0"/>
               <a:pPr/>
-              <a:t>01.01.2024</a:t>
+              <a:t>02.01.2024</a:t>
             </a:fld>
             <a:endParaRPr lang="pl-PL" dirty="0"/>
           </a:p>
@@ -4680,7 +4680,7 @@
             <a:fld id="{1CFAE661-66FE-4314-8504-F784411951F4}" type="datetime1">
               <a:rPr lang="pl-PL" smtClean="0"/>
               <a:pPr/>
-              <a:t>01.01.2024</a:t>
+              <a:t>02.01.2024</a:t>
             </a:fld>
             <a:endParaRPr lang="pl-PL" dirty="0"/>
           </a:p>
@@ -5140,7 +5140,7 @@
             <a:fld id="{33DE8A6F-0E38-430F-8DDD-319E6F7E6EAA}" type="datetime1">
               <a:rPr lang="pl-PL" smtClean="0"/>
               <a:pPr/>
-              <a:t>01.01.2024</a:t>
+              <a:t>02.01.2024</a:t>
             </a:fld>
             <a:endParaRPr lang="pl-PL" dirty="0"/>
           </a:p>
@@ -5282,7 +5282,7 @@
             <a:fld id="{14227057-05C3-4648-ABCB-F25BC875C77C}" type="datetime1">
               <a:rPr lang="pl-PL" smtClean="0"/>
               <a:pPr/>
-              <a:t>01.01.2024</a:t>
+              <a:t>02.01.2024</a:t>
             </a:fld>
             <a:endParaRPr lang="pl-PL" dirty="0"/>
           </a:p>
@@ -5628,7 +5628,7 @@
             <a:fld id="{9DD6C040-6C40-4FE1-A91C-782E8F88FE59}" type="datetime1">
               <a:rPr lang="pl-PL" smtClean="0"/>
               <a:pPr/>
-              <a:t>01.01.2024</a:t>
+              <a:t>02.01.2024</a:t>
             </a:fld>
             <a:endParaRPr lang="pl-PL" dirty="0"/>
           </a:p>
@@ -6132,7 +6132,7 @@
             <a:fld id="{C1F1E1EE-6F53-47AB-A934-DBB9363F4AE6}" type="datetime1">
               <a:rPr lang="pl-PL" smtClean="0"/>
               <a:pPr/>
-              <a:t>01.01.2024</a:t>
+              <a:t>02.01.2024</a:t>
             </a:fld>
             <a:endParaRPr lang="pl-PL" dirty="0"/>
           </a:p>
@@ -6589,7 +6589,7 @@
             <a:fld id="{88F116C8-0054-4794-B06D-CBA61F961298}" type="datetime1">
               <a:rPr lang="pl-PL" smtClean="0"/>
               <a:pPr/>
-              <a:t>01.01.2024</a:t>
+              <a:t>02.01.2024</a:t>
             </a:fld>
             <a:endParaRPr lang="pl-PL" dirty="0"/>
           </a:p>
@@ -7496,7 +7496,7 @@
             <a:fld id="{7513D91F-FF86-4B7D-8E15-3B9D5855F3A0}" type="datetime1">
               <a:rPr lang="pl-PL" smtClean="0"/>
               <a:pPr/>
-              <a:t>01.01.2024</a:t>
+              <a:t>02.01.2024</a:t>
             </a:fld>
             <a:endParaRPr lang="pl-PL" dirty="0"/>
           </a:p>
@@ -9548,8 +9548,8 @@
           </p:sp>
         </mc:Fallback>
       </mc:AlternateContent>
-      <mc:AlternateContent xmlns:mc="http://schemas.openxmlformats.org/markup-compatibility/2006" xmlns:a14="http://schemas.microsoft.com/office/drawing/2010/main">
-        <mc:Choice Requires="a14">
+      <mc:AlternateContent xmlns:mc="http://schemas.openxmlformats.org/markup-compatibility/2006">
+        <mc:Choice xmlns:a14="http://schemas.microsoft.com/office/drawing/2010/main" Requires="a14">
           <p:sp>
             <p:nvSpPr>
               <p:cNvPr id="6" name="pole tekstowe 5"/>
@@ -9559,7 +9559,7 @@
             <p:spPr>
               <a:xfrm>
                 <a:off x="2850094" y="3959192"/>
-                <a:ext cx="2784801" cy="490006"/>
+                <a:ext cx="2677592" cy="453394"/>
               </a:xfrm>
               <a:prstGeom prst="rect">
                 <a:avLst/>
@@ -9579,8 +9579,8 @@
                       <m:jc m:val="centerGroup"/>
                     </m:oMathParaPr>
                     <m:oMath xmlns:m="http://schemas.openxmlformats.org/officeDocument/2006/math">
-                      <m:sSub>
-                        <m:sSubPr>
+                      <m:sSubSup>
+                        <m:sSubSupPr>
                           <m:ctrlPr>
                             <a:rPr lang="pl-PL" sz="2400" i="1" smtClean="0">
                               <a:latin typeface="Cambria Math" panose="02040503050406030204" pitchFamily="18" charset="0"/>
@@ -9588,7 +9588,7 @@
                               <a:cs typeface="Calibri" panose="020F0502020204030204" pitchFamily="34" charset="0"/>
                             </a:rPr>
                           </m:ctrlPr>
-                        </m:sSubPr>
+                        </m:sSubSupPr>
                         <m:e>
                           <m:r>
                             <a:rPr lang="pl-PL" sz="2400" i="1">
@@ -9601,34 +9601,36 @@
                         </m:e>
                         <m:sub>
                           <m:r>
-                            <a:rPr lang="pl-PL" sz="2400" i="1">
+                            <a:rPr lang="pl-PL" sz="2400" b="0" i="1" smtClean="0">
                               <a:latin typeface="Cambria Math" panose="02040503050406030204" pitchFamily="18" charset="0"/>
                               <a:ea typeface="Cambria Math" panose="02040503050406030204" pitchFamily="18" charset="0"/>
                               <a:cs typeface="Calibri" panose="020F0502020204030204" pitchFamily="34" charset="0"/>
                             </a:rPr>
-                            <m:t>𝑚</m:t>
+                            <m:t>𝑛</m:t>
                           </m:r>
+                        </m:sub>
+                        <m:sup>
                           <m:r>
                             <a:rPr lang="pl-PL" sz="2400" b="0" i="1" smtClean="0">
                               <a:latin typeface="Cambria Math" panose="02040503050406030204" pitchFamily="18" charset="0"/>
                               <a:ea typeface="Cambria Math" panose="02040503050406030204" pitchFamily="18" charset="0"/>
                               <a:cs typeface="Calibri" panose="020F0502020204030204" pitchFamily="34" charset="0"/>
                             </a:rPr>
-                            <m:t>𝑖𝑛</m:t>
+                            <m:t>−1</m:t>
                           </m:r>
-                        </m:sub>
-                      </m:sSub>
+                        </m:sup>
+                      </m:sSubSup>
                       <m:r>
-                        <a:rPr lang="pl-PL" sz="2400" b="0" i="1" smtClean="0">
+                        <a:rPr lang="pl-PL" sz="2400" i="1">
                           <a:latin typeface="Cambria Math" panose="02040503050406030204" pitchFamily="18" charset="0"/>
                           <a:ea typeface="Cambria Math" panose="02040503050406030204" pitchFamily="18" charset="0"/>
                         </a:rPr>
-                        <m:t>=</m:t>
+                        <m:t>≈</m:t>
                       </m:r>
                       <m:sSup>
                         <m:sSupPr>
                           <m:ctrlPr>
-                            <a:rPr lang="pl-PL" sz="2400" b="0" i="1" smtClean="0">
+                            <a:rPr lang="pl-PL" sz="2400" i="1">
                               <a:latin typeface="Cambria Math" panose="02040503050406030204" pitchFamily="18" charset="0"/>
                               <a:ea typeface="Cambria Math" panose="02040503050406030204" pitchFamily="18" charset="0"/>
                             </a:rPr>
@@ -9684,7 +9686,7 @@
                                     <a:rPr lang="pl-PL" sz="2400" i="1">
                                       <a:latin typeface="Cambria Math" panose="02040503050406030204" pitchFamily="18" charset="0"/>
                                     </a:rPr>
-                                    <m:t>𝑛</m:t>
+                                    <m:t>𝑘</m:t>
                                   </m:r>
                                   <m:r>
                                     <a:rPr lang="pl-PL" sz="2400" i="1">
@@ -9699,20 +9701,13 @@
                         </m:e>
                         <m:sup>
                           <m:r>
-                            <a:rPr lang="pl-PL" sz="2400" b="0" i="1" smtClean="0">
+                            <a:rPr lang="pl-PL" sz="2400" i="1">
                               <a:latin typeface="Cambria Math" panose="02040503050406030204" pitchFamily="18" charset="0"/>
-                              <a:ea typeface="Cambria Math" panose="02040503050406030204" pitchFamily="18" charset="0"/>
                             </a:rPr>
-                            <m:t>𝑇</m:t>
+                            <m:t>∗</m:t>
                           </m:r>
                         </m:sup>
                       </m:sSup>
-                      <m:r>
-                        <a:rPr lang="pl-PL" sz="2400" i="1">
-                          <a:latin typeface="Cambria Math" panose="02040503050406030204" pitchFamily="18" charset="0"/>
-                        </a:rPr>
-                        <m:t>𝐴</m:t>
-                      </m:r>
                       <m:sSup>
                         <m:sSupPr>
                           <m:ctrlPr>
@@ -9722,24 +9717,12 @@
                           </m:ctrlPr>
                         </m:sSupPr>
                         <m:e>
-                          <m:acc>
-                            <m:accPr>
-                              <m:chr m:val="̃"/>
-                              <m:ctrlPr>
-                                <a:rPr lang="pl-PL" sz="2400" i="1">
-                                  <a:latin typeface="Cambria Math" panose="02040503050406030204" pitchFamily="18" charset="0"/>
-                                </a:rPr>
-                              </m:ctrlPr>
-                            </m:accPr>
-                            <m:e>
-                              <m:r>
-                                <a:rPr lang="pl-PL" sz="2400" i="1">
-                                  <a:latin typeface="Cambria Math" panose="02040503050406030204" pitchFamily="18" charset="0"/>
-                                </a:rPr>
-                                <m:t>𝑥</m:t>
-                              </m:r>
-                            </m:e>
-                          </m:acc>
+                          <m:r>
+                            <a:rPr lang="pl-PL" sz="2400" i="1">
+                              <a:latin typeface="Cambria Math" panose="02040503050406030204" pitchFamily="18" charset="0"/>
+                            </a:rPr>
+                            <m:t>𝑥</m:t>
+                          </m:r>
                         </m:e>
                         <m:sup>
                           <m:r>
@@ -9752,13 +9735,13 @@
                             <a:rPr lang="pl-PL" sz="2400" i="1">
                               <a:latin typeface="Cambria Math" panose="02040503050406030204" pitchFamily="18" charset="0"/>
                             </a:rPr>
-                            <m:t>𝑛</m:t>
+                            <m:t>𝑘</m:t>
                           </m:r>
                           <m:r>
                             <a:rPr lang="pl-PL" sz="2400" i="1">
                               <a:latin typeface="Cambria Math" panose="02040503050406030204" pitchFamily="18" charset="0"/>
                             </a:rPr>
-                            <m:t>)</m:t>
+                            <m:t>+1)</m:t>
                           </m:r>
                         </m:sup>
                       </m:sSup>
@@ -9770,7 +9753,7 @@
             </p:txBody>
           </p:sp>
         </mc:Choice>
-        <mc:Fallback xmlns="">
+        <mc:Fallback>
           <p:sp>
             <p:nvSpPr>
               <p:cNvPr id="6" name="pole tekstowe 5"/>
@@ -9782,7 +9765,7 @@
             <p:spPr>
               <a:xfrm>
                 <a:off x="2850094" y="3959192"/>
-                <a:ext cx="2784801" cy="490006"/>
+                <a:ext cx="2677592" cy="453394"/>
               </a:xfrm>
               <a:prstGeom prst="rect">
                 <a:avLst/>
@@ -10166,56 +10149,116 @@
           </p:sp>
         </mc:Fallback>
       </mc:AlternateContent>
-      <p:sp>
-        <p:nvSpPr>
-          <p:cNvPr id="3" name="pole tekstowe 2"/>
-          <p:cNvSpPr txBox="1"/>
-          <p:nvPr/>
-        </p:nvSpPr>
-        <p:spPr>
-          <a:xfrm>
-            <a:off x="1617935" y="5085184"/>
-            <a:ext cx="8454288" cy="1569660"/>
-          </a:xfrm>
-          <a:prstGeom prst="rect">
-            <a:avLst/>
-          </a:prstGeom>
-          <a:noFill/>
-        </p:spPr>
-        <p:txBody>
-          <a:bodyPr wrap="square" rtlCol="0">
-            <a:spAutoFit/>
-          </a:bodyPr>
-          <a:lstStyle/>
-          <a:p>
-            <a:r>
-              <a:rPr lang="pl-PL" sz="2400" dirty="0" smtClean="0">
-                <a:latin typeface="Calibri" panose="020F0502020204030204" pitchFamily="34" charset="0"/>
-                <a:cs typeface="Calibri" panose="020F0502020204030204" pitchFamily="34" charset="0"/>
-              </a:rPr>
-              <a:t>Do rozwiązywania układów równań liniowych wykorzystujemy metody oparte na rozkładach macierzy na czynniki lub przekształceniach ortogonalnych takich jak na przykład transformacje </a:t>
-            </a:r>
-            <a:r>
-              <a:rPr lang="pl-PL" sz="2400" dirty="0" err="1" smtClean="0">
-                <a:latin typeface="Calibri" panose="020F0502020204030204" pitchFamily="34" charset="0"/>
-                <a:cs typeface="Calibri" panose="020F0502020204030204" pitchFamily="34" charset="0"/>
-              </a:rPr>
-              <a:t>Householdera</a:t>
-            </a:r>
-            <a:r>
-              <a:rPr lang="pl-PL" sz="2400" dirty="0" smtClean="0">
-                <a:latin typeface="Calibri" panose="020F0502020204030204" pitchFamily="34" charset="0"/>
-                <a:cs typeface="Calibri" panose="020F0502020204030204" pitchFamily="34" charset="0"/>
-              </a:rPr>
-              <a:t>.</a:t>
-            </a:r>
-            <a:endParaRPr lang="pl-PL" sz="2400" dirty="0">
-              <a:latin typeface="Calibri" panose="020F0502020204030204" pitchFamily="34" charset="0"/>
-              <a:cs typeface="Calibri" panose="020F0502020204030204" pitchFamily="34" charset="0"/>
-            </a:endParaRPr>
-          </a:p>
-        </p:txBody>
-      </p:sp>
+      <mc:AlternateContent xmlns:mc="http://schemas.openxmlformats.org/markup-compatibility/2006">
+        <mc:Choice xmlns:a14="http://schemas.microsoft.com/office/drawing/2010/main" Requires="a14">
+          <p:sp>
+            <p:nvSpPr>
+              <p:cNvPr id="3" name="pole tekstowe 2"/>
+              <p:cNvSpPr txBox="1"/>
+              <p:nvPr/>
+            </p:nvSpPr>
+            <p:spPr>
+              <a:xfrm>
+                <a:off x="1617935" y="5085184"/>
+                <a:ext cx="8454288" cy="1569660"/>
+              </a:xfrm>
+              <a:prstGeom prst="rect">
+                <a:avLst/>
+              </a:prstGeom>
+              <a:noFill/>
+            </p:spPr>
+            <p:txBody>
+              <a:bodyPr wrap="square" rtlCol="0">
+                <a:spAutoFit/>
+              </a:bodyPr>
+              <a:lstStyle/>
+              <a:p>
+                <a:r>
+                  <a:rPr lang="pl-PL" sz="2400" dirty="0" smtClean="0">
+                    <a:latin typeface="Calibri" panose="020F0502020204030204" pitchFamily="34" charset="0"/>
+                    <a:cs typeface="Calibri" panose="020F0502020204030204" pitchFamily="34" charset="0"/>
+                  </a:rPr>
+                  <a:t>Do rozwiązywania układów równań liniowych wykorzystujemy metody oparte na rozkładach macierzy na czynniki lub przekształceniach ortogonalnych takich jak na przykład transformacje </a:t>
+                </a:r>
+                <a:r>
+                  <a:rPr lang="pl-PL" sz="2400" dirty="0" err="1" smtClean="0">
+                    <a:latin typeface="Calibri" panose="020F0502020204030204" pitchFamily="34" charset="0"/>
+                    <a:cs typeface="Calibri" panose="020F0502020204030204" pitchFamily="34" charset="0"/>
+                  </a:rPr>
+                  <a:t>Householdera</a:t>
+                </a:r>
+                <a:r>
+                  <a:rPr lang="pl-PL" sz="2400" dirty="0" smtClean="0">
+                    <a:latin typeface="Calibri" panose="020F0502020204030204" pitchFamily="34" charset="0"/>
+                    <a:cs typeface="Calibri" panose="020F0502020204030204" pitchFamily="34" charset="0"/>
+                  </a:rPr>
+                  <a:t> lub rozkład </a:t>
+                </a:r>
+                <a14:m>
+                  <m:oMath xmlns:m="http://schemas.openxmlformats.org/officeDocument/2006/math">
+                    <m:r>
+                      <a:rPr lang="pl-PL" sz="2400" b="0" i="1" smtClean="0">
+                        <a:latin typeface="Cambria Math" panose="02040503050406030204" pitchFamily="18" charset="0"/>
+                        <a:cs typeface="Calibri" panose="020F0502020204030204" pitchFamily="34" charset="0"/>
+                      </a:rPr>
+                      <m:t>𝐿𝑈</m:t>
+                    </m:r>
+                  </m:oMath>
+                </a14:m>
+                <a:r>
+                  <a:rPr lang="pl-PL" sz="2400" dirty="0" smtClean="0">
+                    <a:latin typeface="Calibri" panose="020F0502020204030204" pitchFamily="34" charset="0"/>
+                    <a:cs typeface="Calibri" panose="020F0502020204030204" pitchFamily="34" charset="0"/>
+                  </a:rPr>
+                  <a:t>.</a:t>
+                </a:r>
+                <a:endParaRPr lang="pl-PL" sz="2400" dirty="0">
+                  <a:latin typeface="Calibri" panose="020F0502020204030204" pitchFamily="34" charset="0"/>
+                  <a:cs typeface="Calibri" panose="020F0502020204030204" pitchFamily="34" charset="0"/>
+                </a:endParaRPr>
+              </a:p>
+            </p:txBody>
+          </p:sp>
+        </mc:Choice>
+        <mc:Fallback>
+          <p:sp>
+            <p:nvSpPr>
+              <p:cNvPr id="3" name="pole tekstowe 2"/>
+              <p:cNvSpPr txBox="1">
+                <a:spLocks noRot="1" noChangeAspect="1" noMove="1" noResize="1" noEditPoints="1" noAdjustHandles="1" noChangeArrowheads="1" noChangeShapeType="1" noTextEdit="1"/>
+              </p:cNvSpPr>
+              <p:nvPr/>
+            </p:nvSpPr>
+            <p:spPr>
+              <a:xfrm>
+                <a:off x="1617935" y="5085184"/>
+                <a:ext cx="8454288" cy="1569660"/>
+              </a:xfrm>
+              <a:prstGeom prst="rect">
+                <a:avLst/>
+              </a:prstGeom>
+              <a:blipFill>
+                <a:blip r:embed="rId5"/>
+                <a:stretch>
+                  <a:fillRect l="-1081" t="-3101" b="-7752"/>
+                </a:stretch>
+              </a:blipFill>
+            </p:spPr>
+            <p:txBody>
+              <a:bodyPr/>
+              <a:lstStyle/>
+              <a:p>
+                <a:r>
+                  <a:rPr lang="pl-PL">
+                    <a:noFill/>
+                  </a:rPr>
+                  <a:t> </a:t>
+                </a:r>
+              </a:p>
+            </p:txBody>
+          </p:sp>
+        </mc:Fallback>
+      </mc:AlternateContent>
     </p:spTree>
     <p:extLst>
       <p:ext uri="{BB962C8B-B14F-4D97-AF65-F5344CB8AC3E}">
@@ -10301,8 +10344,8 @@
           </a:p>
         </p:txBody>
       </p:sp>
-      <mc:AlternateContent xmlns:mc="http://schemas.openxmlformats.org/markup-compatibility/2006">
-        <mc:Choice xmlns:a14="http://schemas.microsoft.com/office/drawing/2010/main" Requires="a14">
+      <mc:AlternateContent xmlns:mc="http://schemas.openxmlformats.org/markup-compatibility/2006" xmlns:a14="http://schemas.microsoft.com/office/drawing/2010/main">
+        <mc:Choice Requires="a14">
           <p:sp>
             <p:nvSpPr>
               <p:cNvPr id="3" name="Symbol zastępczy zawartości 2"/>
@@ -10681,10 +10724,6 @@
                   </a:rPr>
                   <a:t>-tym kroku</a:t>
                 </a:r>
-                <a:endParaRPr lang="pl-PL" sz="2400" dirty="0" smtClean="0">
-                  <a:latin typeface="Calibri" panose="020F0502020204030204" pitchFamily="34" charset="0"/>
-                  <a:cs typeface="Calibri" panose="020F0502020204030204" pitchFamily="34" charset="0"/>
-                </a:endParaRPr>
               </a:p>
               <a:p>
                 <a:pPr marL="0" indent="0">
@@ -10720,7 +10759,7 @@
             </p:txBody>
           </p:sp>
         </mc:Choice>
-        <mc:Fallback>
+        <mc:Fallback xmlns="">
           <p:sp>
             <p:nvSpPr>
               <p:cNvPr id="3" name="Symbol zastępczy zawartości 2"/>
@@ -11895,8 +11934,8 @@
           </a:p>
         </p:txBody>
       </p:sp>
-      <mc:AlternateContent xmlns:mc="http://schemas.openxmlformats.org/markup-compatibility/2006">
-        <mc:Choice xmlns:a14="http://schemas.microsoft.com/office/drawing/2010/main" Requires="a14">
+      <mc:AlternateContent xmlns:mc="http://schemas.openxmlformats.org/markup-compatibility/2006" xmlns:a14="http://schemas.microsoft.com/office/drawing/2010/main">
+        <mc:Choice Requires="a14">
           <p:sp>
             <p:nvSpPr>
               <p:cNvPr id="4" name="Symbol zastępczy zawartości 2"/>
@@ -12089,19 +12128,8 @@
                     <a:latin typeface="Calibri" panose="020F0502020204030204" pitchFamily="34" charset="0"/>
                     <a:cs typeface="Calibri" panose="020F0502020204030204" pitchFamily="34" charset="0"/>
                   </a:rPr>
-                  <a:t> (tym samym odwracalna</a:t>
+                  <a:t> (tym samym odwracalna).</a:t>
                 </a:r>
-                <a:r>
-                  <a:rPr lang="pl-PL" sz="2400" dirty="0" smtClean="0">
-                    <a:latin typeface="Calibri" panose="020F0502020204030204" pitchFamily="34" charset="0"/>
-                    <a:cs typeface="Calibri" panose="020F0502020204030204" pitchFamily="34" charset="0"/>
-                  </a:rPr>
-                  <a:t>).</a:t>
-                </a:r>
-                <a:endParaRPr lang="pl-PL" sz="2400" dirty="0" smtClean="0">
-                  <a:latin typeface="Calibri" panose="020F0502020204030204" pitchFamily="34" charset="0"/>
-                  <a:cs typeface="Calibri" panose="020F0502020204030204" pitchFamily="34" charset="0"/>
-                </a:endParaRPr>
               </a:p>
               <a:p>
                 <a:r>
@@ -12807,15 +12835,11 @@
                   </a:rPr>
                   <a:t>.</a:t>
                 </a:r>
-                <a:endParaRPr lang="pl-PL" sz="2400" dirty="0" smtClean="0">
-                  <a:latin typeface="Calibri" panose="020F0502020204030204" pitchFamily="34" charset="0"/>
-                  <a:cs typeface="Calibri" panose="020F0502020204030204" pitchFamily="34" charset="0"/>
-                </a:endParaRPr>
               </a:p>
             </p:txBody>
           </p:sp>
         </mc:Choice>
-        <mc:Fallback>
+        <mc:Fallback xmlns="">
           <p:sp>
             <p:nvSpPr>
               <p:cNvPr id="4" name="Symbol zastępczy zawartości 2"/>
@@ -13391,7 +13415,21 @@
                     <a:latin typeface="Calibri" panose="020F0502020204030204" pitchFamily="34" charset="0"/>
                     <a:cs typeface="Calibri" panose="020F0502020204030204" pitchFamily="34" charset="0"/>
                   </a:rPr>
-                  <a:t> do macierzy górnej macierzy trójkątnej </a:t>
+                  <a:t> do </a:t>
+                </a:r>
+                <a:r>
+                  <a:rPr lang="pl-PL" sz="2400" dirty="0" smtClean="0">
+                    <a:latin typeface="Calibri" panose="020F0502020204030204" pitchFamily="34" charset="0"/>
+                    <a:cs typeface="Calibri" panose="020F0502020204030204" pitchFamily="34" charset="0"/>
+                  </a:rPr>
+                  <a:t>górnej </a:t>
+                </a:r>
+                <a:r>
+                  <a:rPr lang="pl-PL" sz="2400" dirty="0" smtClean="0">
+                    <a:latin typeface="Calibri" panose="020F0502020204030204" pitchFamily="34" charset="0"/>
+                    <a:cs typeface="Calibri" panose="020F0502020204030204" pitchFamily="34" charset="0"/>
+                  </a:rPr>
+                  <a:t>macierzy trójkątnej </a:t>
                 </a:r>
                 <a:r>
                   <a:rPr lang="pl-PL" sz="2400" dirty="0">
@@ -13453,7 +13491,7 @@
               <a:blipFill>
                 <a:blip r:embed="rId2"/>
                 <a:stretch>
-                  <a:fillRect l="-1984" t="-4560" r="-3175"/>
+                  <a:fillRect l="-1984" t="-4560" r="-1852"/>
                 </a:stretch>
               </a:blipFill>
             </p:spPr>
@@ -17468,8 +17506,8 @@
           </p:sp>
         </mc:Fallback>
       </mc:AlternateContent>
-      <mc:AlternateContent xmlns:mc="http://schemas.openxmlformats.org/markup-compatibility/2006" xmlns:a14="http://schemas.microsoft.com/office/drawing/2010/main">
-        <mc:Choice Requires="a14">
+      <mc:AlternateContent xmlns:mc="http://schemas.openxmlformats.org/markup-compatibility/2006">
+        <mc:Choice xmlns:a14="http://schemas.microsoft.com/office/drawing/2010/main" Requires="a14">
           <p:sp>
             <p:nvSpPr>
               <p:cNvPr id="6" name="pole tekstowe 5"/>
@@ -17479,7 +17517,7 @@
             <p:spPr>
               <a:xfrm>
                 <a:off x="2854052" y="4103208"/>
-                <a:ext cx="2836674" cy="490006"/>
+                <a:ext cx="2602572" cy="453394"/>
               </a:xfrm>
               <a:prstGeom prst="rect">
                 <a:avLst/>
@@ -17502,7 +17540,7 @@
                       <m:sSub>
                         <m:sSubPr>
                           <m:ctrlPr>
-                            <a:rPr lang="pl-PL" sz="2400" i="1">
+                            <a:rPr lang="pl-PL" sz="2400" i="1" smtClean="0">
                               <a:latin typeface="Cambria Math" panose="02040503050406030204" pitchFamily="18" charset="0"/>
                               <a:ea typeface="Cambria Math" panose="02040503050406030204" pitchFamily="18" charset="0"/>
                               <a:cs typeface="Calibri" panose="020F0502020204030204" pitchFamily="34" charset="0"/>
@@ -17521,21 +17559,21 @@
                         </m:e>
                         <m:sub>
                           <m:r>
-                            <a:rPr lang="pl-PL" sz="2400" i="1">
+                            <a:rPr lang="pl-PL" sz="2400" b="0" i="1" smtClean="0">
                               <a:latin typeface="Cambria Math" panose="02040503050406030204" pitchFamily="18" charset="0"/>
                               <a:ea typeface="Cambria Math" panose="02040503050406030204" pitchFamily="18" charset="0"/>
                               <a:cs typeface="Calibri" panose="020F0502020204030204" pitchFamily="34" charset="0"/>
                             </a:rPr>
-                            <m:t>𝑚𝑎𝑥</m:t>
+                            <m:t>1</m:t>
                           </m:r>
                         </m:sub>
                       </m:sSub>
                       <m:r>
-                        <a:rPr lang="pl-PL" sz="2400" b="0" i="1" smtClean="0">
+                        <a:rPr lang="pl-PL" sz="2400" i="1">
                           <a:latin typeface="Cambria Math" panose="02040503050406030204" pitchFamily="18" charset="0"/>
                           <a:ea typeface="Cambria Math" panose="02040503050406030204" pitchFamily="18" charset="0"/>
                         </a:rPr>
-                        <m:t>=</m:t>
+                        <m:t>≈</m:t>
                       </m:r>
                       <m:sSup>
                         <m:sSupPr>
@@ -17596,7 +17634,7 @@
                                     <a:rPr lang="pl-PL" sz="2400" i="1">
                                       <a:latin typeface="Cambria Math" panose="02040503050406030204" pitchFamily="18" charset="0"/>
                                     </a:rPr>
-                                    <m:t>𝑛</m:t>
+                                    <m:t>𝑘</m:t>
                                   </m:r>
                                   <m:r>
                                     <a:rPr lang="pl-PL" sz="2400" i="1">
@@ -17613,18 +17651,11 @@
                           <m:r>
                             <a:rPr lang="pl-PL" sz="2400" b="0" i="1" smtClean="0">
                               <a:latin typeface="Cambria Math" panose="02040503050406030204" pitchFamily="18" charset="0"/>
-                              <a:ea typeface="Cambria Math" panose="02040503050406030204" pitchFamily="18" charset="0"/>
                             </a:rPr>
-                            <m:t>𝑇</m:t>
+                            <m:t>∗</m:t>
                           </m:r>
                         </m:sup>
                       </m:sSup>
-                      <m:r>
-                        <a:rPr lang="pl-PL" sz="2400" i="1">
-                          <a:latin typeface="Cambria Math" panose="02040503050406030204" pitchFamily="18" charset="0"/>
-                        </a:rPr>
-                        <m:t>𝐴</m:t>
-                      </m:r>
                       <m:sSup>
                         <m:sSupPr>
                           <m:ctrlPr>
@@ -17634,24 +17665,12 @@
                           </m:ctrlPr>
                         </m:sSupPr>
                         <m:e>
-                          <m:acc>
-                            <m:accPr>
-                              <m:chr m:val="̃"/>
-                              <m:ctrlPr>
-                                <a:rPr lang="pl-PL" sz="2400" i="1">
-                                  <a:latin typeface="Cambria Math" panose="02040503050406030204" pitchFamily="18" charset="0"/>
-                                </a:rPr>
-                              </m:ctrlPr>
-                            </m:accPr>
-                            <m:e>
-                              <m:r>
-                                <a:rPr lang="pl-PL" sz="2400" i="1">
-                                  <a:latin typeface="Cambria Math" panose="02040503050406030204" pitchFamily="18" charset="0"/>
-                                </a:rPr>
-                                <m:t>𝑥</m:t>
-                              </m:r>
-                            </m:e>
-                          </m:acc>
+                          <m:r>
+                            <a:rPr lang="pl-PL" sz="2400" i="1">
+                              <a:latin typeface="Cambria Math" panose="02040503050406030204" pitchFamily="18" charset="0"/>
+                            </a:rPr>
+                            <m:t>𝑥</m:t>
+                          </m:r>
                         </m:e>
                         <m:sup>
                           <m:r>
@@ -17664,13 +17683,13 @@
                             <a:rPr lang="pl-PL" sz="2400" i="1">
                               <a:latin typeface="Cambria Math" panose="02040503050406030204" pitchFamily="18" charset="0"/>
                             </a:rPr>
-                            <m:t>𝑛</m:t>
+                            <m:t>𝑘</m:t>
                           </m:r>
                           <m:r>
                             <a:rPr lang="pl-PL" sz="2400" i="1">
                               <a:latin typeface="Cambria Math" panose="02040503050406030204" pitchFamily="18" charset="0"/>
                             </a:rPr>
-                            <m:t>)</m:t>
+                            <m:t>+1)</m:t>
                           </m:r>
                         </m:sup>
                       </m:sSup>
@@ -17682,7 +17701,7 @@
             </p:txBody>
           </p:sp>
         </mc:Choice>
-        <mc:Fallback xmlns="">
+        <mc:Fallback>
           <p:sp>
             <p:nvSpPr>
               <p:cNvPr id="6" name="pole tekstowe 5"/>
@@ -17694,7 +17713,7 @@
             <p:spPr>
               <a:xfrm>
                 <a:off x="2854052" y="4103208"/>
-                <a:ext cx="2836674" cy="490006"/>
+                <a:ext cx="2602572" cy="453394"/>
               </a:xfrm>
               <a:prstGeom prst="rect">
                 <a:avLst/>
@@ -18166,8 +18185,8 @@
           </a:p>
         </p:txBody>
       </p:sp>
-      <mc:AlternateContent xmlns:mc="http://schemas.openxmlformats.org/markup-compatibility/2006">
-        <mc:Choice xmlns:a14="http://schemas.microsoft.com/office/drawing/2010/main" Requires="a14">
+      <mc:AlternateContent xmlns:mc="http://schemas.openxmlformats.org/markup-compatibility/2006" xmlns:a14="http://schemas.microsoft.com/office/drawing/2010/main">
+        <mc:Choice Requires="a14">
           <p:sp>
             <p:nvSpPr>
               <p:cNvPr id="3" name="Symbol zastępczy zawartości 2"/>
@@ -18542,10 +18561,6 @@
                   </a:rPr>
                   <a:t>-tym kroku</a:t>
                 </a:r>
-                <a:endParaRPr lang="pl-PL" sz="2400" dirty="0" smtClean="0">
-                  <a:latin typeface="Calibri" panose="020F0502020204030204" pitchFamily="34" charset="0"/>
-                  <a:cs typeface="Calibri" panose="020F0502020204030204" pitchFamily="34" charset="0"/>
-                </a:endParaRPr>
               </a:p>
               <a:p>
                 <a:pPr marL="0" indent="0">
@@ -18581,7 +18596,7 @@
             </p:txBody>
           </p:sp>
         </mc:Choice>
-        <mc:Fallback>
+        <mc:Fallback xmlns="">
           <p:sp>
             <p:nvSpPr>
               <p:cNvPr id="3" name="Symbol zastępczy zawartości 2"/>

</xml_diff>